<commit_message>
add BizLogc layer, more tests, more functionality
</commit_message>
<xml_diff>
--- a/Study/P0 Presentation.pptx
+++ b/Study/P0 Presentation.pptx
@@ -8,8 +8,8 @@
     <p:sldId id="256" r:id="rId2"/>
     <p:sldId id="257" r:id="rId3"/>
     <p:sldId id="258" r:id="rId4"/>
-    <p:sldId id="259" r:id="rId5"/>
-    <p:sldId id="262" r:id="rId6"/>
+    <p:sldId id="262" r:id="rId5"/>
+    <p:sldId id="259" r:id="rId6"/>
     <p:sldId id="263" r:id="rId7"/>
     <p:sldId id="264" r:id="rId8"/>
     <p:sldId id="265" r:id="rId9"/>
@@ -114,6 +114,11 @@
       </a:defRPr>
     </a:lvl9pPr>
   </p:defaultTextStyle>
+  <p:extLst>
+    <p:ext uri="{EFAFB233-063F-42B5-8137-9DF3F51BA10A}">
+      <p15:sldGuideLst xmlns:p15="http://schemas.microsoft.com/office/powerpoint/2012/main"/>
+    </p:ext>
+  </p:extLst>
 </p:presentation>
 </file>
 
@@ -4799,7 +4804,7 @@
                 <a:effectLst/>
                 <a:latin typeface="-apple-system"/>
               </a:rPr>
-              <a:t>search customers by name</a:t>
+              <a:t>add a new customers</a:t>
             </a:r>
           </a:p>
           <a:p>
@@ -4811,7 +4816,7 @@
                 <a:effectLst/>
                 <a:latin typeface="-apple-system"/>
               </a:rPr>
-              <a:t>add a new customer</a:t>
+              <a:t>search customers by name</a:t>
             </a:r>
           </a:p>
           <a:p>
@@ -4983,9 +4988,8 @@
                 <a:effectLst/>
                 <a:latin typeface="-apple-system"/>
               </a:rPr>
-              <a:t>search customers by name</a:t>
-            </a:r>
-            <a:endParaRPr lang="en-US" dirty="0"/>
+              <a:t>add a new customer</a:t>
+            </a:r>
           </a:p>
         </p:txBody>
       </p:sp>
@@ -5017,7 +5021,7 @@
     </p:spTree>
     <p:extLst>
       <p:ext uri="{BB962C8B-B14F-4D97-AF65-F5344CB8AC3E}">
-        <p14:creationId xmlns:p14="http://schemas.microsoft.com/office/powerpoint/2010/main" val="229285352"/>
+        <p14:creationId xmlns:p14="http://schemas.microsoft.com/office/powerpoint/2010/main" val="2394070289"/>
       </p:ext>
     </p:extLst>
   </p:cSld>
@@ -5073,8 +5077,9 @@
                 <a:effectLst/>
                 <a:latin typeface="-apple-system"/>
               </a:rPr>
-              <a:t>add a new customer</a:t>
-            </a:r>
+              <a:t>search customers by name</a:t>
+            </a:r>
+            <a:endParaRPr lang="en-US" dirty="0"/>
           </a:p>
         </p:txBody>
       </p:sp>
@@ -5106,7 +5111,7 @@
     </p:spTree>
     <p:extLst>
       <p:ext uri="{BB962C8B-B14F-4D97-AF65-F5344CB8AC3E}">
-        <p14:creationId xmlns:p14="http://schemas.microsoft.com/office/powerpoint/2010/main" val="2394070289"/>
+        <p14:creationId xmlns:p14="http://schemas.microsoft.com/office/powerpoint/2010/main" val="229285352"/>
       </p:ext>
     </p:extLst>
   </p:cSld>

</xml_diff>

<commit_message>
adds functionality to P0
</commit_message>
<xml_diff>
--- a/Study/P0 Presentation.pptx
+++ b/Study/P0 Presentation.pptx
@@ -4975,13 +4975,18 @@
             <p:ph type="title"/>
           </p:nvPr>
         </p:nvSpPr>
-        <p:spPr/>
-        <p:txBody>
-          <a:bodyPr/>
-          <a:lstStyle/>
-          <a:p>
-            <a:r>
-              <a:rPr lang="en-US" sz="4400" b="0" i="0" dirty="0">
+        <p:spPr>
+          <a:xfrm>
+            <a:off x="474133" y="102658"/>
+            <a:ext cx="10515600" cy="1325563"/>
+          </a:xfrm>
+        </p:spPr>
+        <p:txBody>
+          <a:bodyPr/>
+          <a:lstStyle/>
+          <a:p>
+            <a:r>
+              <a:rPr lang="en-US" sz="4400" b="0" i="0">
                 <a:solidFill>
                   <a:schemeClr val="accent6"/>
                 </a:solidFill>
@@ -4990,34 +4995,75 @@
               </a:rPr>
               <a:t>add a new customer</a:t>
             </a:r>
-          </a:p>
-        </p:txBody>
-      </p:sp>
-      <p:sp>
-        <p:nvSpPr>
-          <p:cNvPr id="3" name="Content Placeholder 2">
-            <a:extLst>
-              <a:ext uri="{FF2B5EF4-FFF2-40B4-BE49-F238E27FC236}">
-                <a16:creationId xmlns:a16="http://schemas.microsoft.com/office/drawing/2014/main" id="{8569E078-8E88-405D-A9E0-40273C4459A5}"/>
-              </a:ext>
-            </a:extLst>
-          </p:cNvPr>
-          <p:cNvSpPr>
-            <a:spLocks noGrp="1"/>
-          </p:cNvSpPr>
+            <a:endParaRPr lang="en-US" sz="4400" b="0" i="0" dirty="0">
+              <a:solidFill>
+                <a:schemeClr val="accent6"/>
+              </a:solidFill>
+              <a:effectLst/>
+              <a:latin typeface="-apple-system"/>
+            </a:endParaRPr>
+          </a:p>
+        </p:txBody>
+      </p:sp>
+      <p:pic>
+        <p:nvPicPr>
+          <p:cNvPr id="5" name="Content Placeholder 4">
+            <a:extLst>
+              <a:ext uri="{FF2B5EF4-FFF2-40B4-BE49-F238E27FC236}">
+                <a16:creationId xmlns:a16="http://schemas.microsoft.com/office/drawing/2014/main" id="{0BAF3597-FC96-41E2-8B54-6C37B10D2F80}"/>
+              </a:ext>
+            </a:extLst>
+          </p:cNvPr>
+          <p:cNvPicPr>
+            <a:picLocks noGrp="1" noChangeAspect="1"/>
+          </p:cNvPicPr>
           <p:nvPr>
             <p:ph idx="1"/>
           </p:nvPr>
-        </p:nvSpPr>
-        <p:spPr/>
-        <p:txBody>
-          <a:bodyPr/>
-          <a:lstStyle/>
-          <a:p>
-            <a:endParaRPr lang="en-US"/>
-          </a:p>
-        </p:txBody>
-      </p:sp>
+        </p:nvPicPr>
+        <p:blipFill>
+          <a:blip r:embed="rId2"/>
+          <a:stretch>
+            <a:fillRect/>
+          </a:stretch>
+        </p:blipFill>
+        <p:spPr>
+          <a:xfrm>
+            <a:off x="97780" y="1145251"/>
+            <a:ext cx="5998220" cy="5398451"/>
+          </a:xfrm>
+        </p:spPr>
+      </p:pic>
+      <p:pic>
+        <p:nvPicPr>
+          <p:cNvPr id="7" name="Picture 6">
+            <a:extLst>
+              <a:ext uri="{FF2B5EF4-FFF2-40B4-BE49-F238E27FC236}">
+                <a16:creationId xmlns:a16="http://schemas.microsoft.com/office/drawing/2014/main" id="{D801E9C3-BBFC-4251-B6C2-4DAACD3F9B78}"/>
+              </a:ext>
+            </a:extLst>
+          </p:cNvPr>
+          <p:cNvPicPr>
+            <a:picLocks noChangeAspect="1"/>
+          </p:cNvPicPr>
+          <p:nvPr/>
+        </p:nvPicPr>
+        <p:blipFill>
+          <a:blip r:embed="rId3"/>
+          <a:stretch>
+            <a:fillRect/>
+          </a:stretch>
+        </p:blipFill>
+        <p:spPr>
+          <a:xfrm>
+            <a:off x="5427272" y="1676272"/>
+            <a:ext cx="6764728" cy="3683189"/>
+          </a:xfrm>
+          <a:prstGeom prst="rect">
+            <a:avLst/>
+          </a:prstGeom>
+        </p:spPr>
+      </p:pic>
     </p:spTree>
     <p:extLst>
       <p:ext uri="{BB962C8B-B14F-4D97-AF65-F5344CB8AC3E}">
@@ -5077,37 +5123,41 @@
                 <a:effectLst/>
                 <a:latin typeface="-apple-system"/>
               </a:rPr>
-              <a:t>search customers by name</a:t>
+              <a:t>search customers by name (&amp; other parameters)</a:t>
             </a:r>
             <a:endParaRPr lang="en-US" dirty="0"/>
           </a:p>
         </p:txBody>
       </p:sp>
-      <p:sp>
-        <p:nvSpPr>
-          <p:cNvPr id="3" name="Content Placeholder 2">
-            <a:extLst>
-              <a:ext uri="{FF2B5EF4-FFF2-40B4-BE49-F238E27FC236}">
-                <a16:creationId xmlns:a16="http://schemas.microsoft.com/office/drawing/2014/main" id="{8569E078-8E88-405D-A9E0-40273C4459A5}"/>
-              </a:ext>
-            </a:extLst>
-          </p:cNvPr>
-          <p:cNvSpPr>
-            <a:spLocks noGrp="1"/>
-          </p:cNvSpPr>
+      <p:pic>
+        <p:nvPicPr>
+          <p:cNvPr id="5" name="Content Placeholder 4">
+            <a:extLst>
+              <a:ext uri="{FF2B5EF4-FFF2-40B4-BE49-F238E27FC236}">
+                <a16:creationId xmlns:a16="http://schemas.microsoft.com/office/drawing/2014/main" id="{59AE665B-2931-4756-AB8F-6A54B539E847}"/>
+              </a:ext>
+            </a:extLst>
+          </p:cNvPr>
+          <p:cNvPicPr>
+            <a:picLocks noGrp="1" noChangeAspect="1"/>
+          </p:cNvPicPr>
           <p:nvPr>
             <p:ph idx="1"/>
           </p:nvPr>
-        </p:nvSpPr>
-        <p:spPr/>
-        <p:txBody>
-          <a:bodyPr/>
-          <a:lstStyle/>
-          <a:p>
-            <a:endParaRPr lang="en-US"/>
-          </a:p>
-        </p:txBody>
-      </p:sp>
+        </p:nvPicPr>
+        <p:blipFill>
+          <a:blip r:embed="rId2"/>
+          <a:stretch>
+            <a:fillRect/>
+          </a:stretch>
+        </p:blipFill>
+        <p:spPr>
+          <a:xfrm>
+            <a:off x="210790" y="1825625"/>
+            <a:ext cx="6130743" cy="4351338"/>
+          </a:xfrm>
+        </p:spPr>
+      </p:pic>
     </p:spTree>
     <p:extLst>
       <p:ext uri="{BB962C8B-B14F-4D97-AF65-F5344CB8AC3E}">

</xml_diff>

<commit_message>
Polished p0 functionality and added final PPT
</commit_message>
<xml_diff>
--- a/Study/P0 Presentation.pptx
+++ b/Study/P0 Presentation.pptx
@@ -6,16 +6,23 @@
   </p:sldMasterIdLst>
   <p:sldIdLst>
     <p:sldId id="256" r:id="rId2"/>
-    <p:sldId id="257" r:id="rId3"/>
-    <p:sldId id="258" r:id="rId4"/>
-    <p:sldId id="262" r:id="rId5"/>
-    <p:sldId id="259" r:id="rId6"/>
-    <p:sldId id="263" r:id="rId7"/>
-    <p:sldId id="264" r:id="rId8"/>
-    <p:sldId id="265" r:id="rId9"/>
-    <p:sldId id="266" r:id="rId10"/>
-    <p:sldId id="260" r:id="rId11"/>
-    <p:sldId id="261" r:id="rId12"/>
+    <p:sldId id="258" r:id="rId3"/>
+    <p:sldId id="259" r:id="rId4"/>
+    <p:sldId id="264" r:id="rId5"/>
+    <p:sldId id="266" r:id="rId6"/>
+    <p:sldId id="262" r:id="rId7"/>
+    <p:sldId id="263" r:id="rId8"/>
+    <p:sldId id="269" r:id="rId9"/>
+    <p:sldId id="270" r:id="rId10"/>
+    <p:sldId id="268" r:id="rId11"/>
+    <p:sldId id="274" r:id="rId12"/>
+    <p:sldId id="273" r:id="rId13"/>
+    <p:sldId id="276" r:id="rId14"/>
+    <p:sldId id="260" r:id="rId15"/>
+    <p:sldId id="271" r:id="rId16"/>
+    <p:sldId id="275" r:id="rId17"/>
+    <p:sldId id="277" r:id="rId18"/>
+    <p:sldId id="272" r:id="rId19"/>
   </p:sldIdLst>
   <p:sldSz cx="12192000" cy="6858000"/>
   <p:notesSz cx="6858000" cy="9144000"/>
@@ -3814,196 +3821,6 @@
 <file path=ppt/slides/slide10.xml><?xml version="1.0" encoding="utf-8"?>
 <p:sld xmlns:a="http://schemas.openxmlformats.org/drawingml/2006/main" xmlns:r="http://schemas.openxmlformats.org/officeDocument/2006/relationships" xmlns:p="http://schemas.openxmlformats.org/presentationml/2006/main">
   <p:cSld>
-    <p:spTree>
-      <p:nvGrpSpPr>
-        <p:cNvPr id="1" name=""/>
-        <p:cNvGrpSpPr/>
-        <p:nvPr/>
-      </p:nvGrpSpPr>
-      <p:grpSpPr>
-        <a:xfrm>
-          <a:off x="0" y="0"/>
-          <a:ext cx="0" cy="0"/>
-          <a:chOff x="0" y="0"/>
-          <a:chExt cx="0" cy="0"/>
-        </a:xfrm>
-      </p:grpSpPr>
-      <p:sp>
-        <p:nvSpPr>
-          <p:cNvPr id="2" name="Title 1">
-            <a:extLst>
-              <a:ext uri="{FF2B5EF4-FFF2-40B4-BE49-F238E27FC236}">
-                <a16:creationId xmlns:a16="http://schemas.microsoft.com/office/drawing/2014/main" id="{8A26F4CD-BFCB-482D-B8EA-8D40F40063FB}"/>
-              </a:ext>
-            </a:extLst>
-          </p:cNvPr>
-          <p:cNvSpPr>
-            <a:spLocks noGrp="1"/>
-          </p:cNvSpPr>
-          <p:nvPr>
-            <p:ph type="title"/>
-          </p:nvPr>
-        </p:nvSpPr>
-        <p:spPr/>
-        <p:txBody>
-          <a:bodyPr/>
-          <a:lstStyle/>
-          <a:p>
-            <a:r>
-              <a:rPr lang="en-US" dirty="0"/>
-              <a:t>Data Access Class Library</a:t>
-            </a:r>
-          </a:p>
-        </p:txBody>
-      </p:sp>
-      <p:sp>
-        <p:nvSpPr>
-          <p:cNvPr id="3" name="Content Placeholder 2">
-            <a:extLst>
-              <a:ext uri="{FF2B5EF4-FFF2-40B4-BE49-F238E27FC236}">
-                <a16:creationId xmlns:a16="http://schemas.microsoft.com/office/drawing/2014/main" id="{498B5780-5880-42B5-B91E-1786F4F95D4D}"/>
-              </a:ext>
-            </a:extLst>
-          </p:cNvPr>
-          <p:cNvSpPr>
-            <a:spLocks noGrp="1"/>
-          </p:cNvSpPr>
-          <p:nvPr>
-            <p:ph idx="1"/>
-          </p:nvPr>
-        </p:nvSpPr>
-        <p:spPr/>
-        <p:txBody>
-          <a:bodyPr/>
-          <a:lstStyle/>
-          <a:p>
-            <a:pPr marL="0" indent="0">
-              <a:buNone/>
-            </a:pPr>
-            <a:endParaRPr lang="en-US" dirty="0"/>
-          </a:p>
-        </p:txBody>
-      </p:sp>
-    </p:spTree>
-    <p:extLst>
-      <p:ext uri="{BB962C8B-B14F-4D97-AF65-F5344CB8AC3E}">
-        <p14:creationId xmlns:p14="http://schemas.microsoft.com/office/powerpoint/2010/main" val="2026282212"/>
-      </p:ext>
-    </p:extLst>
-  </p:cSld>
-  <p:clrMapOvr>
-    <a:masterClrMapping/>
-  </p:clrMapOvr>
-</p:sld>
-</file>
-
-<file path=ppt/slides/slide11.xml><?xml version="1.0" encoding="utf-8"?>
-<p:sld xmlns:a="http://schemas.openxmlformats.org/drawingml/2006/main" xmlns:r="http://schemas.openxmlformats.org/officeDocument/2006/relationships" xmlns:p="http://schemas.openxmlformats.org/presentationml/2006/main">
-  <p:cSld>
-    <p:spTree>
-      <p:nvGrpSpPr>
-        <p:cNvPr id="1" name=""/>
-        <p:cNvGrpSpPr/>
-        <p:nvPr/>
-      </p:nvGrpSpPr>
-      <p:grpSpPr>
-        <a:xfrm>
-          <a:off x="0" y="0"/>
-          <a:ext cx="0" cy="0"/>
-          <a:chOff x="0" y="0"/>
-          <a:chExt cx="0" cy="0"/>
-        </a:xfrm>
-      </p:grpSpPr>
-      <p:sp>
-        <p:nvSpPr>
-          <p:cNvPr id="2" name="Title 1">
-            <a:extLst>
-              <a:ext uri="{FF2B5EF4-FFF2-40B4-BE49-F238E27FC236}">
-                <a16:creationId xmlns:a16="http://schemas.microsoft.com/office/drawing/2014/main" id="{69A441AF-23C7-4315-B697-3AF01C1C80B8}"/>
-              </a:ext>
-            </a:extLst>
-          </p:cNvPr>
-          <p:cNvSpPr>
-            <a:spLocks noGrp="1"/>
-          </p:cNvSpPr>
-          <p:nvPr>
-            <p:ph type="title"/>
-          </p:nvPr>
-        </p:nvSpPr>
-        <p:spPr/>
-        <p:txBody>
-          <a:bodyPr/>
-          <a:lstStyle/>
-          <a:p>
-            <a:r>
-              <a:rPr lang="en-US" dirty="0"/>
-              <a:t>Classes</a:t>
-            </a:r>
-          </a:p>
-        </p:txBody>
-      </p:sp>
-      <p:sp>
-        <p:nvSpPr>
-          <p:cNvPr id="3" name="Content Placeholder 2">
-            <a:extLst>
-              <a:ext uri="{FF2B5EF4-FFF2-40B4-BE49-F238E27FC236}">
-                <a16:creationId xmlns:a16="http://schemas.microsoft.com/office/drawing/2014/main" id="{86ECB59E-4BA0-4D50-B7DB-E7C2B5144611}"/>
-              </a:ext>
-            </a:extLst>
-          </p:cNvPr>
-          <p:cNvSpPr>
-            <a:spLocks noGrp="1"/>
-          </p:cNvSpPr>
-          <p:nvPr>
-            <p:ph idx="1"/>
-          </p:nvPr>
-        </p:nvSpPr>
-        <p:spPr/>
-        <p:txBody>
-          <a:bodyPr/>
-          <a:lstStyle/>
-          <a:p>
-            <a:r>
-              <a:rPr lang="en-US" dirty="0"/>
-              <a:t>Customer snip</a:t>
-            </a:r>
-          </a:p>
-          <a:p>
-            <a:r>
-              <a:rPr lang="en-US" dirty="0"/>
-              <a:t>Order Snip</a:t>
-            </a:r>
-          </a:p>
-          <a:p>
-            <a:r>
-              <a:rPr lang="en-US" dirty="0"/>
-              <a:t>Location snip</a:t>
-            </a:r>
-          </a:p>
-          <a:p>
-            <a:r>
-              <a:rPr lang="en-US" dirty="0"/>
-              <a:t>Product snip</a:t>
-            </a:r>
-          </a:p>
-        </p:txBody>
-      </p:sp>
-    </p:spTree>
-    <p:extLst>
-      <p:ext uri="{BB962C8B-B14F-4D97-AF65-F5344CB8AC3E}">
-        <p14:creationId xmlns:p14="http://schemas.microsoft.com/office/powerpoint/2010/main" val="4228500909"/>
-      </p:ext>
-    </p:extLst>
-  </p:cSld>
-  <p:clrMapOvr>
-    <a:masterClrMapping/>
-  </p:clrMapOvr>
-</p:sld>
-</file>
-
-<file path=ppt/slides/slide2.xml><?xml version="1.0" encoding="utf-8"?>
-<p:sld xmlns:a="http://schemas.openxmlformats.org/drawingml/2006/main" xmlns:r="http://schemas.openxmlformats.org/officeDocument/2006/relationships" xmlns:p="http://schemas.openxmlformats.org/presentationml/2006/main">
-  <p:cSld>
     <p:bg>
       <p:bgPr>
         <a:solidFill>
@@ -4236,7 +4053,7 @@
           <a:p>
             <a:r>
               <a:rPr lang="en-US" dirty="0"/>
-              <a:t>Functionality</a:t>
+              <a:t>Design</a:t>
             </a:r>
           </a:p>
         </p:txBody>
@@ -4326,7 +4143,7 @@
         </p:spPr>
         <p:txBody>
           <a:bodyPr>
-            <a:normAutofit/>
+            <a:normAutofit fontScale="92500" lnSpcReduction="10000"/>
           </a:bodyPr>
           <a:lstStyle/>
           <a:p>
@@ -4335,11 +4152,13 @@
               <a:buChar char="•"/>
             </a:pPr>
             <a:r>
-              <a:rPr lang="en-US" sz="2200" b="0" i="0">
-                <a:effectLst/>
+              <a:rPr lang="en-US" sz="2200" dirty="0">
+                <a:solidFill>
+                  <a:schemeClr val="accent6"/>
+                </a:solidFill>
                 <a:latin typeface="-apple-system"/>
               </a:rPr>
-              <a:t>place orders to store locations for customers</a:t>
+              <a:t>EF Core w/ Db Approach</a:t>
             </a:r>
           </a:p>
           <a:p>
@@ -4348,12 +4167,108 @@
               <a:buChar char="•"/>
             </a:pPr>
             <a:r>
-              <a:rPr lang="en-US" sz="2200" b="0" i="0">
+              <a:rPr lang="en-US" sz="2200" b="0" i="0" dirty="0">
+                <a:solidFill>
+                  <a:schemeClr val="accent6"/>
+                </a:solidFill>
                 <a:effectLst/>
                 <a:latin typeface="-apple-system"/>
               </a:rPr>
-              <a:t>add a new customer</a:t>
-            </a:r>
+              <a:t>Db 3</a:t>
+            </a:r>
+            <a:r>
+              <a:rPr lang="en-US" sz="2200" baseline="30000" dirty="0">
+                <a:solidFill>
+                  <a:schemeClr val="accent6"/>
+                </a:solidFill>
+                <a:latin typeface="-apple-system"/>
+              </a:rPr>
+              <a:t>rd</a:t>
+            </a:r>
+            <a:r>
+              <a:rPr lang="en-US" sz="2200" dirty="0">
+                <a:solidFill>
+                  <a:schemeClr val="accent6"/>
+                </a:solidFill>
+                <a:latin typeface="-apple-system"/>
+              </a:rPr>
+              <a:t> Normal Form</a:t>
+            </a:r>
+          </a:p>
+          <a:p>
+            <a:r>
+              <a:rPr lang="en-US" sz="2200" b="0" i="0" dirty="0">
+                <a:solidFill>
+                  <a:schemeClr val="accent6"/>
+                </a:solidFill>
+                <a:effectLst/>
+                <a:latin typeface="-apple-system"/>
+              </a:rPr>
+              <a:t>Locations have an inventory</a:t>
+            </a:r>
+          </a:p>
+          <a:p>
+            <a:r>
+              <a:rPr lang="en-US" sz="2200" dirty="0">
+                <a:solidFill>
+                  <a:schemeClr val="accent6"/>
+                </a:solidFill>
+                <a:latin typeface="-apple-system"/>
+              </a:rPr>
+              <a:t>“Solution Design”</a:t>
+            </a:r>
+          </a:p>
+          <a:p>
+            <a:pPr lvl="1"/>
+            <a:r>
+              <a:rPr lang="en-US" sz="1800" b="0" i="0" dirty="0">
+                <a:solidFill>
+                  <a:schemeClr val="accent6"/>
+                </a:solidFill>
+                <a:effectLst/>
+                <a:latin typeface="-apple-system"/>
+              </a:rPr>
+              <a:t>Domain classes</a:t>
+            </a:r>
+          </a:p>
+          <a:p>
+            <a:pPr lvl="1"/>
+            <a:r>
+              <a:rPr lang="en-US" sz="1800" dirty="0">
+                <a:solidFill>
+                  <a:schemeClr val="accent6"/>
+                </a:solidFill>
+                <a:latin typeface="-apple-system"/>
+              </a:rPr>
+              <a:t>Db Access library</a:t>
+            </a:r>
+          </a:p>
+          <a:p>
+            <a:pPr lvl="1"/>
+            <a:r>
+              <a:rPr lang="en-US" sz="1800" dirty="0" err="1">
+                <a:solidFill>
+                  <a:schemeClr val="accent4"/>
+                </a:solidFill>
+                <a:latin typeface="-apple-system"/>
+              </a:rPr>
+              <a:t>BusLogic</a:t>
+            </a:r>
+            <a:r>
+              <a:rPr lang="en-US" sz="1800" dirty="0">
+                <a:solidFill>
+                  <a:schemeClr val="accent4"/>
+                </a:solidFill>
+                <a:latin typeface="-apple-system"/>
+              </a:rPr>
+              <a:t> project</a:t>
+            </a:r>
+            <a:endParaRPr lang="en-US" sz="1800" dirty="0">
+              <a:solidFill>
+                <a:schemeClr val="accent6"/>
+              </a:solidFill>
+              <a:latin typeface="-apple-system"/>
+            </a:endParaRPr>
           </a:p>
           <a:p>
             <a:pPr>
@@ -4361,11 +4276,26 @@
               <a:buChar char="•"/>
             </a:pPr>
             <a:r>
-              <a:rPr lang="en-US" sz="2200" b="0" i="0">
+              <a:rPr lang="en-US" sz="2200" b="0" i="0" dirty="0">
+                <a:solidFill>
+                  <a:schemeClr val="accent4"/>
+                </a:solidFill>
                 <a:effectLst/>
                 <a:latin typeface="-apple-system"/>
               </a:rPr>
-              <a:t>search customers by name</a:t>
+              <a:t>Interfaces for helper classes</a:t>
+            </a:r>
+          </a:p>
+          <a:p>
+            <a:r>
+              <a:rPr lang="en-US" sz="2200" b="0" i="0" dirty="0">
+                <a:solidFill>
+                  <a:schemeClr val="accent4"/>
+                </a:solidFill>
+                <a:effectLst/>
+                <a:latin typeface="-apple-system"/>
+              </a:rPr>
+              <a:t>persistent data (to a DB); no hardcoding of data.(prices, customers, order history, etc.)</a:t>
             </a:r>
           </a:p>
           <a:p>
@@ -4374,11 +4304,23 @@
               <a:buChar char="•"/>
             </a:pPr>
             <a:r>
-              <a:rPr lang="en-US" sz="2200" b="0" i="0">
+              <a:rPr lang="en-US" sz="2200" b="0" i="0" dirty="0">
+                <a:solidFill>
+                  <a:srgbClr val="C00000"/>
+                </a:solidFill>
                 <a:effectLst/>
                 <a:latin typeface="-apple-system"/>
               </a:rPr>
-              <a:t>display details of an order</a:t>
+              <a:t>XML</a:t>
+            </a:r>
+            <a:r>
+              <a:rPr lang="en-US" sz="2200" dirty="0">
+                <a:solidFill>
+                  <a:srgbClr val="C00000"/>
+                </a:solidFill>
+                <a:latin typeface="-apple-system"/>
+              </a:rPr>
+              <a:t> comments</a:t>
             </a:r>
           </a:p>
           <a:p>
@@ -4387,12 +4329,32 @@
               <a:buChar char="•"/>
             </a:pPr>
             <a:r>
-              <a:rPr lang="en-US" sz="2200" b="0" i="0">
+              <a:rPr lang="en-US" sz="2200" b="0" i="0" dirty="0">
+                <a:solidFill>
+                  <a:srgbClr val="C00000"/>
+                </a:solidFill>
                 <a:effectLst/>
                 <a:latin typeface="-apple-system"/>
               </a:rPr>
-              <a:t>display all order history of a store location</a:t>
-            </a:r>
+              <a:t>Inventory </a:t>
+            </a:r>
+            <a:r>
+              <a:rPr lang="en-US" sz="2200" b="0" i="0" dirty="0" err="1">
+                <a:solidFill>
+                  <a:srgbClr val="C00000"/>
+                </a:solidFill>
+                <a:effectLst/>
+                <a:latin typeface="-apple-system"/>
+              </a:rPr>
+              <a:t>deprementation</a:t>
+            </a:r>
+            <a:endParaRPr lang="en-US" sz="2200" b="0" i="0" dirty="0">
+              <a:solidFill>
+                <a:srgbClr val="C00000"/>
+              </a:solidFill>
+              <a:effectLst/>
+              <a:latin typeface="-apple-system"/>
+            </a:endParaRPr>
           </a:p>
           <a:p>
             <a:pPr>
@@ -4400,64 +4362,34 @@
               <a:buChar char="•"/>
             </a:pPr>
             <a:r>
-              <a:rPr lang="en-US" sz="2200" b="0" i="0">
-                <a:effectLst/>
+              <a:rPr lang="en-US" sz="2200" dirty="0">
+                <a:solidFill>
+                  <a:srgbClr val="C00000"/>
+                </a:solidFill>
                 <a:latin typeface="-apple-system"/>
               </a:rPr>
-              <a:t>display all order history of a customer</a:t>
-            </a:r>
-          </a:p>
-          <a:p>
-            <a:pPr>
-              <a:buFont typeface="Arial" panose="020B0604020202020204" pitchFamily="34" charset="0"/>
-              <a:buChar char="•"/>
-            </a:pPr>
-            <a:r>
-              <a:rPr lang="en-US" sz="2200" b="0" i="0">
-                <a:effectLst/>
-                <a:latin typeface="-apple-system"/>
-              </a:rPr>
-              <a:t>input validation</a:t>
-            </a:r>
-          </a:p>
-          <a:p>
-            <a:pPr>
-              <a:buFont typeface="Arial" panose="020B0604020202020204" pitchFamily="34" charset="0"/>
-              <a:buChar char="•"/>
-            </a:pPr>
-            <a:r>
-              <a:rPr lang="en-US" sz="2200" b="0" i="0">
-                <a:effectLst/>
-                <a:latin typeface="-apple-system"/>
-              </a:rPr>
-              <a:t>exception handling</a:t>
-            </a:r>
-          </a:p>
-          <a:p>
-            <a:pPr>
-              <a:buFont typeface="Arial" panose="020B0604020202020204" pitchFamily="34" charset="0"/>
-              <a:buChar char="•"/>
-            </a:pPr>
-            <a:r>
-              <a:rPr lang="en-US" sz="2200" b="0" i="0">
-                <a:effectLst/>
-                <a:latin typeface="-apple-system"/>
-              </a:rPr>
-              <a:t>persistent data (to a DB); no hardcoding of data.(prices, customers, order history, etc.)</a:t>
-            </a:r>
+              <a:t>10 Unit testing methods</a:t>
+            </a:r>
+            <a:endParaRPr lang="en-US" sz="2200" b="0" i="0" dirty="0">
+              <a:solidFill>
+                <a:srgbClr val="C00000"/>
+              </a:solidFill>
+              <a:effectLst/>
+              <a:latin typeface="-apple-system"/>
+            </a:endParaRPr>
           </a:p>
           <a:p>
             <a:pPr marL="0" indent="0">
               <a:buNone/>
             </a:pPr>
-            <a:endParaRPr lang="en-US" sz="2200"/>
+            <a:endParaRPr lang="en-US" sz="2200" dirty="0"/>
           </a:p>
         </p:txBody>
       </p:sp>
     </p:spTree>
     <p:extLst>
       <p:ext uri="{BB962C8B-B14F-4D97-AF65-F5344CB8AC3E}">
-        <p14:creationId xmlns:p14="http://schemas.microsoft.com/office/powerpoint/2010/main" val="1094602162"/>
+        <p14:creationId xmlns:p14="http://schemas.microsoft.com/office/powerpoint/2010/main" val="3274383637"/>
       </p:ext>
     </p:extLst>
   </p:cSld>
@@ -4467,7 +4399,560 @@
 </p:sld>
 </file>
 
-<file path=ppt/slides/slide3.xml><?xml version="1.0" encoding="utf-8"?>
+<file path=ppt/slides/slide11.xml><?xml version="1.0" encoding="utf-8"?>
+<p:sld xmlns:a="http://schemas.openxmlformats.org/drawingml/2006/main" xmlns:r="http://schemas.openxmlformats.org/officeDocument/2006/relationships" xmlns:p="http://schemas.openxmlformats.org/presentationml/2006/main">
+  <p:cSld>
+    <p:spTree>
+      <p:nvGrpSpPr>
+        <p:cNvPr id="1" name=""/>
+        <p:cNvGrpSpPr/>
+        <p:nvPr/>
+      </p:nvGrpSpPr>
+      <p:grpSpPr>
+        <a:xfrm>
+          <a:off x="0" y="0"/>
+          <a:ext cx="0" cy="0"/>
+          <a:chOff x="0" y="0"/>
+          <a:chExt cx="0" cy="0"/>
+        </a:xfrm>
+      </p:grpSpPr>
+      <p:sp>
+        <p:nvSpPr>
+          <p:cNvPr id="2" name="Title 1">
+            <a:extLst>
+              <a:ext uri="{FF2B5EF4-FFF2-40B4-BE49-F238E27FC236}">
+                <a16:creationId xmlns:a16="http://schemas.microsoft.com/office/drawing/2014/main" id="{49C735E6-F3E2-4C7D-BEFD-D14D795BD513}"/>
+              </a:ext>
+            </a:extLst>
+          </p:cNvPr>
+          <p:cNvSpPr>
+            <a:spLocks noGrp="1"/>
+          </p:cNvSpPr>
+          <p:nvPr>
+            <p:ph type="title"/>
+          </p:nvPr>
+        </p:nvSpPr>
+        <p:spPr/>
+        <p:txBody>
+          <a:bodyPr/>
+          <a:lstStyle/>
+          <a:p>
+            <a:r>
+              <a:rPr lang="en-US" dirty="0">
+                <a:solidFill>
+                  <a:schemeClr val="accent6"/>
+                </a:solidFill>
+              </a:rPr>
+              <a:t>EF Core w/ Db 1</a:t>
+            </a:r>
+            <a:r>
+              <a:rPr lang="en-US" baseline="30000" dirty="0">
+                <a:solidFill>
+                  <a:schemeClr val="accent6"/>
+                </a:solidFill>
+              </a:rPr>
+              <a:t>st</a:t>
+            </a:r>
+            <a:r>
+              <a:rPr lang="en-US" dirty="0">
+                <a:solidFill>
+                  <a:schemeClr val="accent6"/>
+                </a:solidFill>
+              </a:rPr>
+              <a:t> Approach</a:t>
+            </a:r>
+          </a:p>
+        </p:txBody>
+      </p:sp>
+      <p:sp>
+        <p:nvSpPr>
+          <p:cNvPr id="4" name="Content Placeholder 3">
+            <a:extLst>
+              <a:ext uri="{FF2B5EF4-FFF2-40B4-BE49-F238E27FC236}">
+                <a16:creationId xmlns:a16="http://schemas.microsoft.com/office/drawing/2014/main" id="{28E17A24-B23D-4F9E-B65F-7CB82BF5184D}"/>
+              </a:ext>
+            </a:extLst>
+          </p:cNvPr>
+          <p:cNvSpPr>
+            <a:spLocks noGrp="1"/>
+          </p:cNvSpPr>
+          <p:nvPr>
+            <p:ph idx="1"/>
+          </p:nvPr>
+        </p:nvSpPr>
+        <p:spPr>
+          <a:xfrm>
+            <a:off x="838200" y="1825624"/>
+            <a:ext cx="2482341" cy="4351338"/>
+          </a:xfrm>
+        </p:spPr>
+        <p:txBody>
+          <a:bodyPr/>
+          <a:lstStyle/>
+          <a:p>
+            <a:r>
+              <a:rPr lang="en-US" dirty="0"/>
+              <a:t>P0DbContext repo contains full Model builder</a:t>
+            </a:r>
+          </a:p>
+          <a:p>
+            <a:endParaRPr lang="en-US" dirty="0"/>
+          </a:p>
+        </p:txBody>
+      </p:sp>
+      <p:pic>
+        <p:nvPicPr>
+          <p:cNvPr id="9" name="Picture 8">
+            <a:extLst>
+              <a:ext uri="{FF2B5EF4-FFF2-40B4-BE49-F238E27FC236}">
+                <a16:creationId xmlns:a16="http://schemas.microsoft.com/office/drawing/2014/main" id="{BE623E61-484E-4A2A-A171-3F141B27A156}"/>
+              </a:ext>
+            </a:extLst>
+          </p:cNvPr>
+          <p:cNvPicPr>
+            <a:picLocks noChangeAspect="1"/>
+          </p:cNvPicPr>
+          <p:nvPr/>
+        </p:nvPicPr>
+        <p:blipFill>
+          <a:blip r:embed="rId2"/>
+          <a:stretch>
+            <a:fillRect/>
+          </a:stretch>
+        </p:blipFill>
+        <p:spPr>
+          <a:xfrm>
+            <a:off x="4555066" y="1281544"/>
+            <a:ext cx="6968067" cy="5439499"/>
+          </a:xfrm>
+          <a:prstGeom prst="rect">
+            <a:avLst/>
+          </a:prstGeom>
+        </p:spPr>
+      </p:pic>
+    </p:spTree>
+    <p:extLst>
+      <p:ext uri="{BB962C8B-B14F-4D97-AF65-F5344CB8AC3E}">
+        <p14:creationId xmlns:p14="http://schemas.microsoft.com/office/powerpoint/2010/main" val="1139084455"/>
+      </p:ext>
+    </p:extLst>
+  </p:cSld>
+  <p:clrMapOvr>
+    <a:masterClrMapping/>
+  </p:clrMapOvr>
+</p:sld>
+</file>
+
+<file path=ppt/slides/slide12.xml><?xml version="1.0" encoding="utf-8"?>
+<p:sld xmlns:a="http://schemas.openxmlformats.org/drawingml/2006/main" xmlns:r="http://schemas.openxmlformats.org/officeDocument/2006/relationships" xmlns:p="http://schemas.openxmlformats.org/presentationml/2006/main">
+  <p:cSld>
+    <p:spTree>
+      <p:nvGrpSpPr>
+        <p:cNvPr id="1" name=""/>
+        <p:cNvGrpSpPr/>
+        <p:nvPr/>
+      </p:nvGrpSpPr>
+      <p:grpSpPr>
+        <a:xfrm>
+          <a:off x="0" y="0"/>
+          <a:ext cx="0" cy="0"/>
+          <a:chOff x="0" y="0"/>
+          <a:chExt cx="0" cy="0"/>
+        </a:xfrm>
+      </p:grpSpPr>
+      <p:sp>
+        <p:nvSpPr>
+          <p:cNvPr id="2" name="Title 1">
+            <a:extLst>
+              <a:ext uri="{FF2B5EF4-FFF2-40B4-BE49-F238E27FC236}">
+                <a16:creationId xmlns:a16="http://schemas.microsoft.com/office/drawing/2014/main" id="{49C735E6-F3E2-4C7D-BEFD-D14D795BD513}"/>
+              </a:ext>
+            </a:extLst>
+          </p:cNvPr>
+          <p:cNvSpPr>
+            <a:spLocks noGrp="1"/>
+          </p:cNvSpPr>
+          <p:nvPr>
+            <p:ph type="title"/>
+          </p:nvPr>
+        </p:nvSpPr>
+        <p:spPr/>
+        <p:txBody>
+          <a:bodyPr/>
+          <a:lstStyle/>
+          <a:p>
+            <a:r>
+              <a:rPr lang="en-US" dirty="0">
+                <a:solidFill>
+                  <a:schemeClr val="accent6"/>
+                </a:solidFill>
+              </a:rPr>
+              <a:t>3NF</a:t>
+            </a:r>
+          </a:p>
+        </p:txBody>
+      </p:sp>
+      <p:pic>
+        <p:nvPicPr>
+          <p:cNvPr id="10" name="Content Placeholder 9">
+            <a:extLst>
+              <a:ext uri="{FF2B5EF4-FFF2-40B4-BE49-F238E27FC236}">
+                <a16:creationId xmlns:a16="http://schemas.microsoft.com/office/drawing/2014/main" id="{80D67C7D-C832-4800-8CEE-C201EDA72CBE}"/>
+              </a:ext>
+            </a:extLst>
+          </p:cNvPr>
+          <p:cNvPicPr>
+            <a:picLocks noGrp="1" noChangeAspect="1"/>
+          </p:cNvPicPr>
+          <p:nvPr>
+            <p:ph idx="1"/>
+          </p:nvPr>
+        </p:nvPicPr>
+        <p:blipFill>
+          <a:blip r:embed="rId2"/>
+          <a:stretch>
+            <a:fillRect/>
+          </a:stretch>
+        </p:blipFill>
+        <p:spPr>
+          <a:xfrm>
+            <a:off x="2803293" y="746740"/>
+            <a:ext cx="8550507" cy="5552459"/>
+          </a:xfrm>
+        </p:spPr>
+      </p:pic>
+    </p:spTree>
+    <p:extLst>
+      <p:ext uri="{BB962C8B-B14F-4D97-AF65-F5344CB8AC3E}">
+        <p14:creationId xmlns:p14="http://schemas.microsoft.com/office/powerpoint/2010/main" val="3735348199"/>
+      </p:ext>
+    </p:extLst>
+  </p:cSld>
+  <p:clrMapOvr>
+    <a:masterClrMapping/>
+  </p:clrMapOvr>
+</p:sld>
+</file>
+
+<file path=ppt/slides/slide13.xml><?xml version="1.0" encoding="utf-8"?>
+<p:sld xmlns:a="http://schemas.openxmlformats.org/drawingml/2006/main" xmlns:r="http://schemas.openxmlformats.org/officeDocument/2006/relationships" xmlns:p="http://schemas.openxmlformats.org/presentationml/2006/main">
+  <p:cSld>
+    <p:spTree>
+      <p:nvGrpSpPr>
+        <p:cNvPr id="1" name=""/>
+        <p:cNvGrpSpPr/>
+        <p:nvPr/>
+      </p:nvGrpSpPr>
+      <p:grpSpPr>
+        <a:xfrm>
+          <a:off x="0" y="0"/>
+          <a:ext cx="0" cy="0"/>
+          <a:chOff x="0" y="0"/>
+          <a:chExt cx="0" cy="0"/>
+        </a:xfrm>
+      </p:grpSpPr>
+      <p:sp>
+        <p:nvSpPr>
+          <p:cNvPr id="2" name="Title 1">
+            <a:extLst>
+              <a:ext uri="{FF2B5EF4-FFF2-40B4-BE49-F238E27FC236}">
+                <a16:creationId xmlns:a16="http://schemas.microsoft.com/office/drawing/2014/main" id="{8A26F4CD-BFCB-482D-B8EA-8D40F40063FB}"/>
+              </a:ext>
+            </a:extLst>
+          </p:cNvPr>
+          <p:cNvSpPr>
+            <a:spLocks noGrp="1"/>
+          </p:cNvSpPr>
+          <p:nvPr>
+            <p:ph type="title"/>
+          </p:nvPr>
+        </p:nvSpPr>
+        <p:spPr/>
+        <p:txBody>
+          <a:bodyPr/>
+          <a:lstStyle/>
+          <a:p>
+            <a:r>
+              <a:rPr lang="en-US" sz="4400" b="0" i="0" dirty="0">
+                <a:solidFill>
+                  <a:schemeClr val="accent6"/>
+                </a:solidFill>
+                <a:effectLst/>
+                <a:latin typeface="-apple-system"/>
+              </a:rPr>
+              <a:t>Locations have an inventory</a:t>
+            </a:r>
+          </a:p>
+        </p:txBody>
+      </p:sp>
+      <p:pic>
+        <p:nvPicPr>
+          <p:cNvPr id="8" name="Content Placeholder 7">
+            <a:extLst>
+              <a:ext uri="{FF2B5EF4-FFF2-40B4-BE49-F238E27FC236}">
+                <a16:creationId xmlns:a16="http://schemas.microsoft.com/office/drawing/2014/main" id="{3A81C12B-FC64-4B52-9C46-C1002C149DE3}"/>
+              </a:ext>
+            </a:extLst>
+          </p:cNvPr>
+          <p:cNvPicPr>
+            <a:picLocks noGrp="1" noChangeAspect="1"/>
+          </p:cNvPicPr>
+          <p:nvPr>
+            <p:ph idx="1"/>
+          </p:nvPr>
+        </p:nvPicPr>
+        <p:blipFill>
+          <a:blip r:embed="rId2"/>
+          <a:stretch>
+            <a:fillRect/>
+          </a:stretch>
+        </p:blipFill>
+        <p:spPr>
+          <a:xfrm>
+            <a:off x="838199" y="1621982"/>
+            <a:ext cx="8271933" cy="4575606"/>
+          </a:xfrm>
+        </p:spPr>
+      </p:pic>
+    </p:spTree>
+    <p:extLst>
+      <p:ext uri="{BB962C8B-B14F-4D97-AF65-F5344CB8AC3E}">
+        <p14:creationId xmlns:p14="http://schemas.microsoft.com/office/powerpoint/2010/main" val="913143922"/>
+      </p:ext>
+    </p:extLst>
+  </p:cSld>
+  <p:clrMapOvr>
+    <a:masterClrMapping/>
+  </p:clrMapOvr>
+</p:sld>
+</file>
+
+<file path=ppt/slides/slide14.xml><?xml version="1.0" encoding="utf-8"?>
+<p:sld xmlns:a="http://schemas.openxmlformats.org/drawingml/2006/main" xmlns:r="http://schemas.openxmlformats.org/officeDocument/2006/relationships" xmlns:p="http://schemas.openxmlformats.org/presentationml/2006/main">
+  <p:cSld>
+    <p:spTree>
+      <p:nvGrpSpPr>
+        <p:cNvPr id="1" name=""/>
+        <p:cNvGrpSpPr/>
+        <p:nvPr/>
+      </p:nvGrpSpPr>
+      <p:grpSpPr>
+        <a:xfrm>
+          <a:off x="0" y="0"/>
+          <a:ext cx="0" cy="0"/>
+          <a:chOff x="0" y="0"/>
+          <a:chExt cx="0" cy="0"/>
+        </a:xfrm>
+      </p:grpSpPr>
+      <p:sp>
+        <p:nvSpPr>
+          <p:cNvPr id="2" name="Title 1">
+            <a:extLst>
+              <a:ext uri="{FF2B5EF4-FFF2-40B4-BE49-F238E27FC236}">
+                <a16:creationId xmlns:a16="http://schemas.microsoft.com/office/drawing/2014/main" id="{8A26F4CD-BFCB-482D-B8EA-8D40F40063FB}"/>
+              </a:ext>
+            </a:extLst>
+          </p:cNvPr>
+          <p:cNvSpPr>
+            <a:spLocks noGrp="1"/>
+          </p:cNvSpPr>
+          <p:nvPr>
+            <p:ph type="title"/>
+          </p:nvPr>
+        </p:nvSpPr>
+        <p:spPr/>
+        <p:txBody>
+          <a:bodyPr/>
+          <a:lstStyle/>
+          <a:p>
+            <a:r>
+              <a:rPr lang="en-US" sz="4400" b="0" i="0" dirty="0">
+                <a:solidFill>
+                  <a:schemeClr val="accent6"/>
+                </a:solidFill>
+                <a:effectLst/>
+                <a:latin typeface="-apple-system"/>
+              </a:rPr>
+              <a:t>Locations have an inventory</a:t>
+            </a:r>
+          </a:p>
+        </p:txBody>
+      </p:sp>
+      <p:pic>
+        <p:nvPicPr>
+          <p:cNvPr id="5" name="Content Placeholder 4">
+            <a:extLst>
+              <a:ext uri="{FF2B5EF4-FFF2-40B4-BE49-F238E27FC236}">
+                <a16:creationId xmlns:a16="http://schemas.microsoft.com/office/drawing/2014/main" id="{144645DD-0C6C-40AD-BD11-99889D69F95C}"/>
+              </a:ext>
+            </a:extLst>
+          </p:cNvPr>
+          <p:cNvPicPr>
+            <a:picLocks noGrp="1" noChangeAspect="1"/>
+          </p:cNvPicPr>
+          <p:nvPr>
+            <p:ph idx="1"/>
+          </p:nvPr>
+        </p:nvPicPr>
+        <p:blipFill rotWithShape="1">
+          <a:blip r:embed="rId2"/>
+          <a:srcRect r="6418"/>
+          <a:stretch/>
+        </p:blipFill>
+        <p:spPr>
+          <a:xfrm>
+            <a:off x="54551" y="1367232"/>
+            <a:ext cx="5925590" cy="4818035"/>
+          </a:xfrm>
+        </p:spPr>
+      </p:pic>
+      <p:pic>
+        <p:nvPicPr>
+          <p:cNvPr id="7" name="Picture 6">
+            <a:extLst>
+              <a:ext uri="{FF2B5EF4-FFF2-40B4-BE49-F238E27FC236}">
+                <a16:creationId xmlns:a16="http://schemas.microsoft.com/office/drawing/2014/main" id="{2A31BE37-A996-4B19-A1FF-D624C9B08EB3}"/>
+              </a:ext>
+            </a:extLst>
+          </p:cNvPr>
+          <p:cNvPicPr>
+            <a:picLocks noChangeAspect="1"/>
+          </p:cNvPicPr>
+          <p:nvPr/>
+        </p:nvPicPr>
+        <p:blipFill rotWithShape="1">
+          <a:blip r:embed="rId3"/>
+          <a:srcRect l="-2321" t="-4142" r="7996" b="4142"/>
+          <a:stretch/>
+        </p:blipFill>
+        <p:spPr>
+          <a:xfrm>
+            <a:off x="5852637" y="1206611"/>
+            <a:ext cx="6192505" cy="4978656"/>
+          </a:xfrm>
+          <a:prstGeom prst="rect">
+            <a:avLst/>
+          </a:prstGeom>
+        </p:spPr>
+      </p:pic>
+      <p:sp>
+        <p:nvSpPr>
+          <p:cNvPr id="9" name="Rectangle 8">
+            <a:extLst>
+              <a:ext uri="{FF2B5EF4-FFF2-40B4-BE49-F238E27FC236}">
+                <a16:creationId xmlns:a16="http://schemas.microsoft.com/office/drawing/2014/main" id="{0F113BA0-EFB0-41E2-8DCF-B6BF0BD64DB8}"/>
+              </a:ext>
+            </a:extLst>
+          </p:cNvPr>
+          <p:cNvSpPr/>
+          <p:nvPr/>
+        </p:nvSpPr>
+        <p:spPr>
+          <a:xfrm>
+            <a:off x="-48127" y="3578002"/>
+            <a:ext cx="5231322" cy="135467"/>
+          </a:xfrm>
+          <a:prstGeom prst="rect">
+            <a:avLst/>
+          </a:prstGeom>
+          <a:noFill/>
+          <a:ln>
+            <a:solidFill>
+              <a:srgbClr val="FF0000"/>
+            </a:solidFill>
+          </a:ln>
+        </p:spPr>
+        <p:style>
+          <a:lnRef idx="2">
+            <a:schemeClr val="accent1">
+              <a:shade val="50000"/>
+            </a:schemeClr>
+          </a:lnRef>
+          <a:fillRef idx="1">
+            <a:schemeClr val="accent1"/>
+          </a:fillRef>
+          <a:effectRef idx="0">
+            <a:schemeClr val="accent1"/>
+          </a:effectRef>
+          <a:fontRef idx="minor">
+            <a:schemeClr val="lt1"/>
+          </a:fontRef>
+        </p:style>
+        <p:txBody>
+          <a:bodyPr rtlCol="0" anchor="ctr"/>
+          <a:lstStyle/>
+          <a:p>
+            <a:pPr algn="ctr"/>
+            <a:endParaRPr lang="en-US"/>
+          </a:p>
+        </p:txBody>
+      </p:sp>
+      <p:sp>
+        <p:nvSpPr>
+          <p:cNvPr id="10" name="Rectangle 9">
+            <a:extLst>
+              <a:ext uri="{FF2B5EF4-FFF2-40B4-BE49-F238E27FC236}">
+                <a16:creationId xmlns:a16="http://schemas.microsoft.com/office/drawing/2014/main" id="{4E252113-EAE8-4185-9E19-4BABBFD72A4C}"/>
+              </a:ext>
+            </a:extLst>
+          </p:cNvPr>
+          <p:cNvSpPr/>
+          <p:nvPr/>
+        </p:nvSpPr>
+        <p:spPr>
+          <a:xfrm>
+            <a:off x="5980141" y="3713469"/>
+            <a:ext cx="5747034" cy="135467"/>
+          </a:xfrm>
+          <a:prstGeom prst="rect">
+            <a:avLst/>
+          </a:prstGeom>
+          <a:noFill/>
+          <a:ln>
+            <a:solidFill>
+              <a:srgbClr val="FF0000"/>
+            </a:solidFill>
+          </a:ln>
+        </p:spPr>
+        <p:style>
+          <a:lnRef idx="2">
+            <a:schemeClr val="accent1">
+              <a:shade val="50000"/>
+            </a:schemeClr>
+          </a:lnRef>
+          <a:fillRef idx="1">
+            <a:schemeClr val="accent1"/>
+          </a:fillRef>
+          <a:effectRef idx="0">
+            <a:schemeClr val="accent1"/>
+          </a:effectRef>
+          <a:fontRef idx="minor">
+            <a:schemeClr val="lt1"/>
+          </a:fontRef>
+        </p:style>
+        <p:txBody>
+          <a:bodyPr rtlCol="0" anchor="ctr"/>
+          <a:lstStyle/>
+          <a:p>
+            <a:pPr algn="ctr"/>
+            <a:endParaRPr lang="en-US"/>
+          </a:p>
+        </p:txBody>
+      </p:sp>
+    </p:spTree>
+    <p:extLst>
+      <p:ext uri="{BB962C8B-B14F-4D97-AF65-F5344CB8AC3E}">
+        <p14:creationId xmlns:p14="http://schemas.microsoft.com/office/powerpoint/2010/main" val="2026282212"/>
+      </p:ext>
+    </p:extLst>
+  </p:cSld>
+  <p:clrMapOvr>
+    <a:masterClrMapping/>
+  </p:clrMapOvr>
+</p:sld>
+</file>
+
+<file path=ppt/slides/slide15.xml><?xml version="1.0" encoding="utf-8"?>
 <p:sld xmlns:a="http://schemas.openxmlformats.org/drawingml/2006/main" xmlns:r="http://schemas.openxmlformats.org/officeDocument/2006/relationships" xmlns:p="http://schemas.openxmlformats.org/presentationml/2006/main">
   <p:cSld>
     <p:bg>
@@ -4702,7 +5187,7 @@
           <a:p>
             <a:r>
               <a:rPr lang="en-US" dirty="0"/>
-              <a:t>Functionality</a:t>
+              <a:t>Solution Design</a:t>
             </a:r>
           </a:p>
         </p:txBody>
@@ -4768,6 +5253,653 @@
           </a:p>
         </p:txBody>
       </p:sp>
+      <p:pic>
+        <p:nvPicPr>
+          <p:cNvPr id="5" name="Content Placeholder 4">
+            <a:extLst>
+              <a:ext uri="{FF2B5EF4-FFF2-40B4-BE49-F238E27FC236}">
+                <a16:creationId xmlns:a16="http://schemas.microsoft.com/office/drawing/2014/main" id="{91936902-80E5-42EE-A914-1041CA1651B1}"/>
+              </a:ext>
+            </a:extLst>
+          </p:cNvPr>
+          <p:cNvPicPr>
+            <a:picLocks noGrp="1" noChangeAspect="1"/>
+          </p:cNvPicPr>
+          <p:nvPr>
+            <p:ph idx="1"/>
+          </p:nvPr>
+        </p:nvPicPr>
+        <p:blipFill>
+          <a:blip r:embed="rId2"/>
+          <a:stretch>
+            <a:fillRect/>
+          </a:stretch>
+        </p:blipFill>
+        <p:spPr>
+          <a:xfrm>
+            <a:off x="1205817" y="1698241"/>
+            <a:ext cx="2657671" cy="4351338"/>
+          </a:xfrm>
+        </p:spPr>
+      </p:pic>
+    </p:spTree>
+    <p:extLst>
+      <p:ext uri="{BB962C8B-B14F-4D97-AF65-F5344CB8AC3E}">
+        <p14:creationId xmlns:p14="http://schemas.microsoft.com/office/powerpoint/2010/main" val="4054503862"/>
+      </p:ext>
+    </p:extLst>
+  </p:cSld>
+  <p:clrMapOvr>
+    <a:masterClrMapping/>
+  </p:clrMapOvr>
+</p:sld>
+</file>
+
+<file path=ppt/slides/slide16.xml><?xml version="1.0" encoding="utf-8"?>
+<p:sld xmlns:a="http://schemas.openxmlformats.org/drawingml/2006/main" xmlns:r="http://schemas.openxmlformats.org/officeDocument/2006/relationships" xmlns:p="http://schemas.openxmlformats.org/presentationml/2006/main">
+  <p:cSld>
+    <p:spTree>
+      <p:nvGrpSpPr>
+        <p:cNvPr id="1" name=""/>
+        <p:cNvGrpSpPr/>
+        <p:nvPr/>
+      </p:nvGrpSpPr>
+      <p:grpSpPr>
+        <a:xfrm>
+          <a:off x="0" y="0"/>
+          <a:ext cx="0" cy="0"/>
+          <a:chOff x="0" y="0"/>
+          <a:chExt cx="0" cy="0"/>
+        </a:xfrm>
+      </p:grpSpPr>
+      <p:sp>
+        <p:nvSpPr>
+          <p:cNvPr id="2" name="Title 1">
+            <a:extLst>
+              <a:ext uri="{FF2B5EF4-FFF2-40B4-BE49-F238E27FC236}">
+                <a16:creationId xmlns:a16="http://schemas.microsoft.com/office/drawing/2014/main" id="{49C735E6-F3E2-4C7D-BEFD-D14D795BD513}"/>
+              </a:ext>
+            </a:extLst>
+          </p:cNvPr>
+          <p:cNvSpPr>
+            <a:spLocks noGrp="1"/>
+          </p:cNvSpPr>
+          <p:nvPr>
+            <p:ph type="title"/>
+          </p:nvPr>
+        </p:nvSpPr>
+        <p:spPr/>
+        <p:txBody>
+          <a:bodyPr/>
+          <a:lstStyle/>
+          <a:p>
+            <a:r>
+              <a:rPr lang="en-US" dirty="0">
+                <a:solidFill>
+                  <a:schemeClr val="accent4"/>
+                </a:solidFill>
+              </a:rPr>
+              <a:t>Interfaces</a:t>
+            </a:r>
+          </a:p>
+        </p:txBody>
+      </p:sp>
+      <p:pic>
+        <p:nvPicPr>
+          <p:cNvPr id="8" name="Content Placeholder 7">
+            <a:extLst>
+              <a:ext uri="{FF2B5EF4-FFF2-40B4-BE49-F238E27FC236}">
+                <a16:creationId xmlns:a16="http://schemas.microsoft.com/office/drawing/2014/main" id="{96EDF869-4375-4055-AF1D-E2DDE2E28CFF}"/>
+              </a:ext>
+            </a:extLst>
+          </p:cNvPr>
+          <p:cNvPicPr>
+            <a:picLocks noGrp="1" noChangeAspect="1"/>
+          </p:cNvPicPr>
+          <p:nvPr>
+            <p:ph idx="1"/>
+          </p:nvPr>
+        </p:nvPicPr>
+        <p:blipFill>
+          <a:blip r:embed="rId2"/>
+          <a:stretch>
+            <a:fillRect/>
+          </a:stretch>
+        </p:blipFill>
+        <p:spPr>
+          <a:xfrm>
+            <a:off x="4166365" y="416211"/>
+            <a:ext cx="6644296" cy="6244038"/>
+          </a:xfrm>
+          <a:prstGeom prst="rect">
+            <a:avLst/>
+          </a:prstGeom>
+        </p:spPr>
+      </p:pic>
+    </p:spTree>
+    <p:extLst>
+      <p:ext uri="{BB962C8B-B14F-4D97-AF65-F5344CB8AC3E}">
+        <p14:creationId xmlns:p14="http://schemas.microsoft.com/office/powerpoint/2010/main" val="1362093315"/>
+      </p:ext>
+    </p:extLst>
+  </p:cSld>
+  <p:clrMapOvr>
+    <a:masterClrMapping/>
+  </p:clrMapOvr>
+</p:sld>
+</file>
+
+<file path=ppt/slides/slide17.xml><?xml version="1.0" encoding="utf-8"?>
+<p:sld xmlns:a="http://schemas.openxmlformats.org/drawingml/2006/main" xmlns:r="http://schemas.openxmlformats.org/officeDocument/2006/relationships" xmlns:p="http://schemas.openxmlformats.org/presentationml/2006/main">
+  <p:cSld>
+    <p:spTree>
+      <p:nvGrpSpPr>
+        <p:cNvPr id="1" name=""/>
+        <p:cNvGrpSpPr/>
+        <p:nvPr/>
+      </p:nvGrpSpPr>
+      <p:grpSpPr>
+        <a:xfrm>
+          <a:off x="0" y="0"/>
+          <a:ext cx="0" cy="0"/>
+          <a:chOff x="0" y="0"/>
+          <a:chExt cx="0" cy="0"/>
+        </a:xfrm>
+      </p:grpSpPr>
+      <p:sp>
+        <p:nvSpPr>
+          <p:cNvPr id="2" name="Title 1">
+            <a:extLst>
+              <a:ext uri="{FF2B5EF4-FFF2-40B4-BE49-F238E27FC236}">
+                <a16:creationId xmlns:a16="http://schemas.microsoft.com/office/drawing/2014/main" id="{49C735E6-F3E2-4C7D-BEFD-D14D795BD513}"/>
+              </a:ext>
+            </a:extLst>
+          </p:cNvPr>
+          <p:cNvSpPr>
+            <a:spLocks noGrp="1"/>
+          </p:cNvSpPr>
+          <p:nvPr>
+            <p:ph type="title"/>
+          </p:nvPr>
+        </p:nvSpPr>
+        <p:spPr/>
+        <p:txBody>
+          <a:bodyPr/>
+          <a:lstStyle/>
+          <a:p>
+            <a:r>
+              <a:rPr lang="en-US" dirty="0">
+                <a:solidFill>
+                  <a:schemeClr val="accent4"/>
+                </a:solidFill>
+              </a:rPr>
+              <a:t>Persistent Data</a:t>
+            </a:r>
+          </a:p>
+        </p:txBody>
+      </p:sp>
+      <p:pic>
+        <p:nvPicPr>
+          <p:cNvPr id="7" name="Content Placeholder 6">
+            <a:extLst>
+              <a:ext uri="{FF2B5EF4-FFF2-40B4-BE49-F238E27FC236}">
+                <a16:creationId xmlns:a16="http://schemas.microsoft.com/office/drawing/2014/main" id="{0C1E1915-2CE8-4330-B721-EF48AB884E71}"/>
+              </a:ext>
+            </a:extLst>
+          </p:cNvPr>
+          <p:cNvPicPr>
+            <a:picLocks noGrp="1" noChangeAspect="1"/>
+          </p:cNvPicPr>
+          <p:nvPr>
+            <p:ph idx="1"/>
+          </p:nvPr>
+        </p:nvPicPr>
+        <p:blipFill>
+          <a:blip r:embed="rId2"/>
+          <a:stretch>
+            <a:fillRect/>
+          </a:stretch>
+        </p:blipFill>
+        <p:spPr>
+          <a:xfrm>
+            <a:off x="1283765" y="1690688"/>
+            <a:ext cx="8627950" cy="4351338"/>
+          </a:xfrm>
+        </p:spPr>
+      </p:pic>
+    </p:spTree>
+    <p:extLst>
+      <p:ext uri="{BB962C8B-B14F-4D97-AF65-F5344CB8AC3E}">
+        <p14:creationId xmlns:p14="http://schemas.microsoft.com/office/powerpoint/2010/main" val="1166251522"/>
+      </p:ext>
+    </p:extLst>
+  </p:cSld>
+  <p:clrMapOvr>
+    <a:masterClrMapping/>
+  </p:clrMapOvr>
+</p:sld>
+</file>
+
+<file path=ppt/slides/slide18.xml><?xml version="1.0" encoding="utf-8"?>
+<p:sld xmlns:a="http://schemas.openxmlformats.org/drawingml/2006/main" xmlns:r="http://schemas.openxmlformats.org/officeDocument/2006/relationships" xmlns:p="http://schemas.openxmlformats.org/presentationml/2006/main">
+  <p:cSld>
+    <p:spTree>
+      <p:nvGrpSpPr>
+        <p:cNvPr id="1" name=""/>
+        <p:cNvGrpSpPr/>
+        <p:nvPr/>
+      </p:nvGrpSpPr>
+      <p:grpSpPr>
+        <a:xfrm>
+          <a:off x="0" y="0"/>
+          <a:ext cx="0" cy="0"/>
+          <a:chOff x="0" y="0"/>
+          <a:chExt cx="0" cy="0"/>
+        </a:xfrm>
+      </p:grpSpPr>
+      <p:sp>
+        <p:nvSpPr>
+          <p:cNvPr id="2" name="Title 1">
+            <a:extLst>
+              <a:ext uri="{FF2B5EF4-FFF2-40B4-BE49-F238E27FC236}">
+                <a16:creationId xmlns:a16="http://schemas.microsoft.com/office/drawing/2014/main" id="{49C735E6-F3E2-4C7D-BEFD-D14D795BD513}"/>
+              </a:ext>
+            </a:extLst>
+          </p:cNvPr>
+          <p:cNvSpPr>
+            <a:spLocks noGrp="1"/>
+          </p:cNvSpPr>
+          <p:nvPr>
+            <p:ph type="title"/>
+          </p:nvPr>
+        </p:nvSpPr>
+        <p:spPr/>
+        <p:txBody>
+          <a:bodyPr/>
+          <a:lstStyle/>
+          <a:p>
+            <a:r>
+              <a:rPr lang="en-US" dirty="0">
+                <a:solidFill>
+                  <a:schemeClr val="accent4"/>
+                </a:solidFill>
+              </a:rPr>
+              <a:t>Persistent Data</a:t>
+            </a:r>
+          </a:p>
+        </p:txBody>
+      </p:sp>
+      <p:pic>
+        <p:nvPicPr>
+          <p:cNvPr id="6" name="Content Placeholder 5">
+            <a:extLst>
+              <a:ext uri="{FF2B5EF4-FFF2-40B4-BE49-F238E27FC236}">
+                <a16:creationId xmlns:a16="http://schemas.microsoft.com/office/drawing/2014/main" id="{FDC93C71-A87C-479D-9F9D-071E5DE6C310}"/>
+              </a:ext>
+            </a:extLst>
+          </p:cNvPr>
+          <p:cNvPicPr>
+            <a:picLocks noGrp="1" noChangeAspect="1"/>
+          </p:cNvPicPr>
+          <p:nvPr>
+            <p:ph idx="1"/>
+          </p:nvPr>
+        </p:nvPicPr>
+        <p:blipFill rotWithShape="1">
+          <a:blip r:embed="rId2"/>
+          <a:srcRect l="4741" r="6725" b="12263"/>
+          <a:stretch/>
+        </p:blipFill>
+        <p:spPr>
+          <a:xfrm>
+            <a:off x="0" y="1617856"/>
+            <a:ext cx="6426200" cy="2429211"/>
+          </a:xfrm>
+        </p:spPr>
+      </p:pic>
+      <p:pic>
+        <p:nvPicPr>
+          <p:cNvPr id="8" name="Picture 7">
+            <a:extLst>
+              <a:ext uri="{FF2B5EF4-FFF2-40B4-BE49-F238E27FC236}">
+                <a16:creationId xmlns:a16="http://schemas.microsoft.com/office/drawing/2014/main" id="{CD595194-55A9-44A3-AA20-C3D76EA87820}"/>
+              </a:ext>
+            </a:extLst>
+          </p:cNvPr>
+          <p:cNvPicPr>
+            <a:picLocks noChangeAspect="1"/>
+          </p:cNvPicPr>
+          <p:nvPr/>
+        </p:nvPicPr>
+        <p:blipFill rotWithShape="1">
+          <a:blip r:embed="rId3"/>
+          <a:srcRect l="6281" r="1487"/>
+          <a:stretch/>
+        </p:blipFill>
+        <p:spPr>
+          <a:xfrm>
+            <a:off x="5842000" y="190333"/>
+            <a:ext cx="6197601" cy="6477333"/>
+          </a:xfrm>
+          <a:prstGeom prst="rect">
+            <a:avLst/>
+          </a:prstGeom>
+        </p:spPr>
+      </p:pic>
+    </p:spTree>
+    <p:extLst>
+      <p:ext uri="{BB962C8B-B14F-4D97-AF65-F5344CB8AC3E}">
+        <p14:creationId xmlns:p14="http://schemas.microsoft.com/office/powerpoint/2010/main" val="885914222"/>
+      </p:ext>
+    </p:extLst>
+  </p:cSld>
+  <p:clrMapOvr>
+    <a:masterClrMapping/>
+  </p:clrMapOvr>
+</p:sld>
+</file>
+
+<file path=ppt/slides/slide2.xml><?xml version="1.0" encoding="utf-8"?>
+<p:sld xmlns:a="http://schemas.openxmlformats.org/drawingml/2006/main" xmlns:r="http://schemas.openxmlformats.org/officeDocument/2006/relationships" xmlns:p="http://schemas.openxmlformats.org/presentationml/2006/main">
+  <p:cSld>
+    <p:bg>
+      <p:bgPr>
+        <a:solidFill>
+          <a:schemeClr val="bg1"/>
+        </a:solidFill>
+        <a:effectLst/>
+      </p:bgPr>
+    </p:bg>
+    <p:spTree>
+      <p:nvGrpSpPr>
+        <p:cNvPr id="1" name=""/>
+        <p:cNvGrpSpPr/>
+        <p:nvPr/>
+      </p:nvGrpSpPr>
+      <p:grpSpPr>
+        <a:xfrm>
+          <a:off x="0" y="0"/>
+          <a:ext cx="0" cy="0"/>
+          <a:chOff x="0" y="0"/>
+          <a:chExt cx="0" cy="0"/>
+        </a:xfrm>
+      </p:grpSpPr>
+      <p:sp useBgFill="1">
+        <p:nvSpPr>
+          <p:cNvPr id="8" name="Rectangle 7">
+            <a:extLst>
+              <a:ext uri="{FF2B5EF4-FFF2-40B4-BE49-F238E27FC236}">
+                <a16:creationId xmlns:a16="http://schemas.microsoft.com/office/drawing/2014/main" id="{1BB867FF-FC45-48F7-8104-F89BE54909F1}"/>
+              </a:ext>
+              <a:ext uri="{C183D7F6-B498-43B3-948B-1728B52AA6E4}">
+                <adec:decorative xmlns:adec="http://schemas.microsoft.com/office/drawing/2017/decorative" val="1"/>
+              </a:ext>
+            </a:extLst>
+          </p:cNvPr>
+          <p:cNvSpPr>
+            <a:spLocks noGrp="1" noRot="1" noChangeAspect="1" noMove="1" noResize="1" noEditPoints="1" noAdjustHandles="1" noChangeArrowheads="1" noChangeShapeType="1" noTextEdit="1"/>
+          </p:cNvSpPr>
+          <p:nvPr>
+            <p:extLst>
+              <p:ext uri="{386F3935-93C4-4BCD-93E2-E3B085C9AB24}">
+                <p16:designElem xmlns:p16="http://schemas.microsoft.com/office/powerpoint/2015/main" val="1"/>
+              </p:ext>
+            </p:extLst>
+          </p:nvPr>
+        </p:nvSpPr>
+        <p:spPr>
+          <a:xfrm>
+            <a:off x="3048" y="0"/>
+            <a:ext cx="12188952" cy="6858000"/>
+          </a:xfrm>
+          <a:prstGeom prst="rect">
+            <a:avLst/>
+          </a:prstGeom>
+          <a:ln>
+            <a:noFill/>
+          </a:ln>
+        </p:spPr>
+        <p:style>
+          <a:lnRef idx="2">
+            <a:schemeClr val="accent1">
+              <a:shade val="50000"/>
+            </a:schemeClr>
+          </a:lnRef>
+          <a:fillRef idx="1">
+            <a:schemeClr val="accent1"/>
+          </a:fillRef>
+          <a:effectRef idx="0">
+            <a:schemeClr val="accent1"/>
+          </a:effectRef>
+          <a:fontRef idx="minor">
+            <a:schemeClr val="lt1"/>
+          </a:fontRef>
+        </p:style>
+        <p:txBody>
+          <a:bodyPr rtlCol="0" anchor="ctr"/>
+          <a:lstStyle/>
+          <a:p>
+            <a:pPr algn="ctr"/>
+            <a:endParaRPr lang="en-US"/>
+          </a:p>
+        </p:txBody>
+      </p:sp>
+      <p:sp>
+        <p:nvSpPr>
+          <p:cNvPr id="10" name="Freeform: Shape 9">
+            <a:extLst>
+              <a:ext uri="{FF2B5EF4-FFF2-40B4-BE49-F238E27FC236}">
+                <a16:creationId xmlns:a16="http://schemas.microsoft.com/office/drawing/2014/main" id="{8BB56887-D0D5-4F0C-9E19-7247EB83C8B7}"/>
+              </a:ext>
+              <a:ext uri="{C183D7F6-B498-43B3-948B-1728B52AA6E4}">
+                <adec:decorative xmlns:adec="http://schemas.microsoft.com/office/drawing/2017/decorative" val="1"/>
+              </a:ext>
+            </a:extLst>
+          </p:cNvPr>
+          <p:cNvSpPr>
+            <a:spLocks noGrp="1" noRot="1" noChangeAspect="1" noMove="1" noResize="1" noEditPoints="1" noAdjustHandles="1" noChangeArrowheads="1" noChangeShapeType="1" noTextEdit="1"/>
+          </p:cNvSpPr>
+          <p:nvPr>
+            <p:extLst>
+              <p:ext uri="{386F3935-93C4-4BCD-93E2-E3B085C9AB24}">
+                <p16:designElem xmlns:p16="http://schemas.microsoft.com/office/powerpoint/2015/main" val="1"/>
+              </p:ext>
+            </p:extLst>
+          </p:nvPr>
+        </p:nvSpPr>
+        <p:spPr>
+          <a:xfrm>
+            <a:off x="10208695" y="1"/>
+            <a:ext cx="1135066" cy="477997"/>
+          </a:xfrm>
+          <a:custGeom>
+            <a:avLst/>
+            <a:gdLst>
+              <a:gd name="connsiteX0" fmla="*/ 0 w 1135066"/>
+              <a:gd name="connsiteY0" fmla="*/ 0 h 477997"/>
+              <a:gd name="connsiteX1" fmla="*/ 1135066 w 1135066"/>
+              <a:gd name="connsiteY1" fmla="*/ 0 h 477997"/>
+              <a:gd name="connsiteX2" fmla="*/ 1133370 w 1135066"/>
+              <a:gd name="connsiteY2" fmla="*/ 16827 h 477997"/>
+              <a:gd name="connsiteX3" fmla="*/ 567533 w 1135066"/>
+              <a:gd name="connsiteY3" fmla="*/ 477997 h 477997"/>
+              <a:gd name="connsiteX4" fmla="*/ 1696 w 1135066"/>
+              <a:gd name="connsiteY4" fmla="*/ 16827 h 477997"/>
+            </a:gdLst>
+            <a:ahLst/>
+            <a:cxnLst>
+              <a:cxn ang="0">
+                <a:pos x="connsiteX0" y="connsiteY0"/>
+              </a:cxn>
+              <a:cxn ang="0">
+                <a:pos x="connsiteX1" y="connsiteY1"/>
+              </a:cxn>
+              <a:cxn ang="0">
+                <a:pos x="connsiteX2" y="connsiteY2"/>
+              </a:cxn>
+              <a:cxn ang="0">
+                <a:pos x="connsiteX3" y="connsiteY3"/>
+              </a:cxn>
+              <a:cxn ang="0">
+                <a:pos x="connsiteX4" y="connsiteY4"/>
+              </a:cxn>
+            </a:cxnLst>
+            <a:rect l="l" t="t" r="r" b="b"/>
+            <a:pathLst>
+              <a:path w="1135066" h="477997">
+                <a:moveTo>
+                  <a:pt x="0" y="0"/>
+                </a:moveTo>
+                <a:lnTo>
+                  <a:pt x="1135066" y="0"/>
+                </a:lnTo>
+                <a:lnTo>
+                  <a:pt x="1133370" y="16827"/>
+                </a:lnTo>
+                <a:cubicBezTo>
+                  <a:pt x="1079514" y="280016"/>
+                  <a:pt x="846644" y="477997"/>
+                  <a:pt x="567533" y="477997"/>
+                </a:cubicBezTo>
+                <a:cubicBezTo>
+                  <a:pt x="288422" y="477997"/>
+                  <a:pt x="55552" y="280016"/>
+                  <a:pt x="1696" y="16827"/>
+                </a:cubicBezTo>
+                <a:close/>
+              </a:path>
+            </a:pathLst>
+          </a:custGeom>
+          <a:solidFill>
+            <a:schemeClr val="accent4"/>
+          </a:solidFill>
+          <a:ln>
+            <a:noFill/>
+          </a:ln>
+        </p:spPr>
+        <p:style>
+          <a:lnRef idx="2">
+            <a:schemeClr val="accent1">
+              <a:shade val="50000"/>
+            </a:schemeClr>
+          </a:lnRef>
+          <a:fillRef idx="1">
+            <a:schemeClr val="accent1"/>
+          </a:fillRef>
+          <a:effectRef idx="0">
+            <a:schemeClr val="accent1"/>
+          </a:effectRef>
+          <a:fontRef idx="minor">
+            <a:schemeClr val="lt1"/>
+          </a:fontRef>
+        </p:style>
+        <p:txBody>
+          <a:bodyPr wrap="square" rtlCol="0" anchor="ctr">
+            <a:noAutofit/>
+          </a:bodyPr>
+          <a:lstStyle/>
+          <a:p>
+            <a:pPr algn="ctr"/>
+            <a:endParaRPr lang="en-US"/>
+          </a:p>
+        </p:txBody>
+      </p:sp>
+      <p:sp>
+        <p:nvSpPr>
+          <p:cNvPr id="2" name="Title 1">
+            <a:extLst>
+              <a:ext uri="{FF2B5EF4-FFF2-40B4-BE49-F238E27FC236}">
+                <a16:creationId xmlns:a16="http://schemas.microsoft.com/office/drawing/2014/main" id="{B47BC3D4-13BC-4234-A936-6F4E9647C09B}"/>
+              </a:ext>
+            </a:extLst>
+          </p:cNvPr>
+          <p:cNvSpPr>
+            <a:spLocks noGrp="1"/>
+          </p:cNvSpPr>
+          <p:nvPr>
+            <p:ph type="title"/>
+          </p:nvPr>
+        </p:nvSpPr>
+        <p:spPr>
+          <a:xfrm>
+            <a:off x="838200" y="365125"/>
+            <a:ext cx="10515600" cy="1325563"/>
+          </a:xfrm>
+        </p:spPr>
+        <p:txBody>
+          <a:bodyPr>
+            <a:normAutofit/>
+          </a:bodyPr>
+          <a:lstStyle/>
+          <a:p>
+            <a:r>
+              <a:rPr lang="en-US" dirty="0"/>
+              <a:t>Functionality</a:t>
+            </a:r>
+          </a:p>
+        </p:txBody>
+      </p:sp>
+      <p:sp>
+        <p:nvSpPr>
+          <p:cNvPr id="12" name="Arc 11">
+            <a:extLst>
+              <a:ext uri="{FF2B5EF4-FFF2-40B4-BE49-F238E27FC236}">
+                <a16:creationId xmlns:a16="http://schemas.microsoft.com/office/drawing/2014/main" id="{081E4A58-353D-44AE-B2FC-2A74E2E400F7}"/>
+              </a:ext>
+              <a:ext uri="{C183D7F6-B498-43B3-948B-1728B52AA6E4}">
+                <adec:decorative xmlns:adec="http://schemas.microsoft.com/office/drawing/2017/decorative" val="1"/>
+              </a:ext>
+            </a:extLst>
+          </p:cNvPr>
+          <p:cNvSpPr>
+            <a:spLocks noGrp="1" noRot="1" noChangeAspect="1" noMove="1" noResize="1" noEditPoints="1" noAdjustHandles="1" noChangeArrowheads="1" noChangeShapeType="1" noTextEdit="1"/>
+          </p:cNvSpPr>
+          <p:nvPr>
+            <p:extLst>
+              <p:ext uri="{386F3935-93C4-4BCD-93E2-E3B085C9AB24}">
+                <p16:designElem xmlns:p16="http://schemas.microsoft.com/office/powerpoint/2015/main" val="1"/>
+              </p:ext>
+            </p:extLst>
+          </p:nvPr>
+        </p:nvSpPr>
+        <p:spPr>
+          <a:xfrm rot="5400000" flipV="1">
+            <a:off x="555710" y="2183223"/>
+            <a:ext cx="4083433" cy="4083433"/>
+          </a:xfrm>
+          <a:prstGeom prst="arc">
+            <a:avLst/>
+          </a:prstGeom>
+          <a:ln w="127000" cap="rnd">
+            <a:solidFill>
+              <a:schemeClr val="accent4"/>
+            </a:solidFill>
+            <a:prstDash val="dash"/>
+          </a:ln>
+        </p:spPr>
+        <p:style>
+          <a:lnRef idx="1">
+            <a:schemeClr val="accent1"/>
+          </a:lnRef>
+          <a:fillRef idx="0">
+            <a:schemeClr val="accent1"/>
+          </a:fillRef>
+          <a:effectRef idx="0">
+            <a:schemeClr val="accent1"/>
+          </a:effectRef>
+          <a:fontRef idx="minor">
+            <a:schemeClr val="tx1"/>
+          </a:fontRef>
+        </p:style>
+        <p:txBody>
+          <a:bodyPr rtlCol="0" anchor="ctr"/>
+          <a:lstStyle/>
+          <a:p>
+            <a:pPr algn="ctr"/>
+            <a:endParaRPr lang="en-US" dirty="0"/>
+          </a:p>
+        </p:txBody>
+      </p:sp>
       <p:sp>
         <p:nvSpPr>
           <p:cNvPr id="3" name="Content Placeholder 2">
@@ -4795,18 +5927,6 @@
             <a:normAutofit/>
           </a:bodyPr>
           <a:lstStyle/>
-          <a:p>
-            <a:r>
-              <a:rPr lang="en-US" sz="2200" b="0" i="0" dirty="0">
-                <a:solidFill>
-                  <a:schemeClr val="accent6"/>
-                </a:solidFill>
-                <a:effectLst/>
-                <a:latin typeface="-apple-system"/>
-              </a:rPr>
-              <a:t>add a new customers</a:t>
-            </a:r>
-          </a:p>
           <a:p>
             <a:r>
               <a:rPr lang="en-US" sz="2200" b="0" i="0" dirty="0">
@@ -4828,14 +5948,10 @@
                 <a:effectLst/>
                 <a:latin typeface="-apple-system"/>
               </a:rPr>
-              <a:t>display details of an order</a:t>
-            </a:r>
-          </a:p>
-          <a:p>
-            <a:pPr>
-              <a:buFont typeface="Arial" panose="020B0604020202020204" pitchFamily="34" charset="0"/>
-              <a:buChar char="•"/>
-            </a:pPr>
+              <a:t>place orders to store locations for customers</a:t>
+            </a:r>
+          </a:p>
+          <a:p>
             <a:r>
               <a:rPr lang="en-US" sz="2200" b="0" i="0" dirty="0">
                 <a:solidFill>
@@ -4844,7 +5960,50 @@
                 <a:effectLst/>
                 <a:latin typeface="-apple-system"/>
               </a:rPr>
-              <a:t>place orders to store locations for customers</a:t>
+              <a:t>display all order history of a customer</a:t>
+            </a:r>
+          </a:p>
+          <a:p>
+            <a:r>
+              <a:rPr lang="en-US" sz="2200" b="0" i="0" dirty="0">
+                <a:solidFill>
+                  <a:schemeClr val="accent4"/>
+                </a:solidFill>
+                <a:effectLst/>
+                <a:latin typeface="-apple-system"/>
+              </a:rPr>
+              <a:t>add a new customer</a:t>
+            </a:r>
+            <a:endParaRPr lang="en-US" sz="2200" b="0" i="0" dirty="0">
+              <a:solidFill>
+                <a:schemeClr val="accent6"/>
+              </a:solidFill>
+              <a:effectLst/>
+              <a:latin typeface="-apple-system"/>
+            </a:endParaRPr>
+          </a:p>
+          <a:p>
+            <a:r>
+              <a:rPr lang="en-US" sz="2200" b="0" i="0" dirty="0">
+                <a:solidFill>
+                  <a:schemeClr val="accent4"/>
+                </a:solidFill>
+                <a:effectLst/>
+                <a:latin typeface="-apple-system"/>
+              </a:rPr>
+              <a:t>display details of an order</a:t>
+            </a:r>
+          </a:p>
+          <a:p>
+            <a:r>
+              <a:rPr lang="en-US" sz="2200" b="0" i="0" dirty="0">
+                <a:solidFill>
+                  <a:schemeClr val="accent4"/>
+                </a:solidFill>
+                <a:effectLst/>
+                <a:latin typeface="-apple-system"/>
+              </a:rPr>
+              <a:t>input validation</a:t>
             </a:r>
           </a:p>
           <a:p>
@@ -4855,7 +6014,19 @@
             <a:r>
               <a:rPr lang="en-US" sz="2200" b="0" i="0" dirty="0">
                 <a:solidFill>
-                  <a:schemeClr val="accent2"/>
+                  <a:srgbClr val="C00000"/>
+                </a:solidFill>
+                <a:effectLst/>
+                <a:latin typeface="-apple-system"/>
+              </a:rPr>
+              <a:t>exception handling</a:t>
+            </a:r>
+          </a:p>
+          <a:p>
+            <a:r>
+              <a:rPr lang="en-US" sz="2200" b="0" i="0" dirty="0">
+                <a:solidFill>
+                  <a:srgbClr val="C00000"/>
                 </a:solidFill>
                 <a:effectLst/>
                 <a:latin typeface="-apple-system"/>
@@ -4864,75 +6035,179 @@
             </a:r>
           </a:p>
           <a:p>
-            <a:pPr>
-              <a:buFont typeface="Arial" panose="020B0604020202020204" pitchFamily="34" charset="0"/>
-              <a:buChar char="•"/>
+            <a:pPr marL="0" indent="0">
+              <a:buNone/>
             </a:pPr>
-            <a:r>
-              <a:rPr lang="en-US" sz="2200" b="0" i="0" dirty="0">
+            <a:endParaRPr lang="en-US" sz="2200" dirty="0"/>
+          </a:p>
+        </p:txBody>
+      </p:sp>
+    </p:spTree>
+    <p:extLst>
+      <p:ext uri="{BB962C8B-B14F-4D97-AF65-F5344CB8AC3E}">
+        <p14:creationId xmlns:p14="http://schemas.microsoft.com/office/powerpoint/2010/main" val="3012487353"/>
+      </p:ext>
+    </p:extLst>
+  </p:cSld>
+  <p:clrMapOvr>
+    <a:masterClrMapping/>
+  </p:clrMapOvr>
+</p:sld>
+</file>
+
+<file path=ppt/slides/slide3.xml><?xml version="1.0" encoding="utf-8"?>
+<p:sld xmlns:a="http://schemas.openxmlformats.org/drawingml/2006/main" xmlns:r="http://schemas.openxmlformats.org/officeDocument/2006/relationships" xmlns:p="http://schemas.openxmlformats.org/presentationml/2006/main">
+  <p:cSld>
+    <p:spTree>
+      <p:nvGrpSpPr>
+        <p:cNvPr id="1" name=""/>
+        <p:cNvGrpSpPr/>
+        <p:nvPr/>
+      </p:nvGrpSpPr>
+      <p:grpSpPr>
+        <a:xfrm>
+          <a:off x="0" y="0"/>
+          <a:ext cx="0" cy="0"/>
+          <a:chOff x="0" y="0"/>
+          <a:chExt cx="0" cy="0"/>
+        </a:xfrm>
+      </p:grpSpPr>
+      <p:sp>
+        <p:nvSpPr>
+          <p:cNvPr id="2" name="Title 1">
+            <a:extLst>
+              <a:ext uri="{FF2B5EF4-FFF2-40B4-BE49-F238E27FC236}">
+                <a16:creationId xmlns:a16="http://schemas.microsoft.com/office/drawing/2014/main" id="{4D8E78A2-C586-43B3-817C-675DF0C0CB9F}"/>
+              </a:ext>
+            </a:extLst>
+          </p:cNvPr>
+          <p:cNvSpPr>
+            <a:spLocks noGrp="1"/>
+          </p:cNvSpPr>
+          <p:nvPr>
+            <p:ph type="title"/>
+          </p:nvPr>
+        </p:nvSpPr>
+        <p:spPr/>
+        <p:txBody>
+          <a:bodyPr/>
+          <a:lstStyle/>
+          <a:p>
+            <a:r>
+              <a:rPr lang="en-US">
                 <a:solidFill>
-                  <a:schemeClr val="accent2"/>
+                  <a:schemeClr val="accent6"/>
                 </a:solidFill>
-                <a:effectLst/>
                 <a:latin typeface="-apple-system"/>
               </a:rPr>
-              <a:t>display all order history of a customer</a:t>
-            </a:r>
-          </a:p>
-          <a:p>
-            <a:pPr>
-              <a:buFont typeface="Arial" panose="020B0604020202020204" pitchFamily="34" charset="0"/>
-              <a:buChar char="•"/>
-            </a:pPr>
-            <a:r>
-              <a:rPr lang="en-US" sz="2200" b="0" i="0" dirty="0">
-                <a:effectLst/>
-                <a:latin typeface="-apple-system"/>
-              </a:rPr>
-              <a:t>input validation</a:t>
-            </a:r>
-          </a:p>
-          <a:p>
-            <a:pPr>
-              <a:buFont typeface="Arial" panose="020B0604020202020204" pitchFamily="34" charset="0"/>
-              <a:buChar char="•"/>
-            </a:pPr>
-            <a:r>
-              <a:rPr lang="en-US" sz="2200" b="0" i="0" dirty="0">
-                <a:effectLst/>
-                <a:latin typeface="-apple-system"/>
-              </a:rPr>
-              <a:t>exception handling</a:t>
-            </a:r>
-          </a:p>
-          <a:p>
-            <a:pPr>
-              <a:buFont typeface="Arial" panose="020B0604020202020204" pitchFamily="34" charset="0"/>
-              <a:buChar char="•"/>
-            </a:pPr>
-            <a:r>
-              <a:rPr lang="en-US" sz="2200" b="0" i="0" dirty="0">
+              <a:t>S</a:t>
+            </a:r>
+            <a:r>
+              <a:rPr lang="en-US" sz="4400" b="0" i="0">
                 <a:solidFill>
                   <a:schemeClr val="accent6"/>
                 </a:solidFill>
                 <a:effectLst/>
                 <a:latin typeface="-apple-system"/>
               </a:rPr>
-              <a:t>persistent data (to a DB); no hardcoding of data.(prices, customers, order history, etc.)</a:t>
-            </a:r>
-          </a:p>
-          <a:p>
-            <a:pPr marL="0" indent="0">
-              <a:buNone/>
-            </a:pPr>
-            <a:endParaRPr lang="en-US" sz="2200" dirty="0"/>
-          </a:p>
-        </p:txBody>
-      </p:sp>
+              <a:t>earch customers by name (&amp; other parameters)</a:t>
+            </a:r>
+            <a:endParaRPr lang="en-US" dirty="0"/>
+          </a:p>
+        </p:txBody>
+      </p:sp>
+      <p:pic>
+        <p:nvPicPr>
+          <p:cNvPr id="5" name="Content Placeholder 4">
+            <a:extLst>
+              <a:ext uri="{FF2B5EF4-FFF2-40B4-BE49-F238E27FC236}">
+                <a16:creationId xmlns:a16="http://schemas.microsoft.com/office/drawing/2014/main" id="{59AE665B-2931-4756-AB8F-6A54B539E847}"/>
+              </a:ext>
+            </a:extLst>
+          </p:cNvPr>
+          <p:cNvPicPr>
+            <a:picLocks noGrp="1" noChangeAspect="1"/>
+          </p:cNvPicPr>
+          <p:nvPr>
+            <p:ph idx="1"/>
+          </p:nvPr>
+        </p:nvPicPr>
+        <p:blipFill>
+          <a:blip r:embed="rId2"/>
+          <a:stretch>
+            <a:fillRect/>
+          </a:stretch>
+        </p:blipFill>
+        <p:spPr>
+          <a:xfrm>
+            <a:off x="210790" y="1825625"/>
+            <a:ext cx="6130743" cy="4351338"/>
+          </a:xfrm>
+        </p:spPr>
+      </p:pic>
+      <p:pic>
+        <p:nvPicPr>
+          <p:cNvPr id="4" name="Picture 3">
+            <a:extLst>
+              <a:ext uri="{FF2B5EF4-FFF2-40B4-BE49-F238E27FC236}">
+                <a16:creationId xmlns:a16="http://schemas.microsoft.com/office/drawing/2014/main" id="{68B9441A-1A54-4D00-BA90-B19BF5E37ABF}"/>
+              </a:ext>
+            </a:extLst>
+          </p:cNvPr>
+          <p:cNvPicPr>
+            <a:picLocks noChangeAspect="1"/>
+          </p:cNvPicPr>
+          <p:nvPr/>
+        </p:nvPicPr>
+        <p:blipFill rotWithShape="1">
+          <a:blip r:embed="rId3"/>
+          <a:srcRect r="3445"/>
+          <a:stretch/>
+        </p:blipFill>
+        <p:spPr>
+          <a:xfrm>
+            <a:off x="4673601" y="1983393"/>
+            <a:ext cx="7307610" cy="749339"/>
+          </a:xfrm>
+          <a:prstGeom prst="rect">
+            <a:avLst/>
+          </a:prstGeom>
+        </p:spPr>
+      </p:pic>
+      <p:pic>
+        <p:nvPicPr>
+          <p:cNvPr id="9" name="Picture 8">
+            <a:extLst>
+              <a:ext uri="{FF2B5EF4-FFF2-40B4-BE49-F238E27FC236}">
+                <a16:creationId xmlns:a16="http://schemas.microsoft.com/office/drawing/2014/main" id="{676B5EDF-2AEC-4C4F-AF77-55C01AAB5913}"/>
+              </a:ext>
+            </a:extLst>
+          </p:cNvPr>
+          <p:cNvPicPr>
+            <a:picLocks noChangeAspect="1"/>
+          </p:cNvPicPr>
+          <p:nvPr/>
+        </p:nvPicPr>
+        <p:blipFill>
+          <a:blip r:embed="rId4"/>
+          <a:stretch>
+            <a:fillRect/>
+          </a:stretch>
+        </p:blipFill>
+        <p:spPr>
+          <a:xfrm>
+            <a:off x="4612465" y="4130425"/>
+            <a:ext cx="7429882" cy="654084"/>
+          </a:xfrm>
+          <a:prstGeom prst="rect">
+            <a:avLst/>
+          </a:prstGeom>
+        </p:spPr>
+      </p:pic>
     </p:spTree>
     <p:extLst>
       <p:ext uri="{BB962C8B-B14F-4D97-AF65-F5344CB8AC3E}">
-        <p14:creationId xmlns:p14="http://schemas.microsoft.com/office/powerpoint/2010/main" val="3012487353"/>
+        <p14:creationId xmlns:p14="http://schemas.microsoft.com/office/powerpoint/2010/main" val="229285352"/>
       </p:ext>
     </p:extLst>
   </p:cSld>
@@ -4975,33 +6250,21 @@
             <p:ph type="title"/>
           </p:nvPr>
         </p:nvSpPr>
-        <p:spPr>
-          <a:xfrm>
-            <a:off x="474133" y="102658"/>
-            <a:ext cx="10515600" cy="1325563"/>
-          </a:xfrm>
-        </p:spPr>
+        <p:spPr/>
         <p:txBody>
           <a:bodyPr/>
           <a:lstStyle/>
           <a:p>
             <a:r>
-              <a:rPr lang="en-US" sz="4400" b="0" i="0">
+              <a:rPr lang="en-US" sz="4400" b="0" i="0" dirty="0">
                 <a:solidFill>
                   <a:schemeClr val="accent6"/>
                 </a:solidFill>
                 <a:effectLst/>
                 <a:latin typeface="-apple-system"/>
               </a:rPr>
-              <a:t>add a new customer</a:t>
-            </a:r>
-            <a:endParaRPr lang="en-US" sz="4400" b="0" i="0" dirty="0">
-              <a:solidFill>
-                <a:schemeClr val="accent6"/>
-              </a:solidFill>
-              <a:effectLst/>
-              <a:latin typeface="-apple-system"/>
-            </a:endParaRPr>
+              <a:t>Place orders to store locations for customers</a:t>
+            </a:r>
           </a:p>
         </p:txBody>
       </p:sp>
@@ -5010,7 +6273,7 @@
           <p:cNvPr id="5" name="Content Placeholder 4">
             <a:extLst>
               <a:ext uri="{FF2B5EF4-FFF2-40B4-BE49-F238E27FC236}">
-                <a16:creationId xmlns:a16="http://schemas.microsoft.com/office/drawing/2014/main" id="{0BAF3597-FC96-41E2-8B54-6C37B10D2F80}"/>
+                <a16:creationId xmlns:a16="http://schemas.microsoft.com/office/drawing/2014/main" id="{E985FB2E-E5E6-4586-934B-1E9319E4AE74}"/>
               </a:ext>
             </a:extLst>
           </p:cNvPr>
@@ -5029,45 +6292,15 @@
         </p:blipFill>
         <p:spPr>
           <a:xfrm>
-            <a:off x="97780" y="1145251"/>
-            <a:ext cx="5998220" cy="5398451"/>
-          </a:xfrm>
-        </p:spPr>
-      </p:pic>
-      <p:pic>
-        <p:nvPicPr>
-          <p:cNvPr id="7" name="Picture 6">
-            <a:extLst>
-              <a:ext uri="{FF2B5EF4-FFF2-40B4-BE49-F238E27FC236}">
-                <a16:creationId xmlns:a16="http://schemas.microsoft.com/office/drawing/2014/main" id="{D801E9C3-BBFC-4251-B6C2-4DAACD3F9B78}"/>
-              </a:ext>
-            </a:extLst>
-          </p:cNvPr>
-          <p:cNvPicPr>
-            <a:picLocks noChangeAspect="1"/>
-          </p:cNvPicPr>
-          <p:nvPr/>
-        </p:nvPicPr>
-        <p:blipFill>
-          <a:blip r:embed="rId3"/>
-          <a:stretch>
-            <a:fillRect/>
-          </a:stretch>
-        </p:blipFill>
-        <p:spPr>
-          <a:xfrm>
-            <a:off x="5427272" y="1676272"/>
-            <a:ext cx="6764728" cy="3683189"/>
-          </a:xfrm>
-          <a:prstGeom prst="rect">
-            <a:avLst/>
-          </a:prstGeom>
+            <a:off x="210807" y="1887679"/>
+            <a:ext cx="6820251" cy="2590933"/>
+          </a:xfrm>
         </p:spPr>
       </p:pic>
     </p:spTree>
     <p:extLst>
       <p:ext uri="{BB962C8B-B14F-4D97-AF65-F5344CB8AC3E}">
-        <p14:creationId xmlns:p14="http://schemas.microsoft.com/office/powerpoint/2010/main" val="2394070289"/>
+        <p14:creationId xmlns:p14="http://schemas.microsoft.com/office/powerpoint/2010/main" val="2848077745"/>
       </p:ext>
     </p:extLst>
   </p:cSld>
@@ -5116,6 +6349,15 @@
           <a:lstStyle/>
           <a:p>
             <a:r>
+              <a:rPr lang="en-US" dirty="0">
+                <a:solidFill>
+                  <a:schemeClr val="accent6"/>
+                </a:solidFill>
+                <a:latin typeface="-apple-system"/>
+              </a:rPr>
+              <a:t>D</a:t>
+            </a:r>
+            <a:r>
               <a:rPr lang="en-US" sz="4400" b="0" i="0" dirty="0">
                 <a:solidFill>
                   <a:schemeClr val="accent6"/>
@@ -5123,27 +6365,24 @@
                 <a:effectLst/>
                 <a:latin typeface="-apple-system"/>
               </a:rPr>
-              <a:t>search customers by name (&amp; other parameters)</a:t>
-            </a:r>
-            <a:endParaRPr lang="en-US" dirty="0"/>
+              <a:t>isplay all order history of a customer</a:t>
+            </a:r>
           </a:p>
         </p:txBody>
       </p:sp>
       <p:pic>
         <p:nvPicPr>
-          <p:cNvPr id="5" name="Content Placeholder 4">
-            <a:extLst>
-              <a:ext uri="{FF2B5EF4-FFF2-40B4-BE49-F238E27FC236}">
-                <a16:creationId xmlns:a16="http://schemas.microsoft.com/office/drawing/2014/main" id="{59AE665B-2931-4756-AB8F-6A54B539E847}"/>
+          <p:cNvPr id="8" name="Picture 7">
+            <a:extLst>
+              <a:ext uri="{FF2B5EF4-FFF2-40B4-BE49-F238E27FC236}">
+                <a16:creationId xmlns:a16="http://schemas.microsoft.com/office/drawing/2014/main" id="{0943CA9F-6DAB-4168-942E-F717978DC148}"/>
               </a:ext>
             </a:extLst>
           </p:cNvPr>
           <p:cNvPicPr>
-            <a:picLocks noGrp="1" noChangeAspect="1"/>
+            <a:picLocks noChangeAspect="1"/>
           </p:cNvPicPr>
-          <p:nvPr>
-            <p:ph idx="1"/>
-          </p:nvPr>
+          <p:nvPr/>
         </p:nvPicPr>
         <p:blipFill>
           <a:blip r:embed="rId2"/>
@@ -5153,15 +6392,107 @@
         </p:blipFill>
         <p:spPr>
           <a:xfrm>
-            <a:off x="210790" y="1825625"/>
-            <a:ext cx="6130743" cy="4351338"/>
+            <a:off x="0" y="4448876"/>
+            <a:ext cx="7055213" cy="2311519"/>
+          </a:xfrm>
+          <a:prstGeom prst="rect">
+            <a:avLst/>
+          </a:prstGeom>
+        </p:spPr>
+      </p:pic>
+      <p:pic>
+        <p:nvPicPr>
+          <p:cNvPr id="10" name="Picture 9">
+            <a:extLst>
+              <a:ext uri="{FF2B5EF4-FFF2-40B4-BE49-F238E27FC236}">
+                <a16:creationId xmlns:a16="http://schemas.microsoft.com/office/drawing/2014/main" id="{E01A35FC-3DC3-4680-B4C6-809BDA254553}"/>
+              </a:ext>
+            </a:extLst>
+          </p:cNvPr>
+          <p:cNvPicPr>
+            <a:picLocks noChangeAspect="1"/>
+          </p:cNvPicPr>
+          <p:nvPr/>
+        </p:nvPicPr>
+        <p:blipFill>
+          <a:blip r:embed="rId3"/>
+          <a:stretch>
+            <a:fillRect/>
+          </a:stretch>
+        </p:blipFill>
+        <p:spPr>
+          <a:xfrm>
+            <a:off x="7529401" y="1535197"/>
+            <a:ext cx="4115011" cy="2711589"/>
+          </a:xfrm>
+          <a:prstGeom prst="rect">
+            <a:avLst/>
+          </a:prstGeom>
+        </p:spPr>
+      </p:pic>
+      <p:pic>
+        <p:nvPicPr>
+          <p:cNvPr id="12" name="Picture 11">
+            <a:extLst>
+              <a:ext uri="{FF2B5EF4-FFF2-40B4-BE49-F238E27FC236}">
+                <a16:creationId xmlns:a16="http://schemas.microsoft.com/office/drawing/2014/main" id="{35B8C760-D0EC-4284-96AF-EA8E3D136908}"/>
+              </a:ext>
+            </a:extLst>
+          </p:cNvPr>
+          <p:cNvPicPr>
+            <a:picLocks noChangeAspect="1"/>
+          </p:cNvPicPr>
+          <p:nvPr/>
+        </p:nvPicPr>
+        <p:blipFill>
+          <a:blip r:embed="rId4"/>
+          <a:stretch>
+            <a:fillRect/>
+          </a:stretch>
+        </p:blipFill>
+        <p:spPr>
+          <a:xfrm>
+            <a:off x="7567502" y="4908832"/>
+            <a:ext cx="4076910" cy="1016052"/>
+          </a:xfrm>
+          <a:prstGeom prst="rect">
+            <a:avLst/>
+          </a:prstGeom>
+        </p:spPr>
+      </p:pic>
+      <p:pic>
+        <p:nvPicPr>
+          <p:cNvPr id="16" name="Content Placeholder 15">
+            <a:extLst>
+              <a:ext uri="{FF2B5EF4-FFF2-40B4-BE49-F238E27FC236}">
+                <a16:creationId xmlns:a16="http://schemas.microsoft.com/office/drawing/2014/main" id="{E06989FE-0B01-4436-A53E-43F188EE9D97}"/>
+              </a:ext>
+            </a:extLst>
+          </p:cNvPr>
+          <p:cNvPicPr>
+            <a:picLocks noGrp="1" noChangeAspect="1"/>
+          </p:cNvPicPr>
+          <p:nvPr>
+            <p:ph idx="1"/>
+          </p:nvPr>
+        </p:nvPicPr>
+        <p:blipFill>
+          <a:blip r:embed="rId5"/>
+          <a:stretch>
+            <a:fillRect/>
+          </a:stretch>
+        </p:blipFill>
+        <p:spPr>
+          <a:xfrm>
+            <a:off x="177175" y="1690688"/>
+            <a:ext cx="7144117" cy="2495678"/>
           </a:xfrm>
         </p:spPr>
       </p:pic>
     </p:spTree>
     <p:extLst>
       <p:ext uri="{BB962C8B-B14F-4D97-AF65-F5344CB8AC3E}">
-        <p14:creationId xmlns:p14="http://schemas.microsoft.com/office/powerpoint/2010/main" val="229285352"/>
+        <p14:creationId xmlns:p14="http://schemas.microsoft.com/office/powerpoint/2010/main" val="2050616"/>
       </p:ext>
     </p:extLst>
   </p:cSld>
@@ -5204,53 +6535,101 @@
             <p:ph type="title"/>
           </p:nvPr>
         </p:nvSpPr>
-        <p:spPr/>
+        <p:spPr>
+          <a:xfrm>
+            <a:off x="474133" y="102658"/>
+            <a:ext cx="10515600" cy="1325563"/>
+          </a:xfrm>
+        </p:spPr>
         <p:txBody>
           <a:bodyPr/>
           <a:lstStyle/>
           <a:p>
+            <a:r>
+              <a:rPr lang="en-US" dirty="0">
+                <a:solidFill>
+                  <a:schemeClr val="accent4"/>
+                </a:solidFill>
+                <a:latin typeface="-apple-system"/>
+              </a:rPr>
+              <a:t>A</a:t>
+            </a:r>
             <a:r>
               <a:rPr lang="en-US" sz="4400" b="0" i="0" dirty="0">
                 <a:solidFill>
-                  <a:schemeClr val="accent6"/>
+                  <a:schemeClr val="accent4"/>
                 </a:solidFill>
                 <a:effectLst/>
                 <a:latin typeface="-apple-system"/>
               </a:rPr>
-              <a:t>display details of an order</a:t>
-            </a:r>
-          </a:p>
-        </p:txBody>
-      </p:sp>
-      <p:sp>
-        <p:nvSpPr>
-          <p:cNvPr id="3" name="Content Placeholder 2">
-            <a:extLst>
-              <a:ext uri="{FF2B5EF4-FFF2-40B4-BE49-F238E27FC236}">
-                <a16:creationId xmlns:a16="http://schemas.microsoft.com/office/drawing/2014/main" id="{8569E078-8E88-405D-A9E0-40273C4459A5}"/>
-              </a:ext>
-            </a:extLst>
-          </p:cNvPr>
-          <p:cNvSpPr>
-            <a:spLocks noGrp="1"/>
-          </p:cNvSpPr>
+              <a:t>dd a new customer</a:t>
+            </a:r>
+          </a:p>
+        </p:txBody>
+      </p:sp>
+      <p:pic>
+        <p:nvPicPr>
+          <p:cNvPr id="5" name="Content Placeholder 4">
+            <a:extLst>
+              <a:ext uri="{FF2B5EF4-FFF2-40B4-BE49-F238E27FC236}">
+                <a16:creationId xmlns:a16="http://schemas.microsoft.com/office/drawing/2014/main" id="{0BAF3597-FC96-41E2-8B54-6C37B10D2F80}"/>
+              </a:ext>
+            </a:extLst>
+          </p:cNvPr>
+          <p:cNvPicPr>
+            <a:picLocks noGrp="1" noChangeAspect="1"/>
+          </p:cNvPicPr>
           <p:nvPr>
             <p:ph idx="1"/>
           </p:nvPr>
-        </p:nvSpPr>
-        <p:spPr/>
-        <p:txBody>
-          <a:bodyPr/>
-          <a:lstStyle/>
-          <a:p>
-            <a:endParaRPr lang="en-US"/>
-          </a:p>
-        </p:txBody>
-      </p:sp>
+        </p:nvPicPr>
+        <p:blipFill>
+          <a:blip r:embed="rId2"/>
+          <a:stretch>
+            <a:fillRect/>
+          </a:stretch>
+        </p:blipFill>
+        <p:spPr>
+          <a:xfrm>
+            <a:off x="97780" y="1145251"/>
+            <a:ext cx="5998220" cy="5398451"/>
+          </a:xfrm>
+        </p:spPr>
+      </p:pic>
+      <p:pic>
+        <p:nvPicPr>
+          <p:cNvPr id="7" name="Picture 6">
+            <a:extLst>
+              <a:ext uri="{FF2B5EF4-FFF2-40B4-BE49-F238E27FC236}">
+                <a16:creationId xmlns:a16="http://schemas.microsoft.com/office/drawing/2014/main" id="{D801E9C3-BBFC-4251-B6C2-4DAACD3F9B78}"/>
+              </a:ext>
+            </a:extLst>
+          </p:cNvPr>
+          <p:cNvPicPr>
+            <a:picLocks noChangeAspect="1"/>
+          </p:cNvPicPr>
+          <p:nvPr/>
+        </p:nvPicPr>
+        <p:blipFill>
+          <a:blip r:embed="rId3"/>
+          <a:stretch>
+            <a:fillRect/>
+          </a:stretch>
+        </p:blipFill>
+        <p:spPr>
+          <a:xfrm>
+            <a:off x="5427272" y="1676272"/>
+            <a:ext cx="6764728" cy="3683189"/>
+          </a:xfrm>
+          <a:prstGeom prst="rect">
+            <a:avLst/>
+          </a:prstGeom>
+        </p:spPr>
+      </p:pic>
     </p:spTree>
     <p:extLst>
       <p:ext uri="{BB962C8B-B14F-4D97-AF65-F5344CB8AC3E}">
-        <p14:creationId xmlns:p14="http://schemas.microsoft.com/office/powerpoint/2010/main" val="1712774209"/>
+        <p14:creationId xmlns:p14="http://schemas.microsoft.com/office/powerpoint/2010/main" val="2394070289"/>
       </p:ext>
     </p:extLst>
   </p:cSld>
@@ -5298,52 +6677,61 @@
           <a:bodyPr/>
           <a:lstStyle/>
           <a:p>
-            <a:pPr>
-              <a:buFont typeface="Arial" panose="020B0604020202020204" pitchFamily="34" charset="0"/>
-              <a:buChar char="•"/>
-            </a:pPr>
+            <a:r>
+              <a:rPr lang="en-US" dirty="0">
+                <a:solidFill>
+                  <a:schemeClr val="accent4"/>
+                </a:solidFill>
+                <a:latin typeface="-apple-system"/>
+              </a:rPr>
+              <a:t>D</a:t>
+            </a:r>
             <a:r>
               <a:rPr lang="en-US" sz="4400" b="0" i="0" dirty="0">
                 <a:solidFill>
-                  <a:schemeClr val="accent6"/>
+                  <a:schemeClr val="accent4"/>
                 </a:solidFill>
                 <a:effectLst/>
                 <a:latin typeface="-apple-system"/>
               </a:rPr>
-              <a:t>place orders to store locations for customers</a:t>
-            </a:r>
-          </a:p>
-        </p:txBody>
-      </p:sp>
-      <p:sp>
-        <p:nvSpPr>
-          <p:cNvPr id="3" name="Content Placeholder 2">
-            <a:extLst>
-              <a:ext uri="{FF2B5EF4-FFF2-40B4-BE49-F238E27FC236}">
-                <a16:creationId xmlns:a16="http://schemas.microsoft.com/office/drawing/2014/main" id="{8569E078-8E88-405D-A9E0-40273C4459A5}"/>
-              </a:ext>
-            </a:extLst>
-          </p:cNvPr>
-          <p:cNvSpPr>
-            <a:spLocks noGrp="1"/>
-          </p:cNvSpPr>
+              <a:t>isplay details of an order</a:t>
+            </a:r>
+          </a:p>
+        </p:txBody>
+      </p:sp>
+      <p:pic>
+        <p:nvPicPr>
+          <p:cNvPr id="9" name="Content Placeholder 8">
+            <a:extLst>
+              <a:ext uri="{FF2B5EF4-FFF2-40B4-BE49-F238E27FC236}">
+                <a16:creationId xmlns:a16="http://schemas.microsoft.com/office/drawing/2014/main" id="{7FCAC4CA-9130-461C-9642-B04C996AACA6}"/>
+              </a:ext>
+            </a:extLst>
+          </p:cNvPr>
+          <p:cNvPicPr>
+            <a:picLocks noGrp="1" noChangeAspect="1"/>
+          </p:cNvPicPr>
           <p:nvPr>
             <p:ph idx="1"/>
           </p:nvPr>
-        </p:nvSpPr>
-        <p:spPr/>
-        <p:txBody>
-          <a:bodyPr/>
-          <a:lstStyle/>
-          <a:p>
-            <a:endParaRPr lang="en-US"/>
-          </a:p>
-        </p:txBody>
-      </p:sp>
+        </p:nvPicPr>
+        <p:blipFill>
+          <a:blip r:embed="rId2"/>
+          <a:stretch>
+            <a:fillRect/>
+          </a:stretch>
+        </p:blipFill>
+        <p:spPr>
+          <a:xfrm>
+            <a:off x="0" y="1810031"/>
+            <a:ext cx="8255424" cy="2292468"/>
+          </a:xfrm>
+        </p:spPr>
+      </p:pic>
     </p:spTree>
     <p:extLst>
       <p:ext uri="{BB962C8B-B14F-4D97-AF65-F5344CB8AC3E}">
-        <p14:creationId xmlns:p14="http://schemas.microsoft.com/office/powerpoint/2010/main" val="2848077745"/>
+        <p14:creationId xmlns:p14="http://schemas.microsoft.com/office/powerpoint/2010/main" val="1712774209"/>
       </p:ext>
     </p:extLst>
   </p:cSld>
@@ -5375,7 +6763,7 @@
           <p:cNvPr id="2" name="Title 1">
             <a:extLst>
               <a:ext uri="{FF2B5EF4-FFF2-40B4-BE49-F238E27FC236}">
-                <a16:creationId xmlns:a16="http://schemas.microsoft.com/office/drawing/2014/main" id="{4D8E78A2-C586-43B3-817C-675DF0C0CB9F}"/>
+                <a16:creationId xmlns:a16="http://schemas.microsoft.com/office/drawing/2014/main" id="{49C735E6-F3E2-4C7D-BEFD-D14D795BD513}"/>
               </a:ext>
             </a:extLst>
           </p:cNvPr>
@@ -5391,52 +6779,79 @@
           <a:bodyPr/>
           <a:lstStyle/>
           <a:p>
-            <a:pPr>
-              <a:buFont typeface="Arial" panose="020B0604020202020204" pitchFamily="34" charset="0"/>
-              <a:buChar char="•"/>
-            </a:pPr>
-            <a:r>
-              <a:rPr lang="en-US" sz="4400" b="0" i="0" dirty="0">
+            <a:r>
+              <a:rPr lang="en-US" dirty="0">
                 <a:solidFill>
-                  <a:schemeClr val="accent2"/>
+                  <a:schemeClr val="accent4"/>
                 </a:solidFill>
-                <a:effectLst/>
-                <a:latin typeface="-apple-system"/>
               </a:rPr>
-              <a:t>display all order history of a store location</a:t>
-            </a:r>
-          </a:p>
-        </p:txBody>
-      </p:sp>
-      <p:sp>
-        <p:nvSpPr>
-          <p:cNvPr id="3" name="Content Placeholder 2">
-            <a:extLst>
-              <a:ext uri="{FF2B5EF4-FFF2-40B4-BE49-F238E27FC236}">
-                <a16:creationId xmlns:a16="http://schemas.microsoft.com/office/drawing/2014/main" id="{8569E078-8E88-405D-A9E0-40273C4459A5}"/>
-              </a:ext>
-            </a:extLst>
-          </p:cNvPr>
-          <p:cNvSpPr>
-            <a:spLocks noGrp="1"/>
-          </p:cNvSpPr>
+              <a:t>Input Validation</a:t>
+            </a:r>
+          </a:p>
+        </p:txBody>
+      </p:sp>
+      <p:pic>
+        <p:nvPicPr>
+          <p:cNvPr id="5" name="Content Placeholder 4">
+            <a:extLst>
+              <a:ext uri="{FF2B5EF4-FFF2-40B4-BE49-F238E27FC236}">
+                <a16:creationId xmlns:a16="http://schemas.microsoft.com/office/drawing/2014/main" id="{C3F0317C-2F09-4FBB-A7A7-362F21F6895E}"/>
+              </a:ext>
+            </a:extLst>
+          </p:cNvPr>
+          <p:cNvPicPr>
+            <a:picLocks noGrp="1" noChangeAspect="1"/>
+          </p:cNvPicPr>
           <p:nvPr>
             <p:ph idx="1"/>
           </p:nvPr>
-        </p:nvSpPr>
-        <p:spPr/>
-        <p:txBody>
-          <a:bodyPr/>
-          <a:lstStyle/>
-          <a:p>
-            <a:endParaRPr lang="en-US"/>
-          </a:p>
-        </p:txBody>
-      </p:sp>
+        </p:nvPicPr>
+        <p:blipFill rotWithShape="1">
+          <a:blip r:embed="rId2"/>
+          <a:srcRect r="4632" b="23330"/>
+          <a:stretch/>
+        </p:blipFill>
+        <p:spPr>
+          <a:xfrm>
+            <a:off x="294047" y="1536169"/>
+            <a:ext cx="8164167" cy="1215498"/>
+          </a:xfrm>
+        </p:spPr>
+      </p:pic>
+      <p:pic>
+        <p:nvPicPr>
+          <p:cNvPr id="7" name="Picture 6">
+            <a:extLst>
+              <a:ext uri="{FF2B5EF4-FFF2-40B4-BE49-F238E27FC236}">
+                <a16:creationId xmlns:a16="http://schemas.microsoft.com/office/drawing/2014/main" id="{E5706FA8-00B8-4E95-B2A2-776818983D2D}"/>
+              </a:ext>
+            </a:extLst>
+          </p:cNvPr>
+          <p:cNvPicPr>
+            <a:picLocks noChangeAspect="1"/>
+          </p:cNvPicPr>
+          <p:nvPr/>
+        </p:nvPicPr>
+        <p:blipFill>
+          <a:blip r:embed="rId3"/>
+          <a:stretch>
+            <a:fillRect/>
+          </a:stretch>
+        </p:blipFill>
+        <p:spPr>
+          <a:xfrm>
+            <a:off x="355600" y="3701867"/>
+            <a:ext cx="8576733" cy="897840"/>
+          </a:xfrm>
+          <a:prstGeom prst="rect">
+            <a:avLst/>
+          </a:prstGeom>
+        </p:spPr>
+      </p:pic>
     </p:spTree>
     <p:extLst>
       <p:ext uri="{BB962C8B-B14F-4D97-AF65-F5344CB8AC3E}">
-        <p14:creationId xmlns:p14="http://schemas.microsoft.com/office/powerpoint/2010/main" val="1492250138"/>
+        <p14:creationId xmlns:p14="http://schemas.microsoft.com/office/powerpoint/2010/main" val="99630070"/>
       </p:ext>
     </p:extLst>
   </p:cSld>
@@ -5468,7 +6883,7 @@
           <p:cNvPr id="2" name="Title 1">
             <a:extLst>
               <a:ext uri="{FF2B5EF4-FFF2-40B4-BE49-F238E27FC236}">
-                <a16:creationId xmlns:a16="http://schemas.microsoft.com/office/drawing/2014/main" id="{4D8E78A2-C586-43B3-817C-675DF0C0CB9F}"/>
+                <a16:creationId xmlns:a16="http://schemas.microsoft.com/office/drawing/2014/main" id="{49C735E6-F3E2-4C7D-BEFD-D14D795BD513}"/>
               </a:ext>
             </a:extLst>
           </p:cNvPr>
@@ -5484,52 +6899,53 @@
           <a:bodyPr/>
           <a:lstStyle/>
           <a:p>
-            <a:pPr>
-              <a:buFont typeface="Arial" panose="020B0604020202020204" pitchFamily="34" charset="0"/>
-              <a:buChar char="•"/>
-            </a:pPr>
-            <a:r>
-              <a:rPr lang="en-US" sz="4400" b="0" i="0" dirty="0">
+            <a:r>
+              <a:rPr lang="en-US" dirty="0">
                 <a:solidFill>
-                  <a:schemeClr val="accent2"/>
+                  <a:srgbClr val="C00000"/>
                 </a:solidFill>
-                <a:effectLst/>
-                <a:latin typeface="-apple-system"/>
               </a:rPr>
-              <a:t>display all order history of a customer</a:t>
-            </a:r>
-          </a:p>
-        </p:txBody>
-      </p:sp>
-      <p:sp>
-        <p:nvSpPr>
-          <p:cNvPr id="3" name="Content Placeholder 2">
-            <a:extLst>
-              <a:ext uri="{FF2B5EF4-FFF2-40B4-BE49-F238E27FC236}">
-                <a16:creationId xmlns:a16="http://schemas.microsoft.com/office/drawing/2014/main" id="{8569E078-8E88-405D-A9E0-40273C4459A5}"/>
-              </a:ext>
-            </a:extLst>
-          </p:cNvPr>
-          <p:cNvSpPr>
-            <a:spLocks noGrp="1"/>
-          </p:cNvSpPr>
+              <a:t>Exception Handling</a:t>
+            </a:r>
+          </a:p>
+        </p:txBody>
+      </p:sp>
+      <p:pic>
+        <p:nvPicPr>
+          <p:cNvPr id="12" name="Content Placeholder 11">
+            <a:extLst>
+              <a:ext uri="{FF2B5EF4-FFF2-40B4-BE49-F238E27FC236}">
+                <a16:creationId xmlns:a16="http://schemas.microsoft.com/office/drawing/2014/main" id="{B6D760C8-DDDA-4FF2-A40C-0528A71D1812}"/>
+              </a:ext>
+            </a:extLst>
+          </p:cNvPr>
+          <p:cNvPicPr>
+            <a:picLocks noGrp="1" noChangeAspect="1"/>
+          </p:cNvPicPr>
           <p:nvPr>
             <p:ph idx="1"/>
           </p:nvPr>
-        </p:nvSpPr>
-        <p:spPr/>
-        <p:txBody>
-          <a:bodyPr/>
-          <a:lstStyle/>
-          <a:p>
-            <a:endParaRPr lang="en-US"/>
-          </a:p>
-        </p:txBody>
-      </p:sp>
+        </p:nvPicPr>
+        <p:blipFill>
+          <a:blip r:embed="rId2"/>
+          <a:stretch>
+            <a:fillRect/>
+          </a:stretch>
+        </p:blipFill>
+        <p:spPr>
+          <a:xfrm>
+            <a:off x="838200" y="2297951"/>
+            <a:ext cx="7417181" cy="2444876"/>
+          </a:xfrm>
+          <a:prstGeom prst="rect">
+            <a:avLst/>
+          </a:prstGeom>
+        </p:spPr>
+      </p:pic>
     </p:spTree>
     <p:extLst>
       <p:ext uri="{BB962C8B-B14F-4D97-AF65-F5344CB8AC3E}">
-        <p14:creationId xmlns:p14="http://schemas.microsoft.com/office/powerpoint/2010/main" val="2050616"/>
+        <p14:creationId xmlns:p14="http://schemas.microsoft.com/office/powerpoint/2010/main" val="4027085851"/>
       </p:ext>
     </p:extLst>
   </p:cSld>

</xml_diff>

<commit_message>
fixed typo in PPT and customersearch method
</commit_message>
<xml_diff>
--- a/Study/P0 Presentation.pptx
+++ b/Study/P0 Presentation.pptx
@@ -11,18 +11,19 @@
     <p:sldId id="264" r:id="rId5"/>
     <p:sldId id="266" r:id="rId6"/>
     <p:sldId id="262" r:id="rId7"/>
-    <p:sldId id="263" r:id="rId8"/>
-    <p:sldId id="269" r:id="rId9"/>
-    <p:sldId id="270" r:id="rId10"/>
-    <p:sldId id="268" r:id="rId11"/>
-    <p:sldId id="274" r:id="rId12"/>
+    <p:sldId id="278" r:id="rId8"/>
+    <p:sldId id="263" r:id="rId9"/>
+    <p:sldId id="269" r:id="rId10"/>
+    <p:sldId id="270" r:id="rId11"/>
+    <p:sldId id="268" r:id="rId12"/>
     <p:sldId id="273" r:id="rId13"/>
-    <p:sldId id="276" r:id="rId14"/>
-    <p:sldId id="260" r:id="rId15"/>
-    <p:sldId id="271" r:id="rId16"/>
-    <p:sldId id="275" r:id="rId17"/>
-    <p:sldId id="277" r:id="rId18"/>
-    <p:sldId id="272" r:id="rId19"/>
+    <p:sldId id="274" r:id="rId14"/>
+    <p:sldId id="276" r:id="rId15"/>
+    <p:sldId id="260" r:id="rId16"/>
+    <p:sldId id="271" r:id="rId17"/>
+    <p:sldId id="275" r:id="rId18"/>
+    <p:sldId id="277" r:id="rId19"/>
+    <p:sldId id="272" r:id="rId20"/>
   </p:sldIdLst>
   <p:sldSz cx="12192000" cy="6858000"/>
   <p:notesSz cx="6858000" cy="9144000"/>
@@ -276,7 +277,7 @@
           <a:p>
             <a:fld id="{ECACDFAC-FC41-4F3B-A1B9-4F1EB92710B6}" type="datetimeFigureOut">
               <a:rPr lang="en-US" smtClean="0"/>
-              <a:t>6/15/2021</a:t>
+              <a:t>6/16/2021</a:t>
             </a:fld>
             <a:endParaRPr lang="en-US"/>
           </a:p>
@@ -474,7 +475,7 @@
           <a:p>
             <a:fld id="{ECACDFAC-FC41-4F3B-A1B9-4F1EB92710B6}" type="datetimeFigureOut">
               <a:rPr lang="en-US" smtClean="0"/>
-              <a:t>6/15/2021</a:t>
+              <a:t>6/16/2021</a:t>
             </a:fld>
             <a:endParaRPr lang="en-US"/>
           </a:p>
@@ -682,7 +683,7 @@
           <a:p>
             <a:fld id="{ECACDFAC-FC41-4F3B-A1B9-4F1EB92710B6}" type="datetimeFigureOut">
               <a:rPr lang="en-US" smtClean="0"/>
-              <a:t>6/15/2021</a:t>
+              <a:t>6/16/2021</a:t>
             </a:fld>
             <a:endParaRPr lang="en-US"/>
           </a:p>
@@ -880,7 +881,7 @@
           <a:p>
             <a:fld id="{ECACDFAC-FC41-4F3B-A1B9-4F1EB92710B6}" type="datetimeFigureOut">
               <a:rPr lang="en-US" smtClean="0"/>
-              <a:t>6/15/2021</a:t>
+              <a:t>6/16/2021</a:t>
             </a:fld>
             <a:endParaRPr lang="en-US"/>
           </a:p>
@@ -1155,7 +1156,7 @@
           <a:p>
             <a:fld id="{ECACDFAC-FC41-4F3B-A1B9-4F1EB92710B6}" type="datetimeFigureOut">
               <a:rPr lang="en-US" smtClean="0"/>
-              <a:t>6/15/2021</a:t>
+              <a:t>6/16/2021</a:t>
             </a:fld>
             <a:endParaRPr lang="en-US"/>
           </a:p>
@@ -1420,7 +1421,7 @@
           <a:p>
             <a:fld id="{ECACDFAC-FC41-4F3B-A1B9-4F1EB92710B6}" type="datetimeFigureOut">
               <a:rPr lang="en-US" smtClean="0"/>
-              <a:t>6/15/2021</a:t>
+              <a:t>6/16/2021</a:t>
             </a:fld>
             <a:endParaRPr lang="en-US"/>
           </a:p>
@@ -1832,7 +1833,7 @@
           <a:p>
             <a:fld id="{ECACDFAC-FC41-4F3B-A1B9-4F1EB92710B6}" type="datetimeFigureOut">
               <a:rPr lang="en-US" smtClean="0"/>
-              <a:t>6/15/2021</a:t>
+              <a:t>6/16/2021</a:t>
             </a:fld>
             <a:endParaRPr lang="en-US"/>
           </a:p>
@@ -1973,7 +1974,7 @@
           <a:p>
             <a:fld id="{ECACDFAC-FC41-4F3B-A1B9-4F1EB92710B6}" type="datetimeFigureOut">
               <a:rPr lang="en-US" smtClean="0"/>
-              <a:t>6/15/2021</a:t>
+              <a:t>6/16/2021</a:t>
             </a:fld>
             <a:endParaRPr lang="en-US"/>
           </a:p>
@@ -2086,7 +2087,7 @@
           <a:p>
             <a:fld id="{ECACDFAC-FC41-4F3B-A1B9-4F1EB92710B6}" type="datetimeFigureOut">
               <a:rPr lang="en-US" smtClean="0"/>
-              <a:t>6/15/2021</a:t>
+              <a:t>6/16/2021</a:t>
             </a:fld>
             <a:endParaRPr lang="en-US"/>
           </a:p>
@@ -2397,7 +2398,7 @@
           <a:p>
             <a:fld id="{ECACDFAC-FC41-4F3B-A1B9-4F1EB92710B6}" type="datetimeFigureOut">
               <a:rPr lang="en-US" smtClean="0"/>
-              <a:t>6/15/2021</a:t>
+              <a:t>6/16/2021</a:t>
             </a:fld>
             <a:endParaRPr lang="en-US"/>
           </a:p>
@@ -2685,7 +2686,7 @@
           <a:p>
             <a:fld id="{ECACDFAC-FC41-4F3B-A1B9-4F1EB92710B6}" type="datetimeFigureOut">
               <a:rPr lang="en-US" smtClean="0"/>
-              <a:t>6/15/2021</a:t>
+              <a:t>6/16/2021</a:t>
             </a:fld>
             <a:endParaRPr lang="en-US"/>
           </a:p>
@@ -2926,7 +2927,7 @@
           <a:p>
             <a:fld id="{ECACDFAC-FC41-4F3B-A1B9-4F1EB92710B6}" type="datetimeFigureOut">
               <a:rPr lang="en-US" smtClean="0"/>
-              <a:t>6/15/2021</a:t>
+              <a:t>6/16/2021</a:t>
             </a:fld>
             <a:endParaRPr lang="en-US"/>
           </a:p>
@@ -3821,6 +3822,100 @@
 <file path=ppt/slides/slide10.xml><?xml version="1.0" encoding="utf-8"?>
 <p:sld xmlns:a="http://schemas.openxmlformats.org/drawingml/2006/main" xmlns:r="http://schemas.openxmlformats.org/officeDocument/2006/relationships" xmlns:p="http://schemas.openxmlformats.org/presentationml/2006/main">
   <p:cSld>
+    <p:spTree>
+      <p:nvGrpSpPr>
+        <p:cNvPr id="1" name=""/>
+        <p:cNvGrpSpPr/>
+        <p:nvPr/>
+      </p:nvGrpSpPr>
+      <p:grpSpPr>
+        <a:xfrm>
+          <a:off x="0" y="0"/>
+          <a:ext cx="0" cy="0"/>
+          <a:chOff x="0" y="0"/>
+          <a:chExt cx="0" cy="0"/>
+        </a:xfrm>
+      </p:grpSpPr>
+      <p:sp>
+        <p:nvSpPr>
+          <p:cNvPr id="2" name="Title 1">
+            <a:extLst>
+              <a:ext uri="{FF2B5EF4-FFF2-40B4-BE49-F238E27FC236}">
+                <a16:creationId xmlns:a16="http://schemas.microsoft.com/office/drawing/2014/main" id="{49C735E6-F3E2-4C7D-BEFD-D14D795BD513}"/>
+              </a:ext>
+            </a:extLst>
+          </p:cNvPr>
+          <p:cNvSpPr>
+            <a:spLocks noGrp="1"/>
+          </p:cNvSpPr>
+          <p:nvPr>
+            <p:ph type="title"/>
+          </p:nvPr>
+        </p:nvSpPr>
+        <p:spPr/>
+        <p:txBody>
+          <a:bodyPr/>
+          <a:lstStyle/>
+          <a:p>
+            <a:r>
+              <a:rPr lang="en-US" dirty="0">
+                <a:solidFill>
+                  <a:srgbClr val="C00000"/>
+                </a:solidFill>
+              </a:rPr>
+              <a:t>Exception Handling</a:t>
+            </a:r>
+          </a:p>
+        </p:txBody>
+      </p:sp>
+      <p:pic>
+        <p:nvPicPr>
+          <p:cNvPr id="12" name="Content Placeholder 11">
+            <a:extLst>
+              <a:ext uri="{FF2B5EF4-FFF2-40B4-BE49-F238E27FC236}">
+                <a16:creationId xmlns:a16="http://schemas.microsoft.com/office/drawing/2014/main" id="{B6D760C8-DDDA-4FF2-A40C-0528A71D1812}"/>
+              </a:ext>
+            </a:extLst>
+          </p:cNvPr>
+          <p:cNvPicPr>
+            <a:picLocks noGrp="1" noChangeAspect="1"/>
+          </p:cNvPicPr>
+          <p:nvPr>
+            <p:ph idx="1"/>
+          </p:nvPr>
+        </p:nvPicPr>
+        <p:blipFill>
+          <a:blip r:embed="rId2"/>
+          <a:stretch>
+            <a:fillRect/>
+          </a:stretch>
+        </p:blipFill>
+        <p:spPr>
+          <a:xfrm>
+            <a:off x="838200" y="2297951"/>
+            <a:ext cx="10111019" cy="3332828"/>
+          </a:xfrm>
+          <a:prstGeom prst="rect">
+            <a:avLst/>
+          </a:prstGeom>
+        </p:spPr>
+      </p:pic>
+    </p:spTree>
+    <p:extLst>
+      <p:ext uri="{BB962C8B-B14F-4D97-AF65-F5344CB8AC3E}">
+        <p14:creationId xmlns:p14="http://schemas.microsoft.com/office/powerpoint/2010/main" val="4027085851"/>
+      </p:ext>
+    </p:extLst>
+  </p:cSld>
+  <p:clrMapOvr>
+    <a:masterClrMapping/>
+  </p:clrMapOvr>
+</p:sld>
+</file>
+
+<file path=ppt/slides/slide11.xml><?xml version="1.0" encoding="utf-8"?>
+<p:sld xmlns:a="http://schemas.openxmlformats.org/drawingml/2006/main" xmlns:r="http://schemas.openxmlformats.org/officeDocument/2006/relationships" xmlns:p="http://schemas.openxmlformats.org/presentationml/2006/main">
+  <p:cSld>
     <p:bg>
       <p:bgPr>
         <a:solidFill>
@@ -4147,25 +4242,6 @@
           </a:bodyPr>
           <a:lstStyle/>
           <a:p>
-            <a:pPr>
-              <a:buFont typeface="Arial" panose="020B0604020202020204" pitchFamily="34" charset="0"/>
-              <a:buChar char="•"/>
-            </a:pPr>
-            <a:r>
-              <a:rPr lang="en-US" sz="2200" dirty="0">
-                <a:solidFill>
-                  <a:schemeClr val="accent6"/>
-                </a:solidFill>
-                <a:latin typeface="-apple-system"/>
-              </a:rPr>
-              <a:t>EF Core w/ Db Approach</a:t>
-            </a:r>
-          </a:p>
-          <a:p>
-            <a:pPr>
-              <a:buFont typeface="Arial" panose="020B0604020202020204" pitchFamily="34" charset="0"/>
-              <a:buChar char="•"/>
-            </a:pPr>
             <a:r>
               <a:rPr lang="en-US" sz="2200" b="0" i="0" dirty="0">
                 <a:solidFill>
@@ -4196,6 +4272,21 @@
             </a:r>
           </a:p>
           <a:p>
+            <a:pPr>
+              <a:buFont typeface="Arial" panose="020B0604020202020204" pitchFamily="34" charset="0"/>
+              <a:buChar char="•"/>
+            </a:pPr>
+            <a:r>
+              <a:rPr lang="en-US" sz="2200" dirty="0">
+                <a:solidFill>
+                  <a:schemeClr val="accent6"/>
+                </a:solidFill>
+                <a:latin typeface="-apple-system"/>
+              </a:rPr>
+              <a:t>EF Core w/ Db Approach</a:t>
+            </a:r>
+          </a:p>
+          <a:p>
             <a:r>
               <a:rPr lang="en-US" sz="2200" b="0" i="0" dirty="0">
                 <a:solidFill>
@@ -4390,150 +4481,6 @@
     <p:extLst>
       <p:ext uri="{BB962C8B-B14F-4D97-AF65-F5344CB8AC3E}">
         <p14:creationId xmlns:p14="http://schemas.microsoft.com/office/powerpoint/2010/main" val="3274383637"/>
-      </p:ext>
-    </p:extLst>
-  </p:cSld>
-  <p:clrMapOvr>
-    <a:masterClrMapping/>
-  </p:clrMapOvr>
-</p:sld>
-</file>
-
-<file path=ppt/slides/slide11.xml><?xml version="1.0" encoding="utf-8"?>
-<p:sld xmlns:a="http://schemas.openxmlformats.org/drawingml/2006/main" xmlns:r="http://schemas.openxmlformats.org/officeDocument/2006/relationships" xmlns:p="http://schemas.openxmlformats.org/presentationml/2006/main">
-  <p:cSld>
-    <p:spTree>
-      <p:nvGrpSpPr>
-        <p:cNvPr id="1" name=""/>
-        <p:cNvGrpSpPr/>
-        <p:nvPr/>
-      </p:nvGrpSpPr>
-      <p:grpSpPr>
-        <a:xfrm>
-          <a:off x="0" y="0"/>
-          <a:ext cx="0" cy="0"/>
-          <a:chOff x="0" y="0"/>
-          <a:chExt cx="0" cy="0"/>
-        </a:xfrm>
-      </p:grpSpPr>
-      <p:sp>
-        <p:nvSpPr>
-          <p:cNvPr id="2" name="Title 1">
-            <a:extLst>
-              <a:ext uri="{FF2B5EF4-FFF2-40B4-BE49-F238E27FC236}">
-                <a16:creationId xmlns:a16="http://schemas.microsoft.com/office/drawing/2014/main" id="{49C735E6-F3E2-4C7D-BEFD-D14D795BD513}"/>
-              </a:ext>
-            </a:extLst>
-          </p:cNvPr>
-          <p:cNvSpPr>
-            <a:spLocks noGrp="1"/>
-          </p:cNvSpPr>
-          <p:nvPr>
-            <p:ph type="title"/>
-          </p:nvPr>
-        </p:nvSpPr>
-        <p:spPr/>
-        <p:txBody>
-          <a:bodyPr/>
-          <a:lstStyle/>
-          <a:p>
-            <a:r>
-              <a:rPr lang="en-US" dirty="0">
-                <a:solidFill>
-                  <a:schemeClr val="accent6"/>
-                </a:solidFill>
-              </a:rPr>
-              <a:t>EF Core w/ Db 1</a:t>
-            </a:r>
-            <a:r>
-              <a:rPr lang="en-US" baseline="30000" dirty="0">
-                <a:solidFill>
-                  <a:schemeClr val="accent6"/>
-                </a:solidFill>
-              </a:rPr>
-              <a:t>st</a:t>
-            </a:r>
-            <a:r>
-              <a:rPr lang="en-US" dirty="0">
-                <a:solidFill>
-                  <a:schemeClr val="accent6"/>
-                </a:solidFill>
-              </a:rPr>
-              <a:t> Approach</a:t>
-            </a:r>
-          </a:p>
-        </p:txBody>
-      </p:sp>
-      <p:sp>
-        <p:nvSpPr>
-          <p:cNvPr id="4" name="Content Placeholder 3">
-            <a:extLst>
-              <a:ext uri="{FF2B5EF4-FFF2-40B4-BE49-F238E27FC236}">
-                <a16:creationId xmlns:a16="http://schemas.microsoft.com/office/drawing/2014/main" id="{28E17A24-B23D-4F9E-B65F-7CB82BF5184D}"/>
-              </a:ext>
-            </a:extLst>
-          </p:cNvPr>
-          <p:cNvSpPr>
-            <a:spLocks noGrp="1"/>
-          </p:cNvSpPr>
-          <p:nvPr>
-            <p:ph idx="1"/>
-          </p:nvPr>
-        </p:nvSpPr>
-        <p:spPr>
-          <a:xfrm>
-            <a:off x="838200" y="1825624"/>
-            <a:ext cx="2482341" cy="4351338"/>
-          </a:xfrm>
-        </p:spPr>
-        <p:txBody>
-          <a:bodyPr/>
-          <a:lstStyle/>
-          <a:p>
-            <a:r>
-              <a:rPr lang="en-US" dirty="0"/>
-              <a:t>P0DbContext repo contains full Model builder</a:t>
-            </a:r>
-          </a:p>
-          <a:p>
-            <a:endParaRPr lang="en-US" dirty="0"/>
-          </a:p>
-        </p:txBody>
-      </p:sp>
-      <p:pic>
-        <p:nvPicPr>
-          <p:cNvPr id="9" name="Picture 8">
-            <a:extLst>
-              <a:ext uri="{FF2B5EF4-FFF2-40B4-BE49-F238E27FC236}">
-                <a16:creationId xmlns:a16="http://schemas.microsoft.com/office/drawing/2014/main" id="{BE623E61-484E-4A2A-A171-3F141B27A156}"/>
-              </a:ext>
-            </a:extLst>
-          </p:cNvPr>
-          <p:cNvPicPr>
-            <a:picLocks noChangeAspect="1"/>
-          </p:cNvPicPr>
-          <p:nvPr/>
-        </p:nvPicPr>
-        <p:blipFill>
-          <a:blip r:embed="rId2"/>
-          <a:stretch>
-            <a:fillRect/>
-          </a:stretch>
-        </p:blipFill>
-        <p:spPr>
-          <a:xfrm>
-            <a:off x="4555066" y="1281544"/>
-            <a:ext cx="6968067" cy="5439499"/>
-          </a:xfrm>
-          <a:prstGeom prst="rect">
-            <a:avLst/>
-          </a:prstGeom>
-        </p:spPr>
-      </p:pic>
-    </p:spTree>
-    <p:extLst>
-      <p:ext uri="{BB962C8B-B14F-4D97-AF65-F5344CB8AC3E}">
-        <p14:creationId xmlns:p14="http://schemas.microsoft.com/office/powerpoint/2010/main" val="1139084455"/>
       </p:ext>
     </p:extLst>
   </p:cSld>
@@ -4656,7 +4603,7 @@
           <p:cNvPr id="2" name="Title 1">
             <a:extLst>
               <a:ext uri="{FF2B5EF4-FFF2-40B4-BE49-F238E27FC236}">
-                <a16:creationId xmlns:a16="http://schemas.microsoft.com/office/drawing/2014/main" id="{8A26F4CD-BFCB-482D-B8EA-8D40F40063FB}"/>
+                <a16:creationId xmlns:a16="http://schemas.microsoft.com/office/drawing/2014/main" id="{49C735E6-F3E2-4C7D-BEFD-D14D795BD513}"/>
               </a:ext>
             </a:extLst>
           </p:cNvPr>
@@ -4673,33 +4620,81 @@
           <a:lstStyle/>
           <a:p>
             <a:r>
-              <a:rPr lang="en-US" sz="4400" b="0" i="0" dirty="0">
+              <a:rPr lang="en-US" dirty="0">
                 <a:solidFill>
                   <a:schemeClr val="accent6"/>
                 </a:solidFill>
-                <a:effectLst/>
-                <a:latin typeface="-apple-system"/>
               </a:rPr>
-              <a:t>Locations have an inventory</a:t>
-            </a:r>
+              <a:t>EF Core w/ Db 1</a:t>
+            </a:r>
+            <a:r>
+              <a:rPr lang="en-US" baseline="30000" dirty="0">
+                <a:solidFill>
+                  <a:schemeClr val="accent6"/>
+                </a:solidFill>
+              </a:rPr>
+              <a:t>st</a:t>
+            </a:r>
+            <a:r>
+              <a:rPr lang="en-US" dirty="0">
+                <a:solidFill>
+                  <a:schemeClr val="accent6"/>
+                </a:solidFill>
+              </a:rPr>
+              <a:t> Approach</a:t>
+            </a:r>
+          </a:p>
+        </p:txBody>
+      </p:sp>
+      <p:sp>
+        <p:nvSpPr>
+          <p:cNvPr id="4" name="Content Placeholder 3">
+            <a:extLst>
+              <a:ext uri="{FF2B5EF4-FFF2-40B4-BE49-F238E27FC236}">
+                <a16:creationId xmlns:a16="http://schemas.microsoft.com/office/drawing/2014/main" id="{28E17A24-B23D-4F9E-B65F-7CB82BF5184D}"/>
+              </a:ext>
+            </a:extLst>
+          </p:cNvPr>
+          <p:cNvSpPr>
+            <a:spLocks noGrp="1"/>
+          </p:cNvSpPr>
+          <p:nvPr>
+            <p:ph idx="1"/>
+          </p:nvPr>
+        </p:nvSpPr>
+        <p:spPr>
+          <a:xfrm>
+            <a:off x="838200" y="1825624"/>
+            <a:ext cx="2482341" cy="4351338"/>
+          </a:xfrm>
+        </p:spPr>
+        <p:txBody>
+          <a:bodyPr/>
+          <a:lstStyle/>
+          <a:p>
+            <a:r>
+              <a:rPr lang="en-US" dirty="0"/>
+              <a:t>P0DbContext repo contains full Model builder</a:t>
+            </a:r>
+          </a:p>
+          <a:p>
+            <a:endParaRPr lang="en-US" dirty="0"/>
           </a:p>
         </p:txBody>
       </p:sp>
       <p:pic>
         <p:nvPicPr>
-          <p:cNvPr id="8" name="Content Placeholder 7">
-            <a:extLst>
-              <a:ext uri="{FF2B5EF4-FFF2-40B4-BE49-F238E27FC236}">
-                <a16:creationId xmlns:a16="http://schemas.microsoft.com/office/drawing/2014/main" id="{3A81C12B-FC64-4B52-9C46-C1002C149DE3}"/>
+          <p:cNvPr id="9" name="Picture 8">
+            <a:extLst>
+              <a:ext uri="{FF2B5EF4-FFF2-40B4-BE49-F238E27FC236}">
+                <a16:creationId xmlns:a16="http://schemas.microsoft.com/office/drawing/2014/main" id="{BE623E61-484E-4A2A-A171-3F141B27A156}"/>
               </a:ext>
             </a:extLst>
           </p:cNvPr>
           <p:cNvPicPr>
-            <a:picLocks noGrp="1" noChangeAspect="1"/>
+            <a:picLocks noChangeAspect="1"/>
           </p:cNvPicPr>
-          <p:nvPr>
-            <p:ph idx="1"/>
-          </p:nvPr>
+          <p:nvPr/>
         </p:nvPicPr>
         <p:blipFill>
           <a:blip r:embed="rId2"/>
@@ -4709,15 +4704,18 @@
         </p:blipFill>
         <p:spPr>
           <a:xfrm>
-            <a:off x="838199" y="1621982"/>
-            <a:ext cx="8271933" cy="4575606"/>
-          </a:xfrm>
+            <a:off x="4555066" y="1281544"/>
+            <a:ext cx="6968067" cy="5439499"/>
+          </a:xfrm>
+          <a:prstGeom prst="rect">
+            <a:avLst/>
+          </a:prstGeom>
         </p:spPr>
       </p:pic>
     </p:spTree>
     <p:extLst>
       <p:ext uri="{BB962C8B-B14F-4D97-AF65-F5344CB8AC3E}">
-        <p14:creationId xmlns:p14="http://schemas.microsoft.com/office/powerpoint/2010/main" val="913143922"/>
+        <p14:creationId xmlns:p14="http://schemas.microsoft.com/office/powerpoint/2010/main" val="1139084455"/>
       </p:ext>
     </p:extLst>
   </p:cSld>
@@ -4780,6 +4778,99 @@
       </p:sp>
       <p:pic>
         <p:nvPicPr>
+          <p:cNvPr id="8" name="Content Placeholder 7">
+            <a:extLst>
+              <a:ext uri="{FF2B5EF4-FFF2-40B4-BE49-F238E27FC236}">
+                <a16:creationId xmlns:a16="http://schemas.microsoft.com/office/drawing/2014/main" id="{3A81C12B-FC64-4B52-9C46-C1002C149DE3}"/>
+              </a:ext>
+            </a:extLst>
+          </p:cNvPr>
+          <p:cNvPicPr>
+            <a:picLocks noGrp="1" noChangeAspect="1"/>
+          </p:cNvPicPr>
+          <p:nvPr>
+            <p:ph idx="1"/>
+          </p:nvPr>
+        </p:nvPicPr>
+        <p:blipFill>
+          <a:blip r:embed="rId2"/>
+          <a:stretch>
+            <a:fillRect/>
+          </a:stretch>
+        </p:blipFill>
+        <p:spPr>
+          <a:xfrm>
+            <a:off x="838199" y="1621982"/>
+            <a:ext cx="8271933" cy="4575606"/>
+          </a:xfrm>
+        </p:spPr>
+      </p:pic>
+    </p:spTree>
+    <p:extLst>
+      <p:ext uri="{BB962C8B-B14F-4D97-AF65-F5344CB8AC3E}">
+        <p14:creationId xmlns:p14="http://schemas.microsoft.com/office/powerpoint/2010/main" val="913143922"/>
+      </p:ext>
+    </p:extLst>
+  </p:cSld>
+  <p:clrMapOvr>
+    <a:masterClrMapping/>
+  </p:clrMapOvr>
+</p:sld>
+</file>
+
+<file path=ppt/slides/slide15.xml><?xml version="1.0" encoding="utf-8"?>
+<p:sld xmlns:a="http://schemas.openxmlformats.org/drawingml/2006/main" xmlns:r="http://schemas.openxmlformats.org/officeDocument/2006/relationships" xmlns:p="http://schemas.openxmlformats.org/presentationml/2006/main">
+  <p:cSld>
+    <p:spTree>
+      <p:nvGrpSpPr>
+        <p:cNvPr id="1" name=""/>
+        <p:cNvGrpSpPr/>
+        <p:nvPr/>
+      </p:nvGrpSpPr>
+      <p:grpSpPr>
+        <a:xfrm>
+          <a:off x="0" y="0"/>
+          <a:ext cx="0" cy="0"/>
+          <a:chOff x="0" y="0"/>
+          <a:chExt cx="0" cy="0"/>
+        </a:xfrm>
+      </p:grpSpPr>
+      <p:sp>
+        <p:nvSpPr>
+          <p:cNvPr id="2" name="Title 1">
+            <a:extLst>
+              <a:ext uri="{FF2B5EF4-FFF2-40B4-BE49-F238E27FC236}">
+                <a16:creationId xmlns:a16="http://schemas.microsoft.com/office/drawing/2014/main" id="{8A26F4CD-BFCB-482D-B8EA-8D40F40063FB}"/>
+              </a:ext>
+            </a:extLst>
+          </p:cNvPr>
+          <p:cNvSpPr>
+            <a:spLocks noGrp="1"/>
+          </p:cNvSpPr>
+          <p:nvPr>
+            <p:ph type="title"/>
+          </p:nvPr>
+        </p:nvSpPr>
+        <p:spPr/>
+        <p:txBody>
+          <a:bodyPr/>
+          <a:lstStyle/>
+          <a:p>
+            <a:r>
+              <a:rPr lang="en-US" sz="4400" b="0" i="0" dirty="0">
+                <a:solidFill>
+                  <a:schemeClr val="accent6"/>
+                </a:solidFill>
+                <a:effectLst/>
+                <a:latin typeface="-apple-system"/>
+              </a:rPr>
+              <a:t>Locations have an inventory</a:t>
+            </a:r>
+          </a:p>
+        </p:txBody>
+      </p:sp>
+      <p:pic>
+        <p:nvPicPr>
           <p:cNvPr id="5" name="Content Placeholder 4">
             <a:extLst>
               <a:ext uri="{FF2B5EF4-FFF2-40B4-BE49-F238E27FC236}">
@@ -4952,7 +5043,7 @@
 </p:sld>
 </file>
 
-<file path=ppt/slides/slide15.xml><?xml version="1.0" encoding="utf-8"?>
+<file path=ppt/slides/slide16.xml><?xml version="1.0" encoding="utf-8"?>
 <p:sld xmlns:a="http://schemas.openxmlformats.org/drawingml/2006/main" xmlns:r="http://schemas.openxmlformats.org/officeDocument/2006/relationships" xmlns:p="http://schemas.openxmlformats.org/presentationml/2006/main">
   <p:cSld>
     <p:bg>
@@ -5186,7 +5277,11 @@
           <a:lstStyle/>
           <a:p>
             <a:r>
-              <a:rPr lang="en-US" dirty="0"/>
+              <a:rPr lang="en-US" dirty="0">
+                <a:solidFill>
+                  <a:schemeClr val="accent4"/>
+                </a:solidFill>
+              </a:rPr>
               <a:t>Solution Design</a:t>
             </a:r>
           </a:p>
@@ -5286,100 +5381,6 @@
     <p:extLst>
       <p:ext uri="{BB962C8B-B14F-4D97-AF65-F5344CB8AC3E}">
         <p14:creationId xmlns:p14="http://schemas.microsoft.com/office/powerpoint/2010/main" val="4054503862"/>
-      </p:ext>
-    </p:extLst>
-  </p:cSld>
-  <p:clrMapOvr>
-    <a:masterClrMapping/>
-  </p:clrMapOvr>
-</p:sld>
-</file>
-
-<file path=ppt/slides/slide16.xml><?xml version="1.0" encoding="utf-8"?>
-<p:sld xmlns:a="http://schemas.openxmlformats.org/drawingml/2006/main" xmlns:r="http://schemas.openxmlformats.org/officeDocument/2006/relationships" xmlns:p="http://schemas.openxmlformats.org/presentationml/2006/main">
-  <p:cSld>
-    <p:spTree>
-      <p:nvGrpSpPr>
-        <p:cNvPr id="1" name=""/>
-        <p:cNvGrpSpPr/>
-        <p:nvPr/>
-      </p:nvGrpSpPr>
-      <p:grpSpPr>
-        <a:xfrm>
-          <a:off x="0" y="0"/>
-          <a:ext cx="0" cy="0"/>
-          <a:chOff x="0" y="0"/>
-          <a:chExt cx="0" cy="0"/>
-        </a:xfrm>
-      </p:grpSpPr>
-      <p:sp>
-        <p:nvSpPr>
-          <p:cNvPr id="2" name="Title 1">
-            <a:extLst>
-              <a:ext uri="{FF2B5EF4-FFF2-40B4-BE49-F238E27FC236}">
-                <a16:creationId xmlns:a16="http://schemas.microsoft.com/office/drawing/2014/main" id="{49C735E6-F3E2-4C7D-BEFD-D14D795BD513}"/>
-              </a:ext>
-            </a:extLst>
-          </p:cNvPr>
-          <p:cNvSpPr>
-            <a:spLocks noGrp="1"/>
-          </p:cNvSpPr>
-          <p:nvPr>
-            <p:ph type="title"/>
-          </p:nvPr>
-        </p:nvSpPr>
-        <p:spPr/>
-        <p:txBody>
-          <a:bodyPr/>
-          <a:lstStyle/>
-          <a:p>
-            <a:r>
-              <a:rPr lang="en-US" dirty="0">
-                <a:solidFill>
-                  <a:schemeClr val="accent4"/>
-                </a:solidFill>
-              </a:rPr>
-              <a:t>Interfaces</a:t>
-            </a:r>
-          </a:p>
-        </p:txBody>
-      </p:sp>
-      <p:pic>
-        <p:nvPicPr>
-          <p:cNvPr id="8" name="Content Placeholder 7">
-            <a:extLst>
-              <a:ext uri="{FF2B5EF4-FFF2-40B4-BE49-F238E27FC236}">
-                <a16:creationId xmlns:a16="http://schemas.microsoft.com/office/drawing/2014/main" id="{96EDF869-4375-4055-AF1D-E2DDE2E28CFF}"/>
-              </a:ext>
-            </a:extLst>
-          </p:cNvPr>
-          <p:cNvPicPr>
-            <a:picLocks noGrp="1" noChangeAspect="1"/>
-          </p:cNvPicPr>
-          <p:nvPr>
-            <p:ph idx="1"/>
-          </p:nvPr>
-        </p:nvPicPr>
-        <p:blipFill>
-          <a:blip r:embed="rId2"/>
-          <a:stretch>
-            <a:fillRect/>
-          </a:stretch>
-        </p:blipFill>
-        <p:spPr>
-          <a:xfrm>
-            <a:off x="4166365" y="416211"/>
-            <a:ext cx="6644296" cy="6244038"/>
-          </a:xfrm>
-          <a:prstGeom prst="rect">
-            <a:avLst/>
-          </a:prstGeom>
-        </p:spPr>
-      </p:pic>
-    </p:spTree>
-    <p:extLst>
-      <p:ext uri="{BB962C8B-B14F-4D97-AF65-F5344CB8AC3E}">
-        <p14:creationId xmlns:p14="http://schemas.microsoft.com/office/powerpoint/2010/main" val="1362093315"/>
       </p:ext>
     </p:extLst>
   </p:cSld>
@@ -5433,6 +5434,100 @@
                   <a:schemeClr val="accent4"/>
                 </a:solidFill>
               </a:rPr>
+              <a:t>Interfaces</a:t>
+            </a:r>
+          </a:p>
+        </p:txBody>
+      </p:sp>
+      <p:pic>
+        <p:nvPicPr>
+          <p:cNvPr id="8" name="Content Placeholder 7">
+            <a:extLst>
+              <a:ext uri="{FF2B5EF4-FFF2-40B4-BE49-F238E27FC236}">
+                <a16:creationId xmlns:a16="http://schemas.microsoft.com/office/drawing/2014/main" id="{96EDF869-4375-4055-AF1D-E2DDE2E28CFF}"/>
+              </a:ext>
+            </a:extLst>
+          </p:cNvPr>
+          <p:cNvPicPr>
+            <a:picLocks noGrp="1" noChangeAspect="1"/>
+          </p:cNvPicPr>
+          <p:nvPr>
+            <p:ph idx="1"/>
+          </p:nvPr>
+        </p:nvPicPr>
+        <p:blipFill>
+          <a:blip r:embed="rId2"/>
+          <a:stretch>
+            <a:fillRect/>
+          </a:stretch>
+        </p:blipFill>
+        <p:spPr>
+          <a:xfrm>
+            <a:off x="4166365" y="416211"/>
+            <a:ext cx="6644296" cy="6244038"/>
+          </a:xfrm>
+          <a:prstGeom prst="rect">
+            <a:avLst/>
+          </a:prstGeom>
+        </p:spPr>
+      </p:pic>
+    </p:spTree>
+    <p:extLst>
+      <p:ext uri="{BB962C8B-B14F-4D97-AF65-F5344CB8AC3E}">
+        <p14:creationId xmlns:p14="http://schemas.microsoft.com/office/powerpoint/2010/main" val="1362093315"/>
+      </p:ext>
+    </p:extLst>
+  </p:cSld>
+  <p:clrMapOvr>
+    <a:masterClrMapping/>
+  </p:clrMapOvr>
+</p:sld>
+</file>
+
+<file path=ppt/slides/slide18.xml><?xml version="1.0" encoding="utf-8"?>
+<p:sld xmlns:a="http://schemas.openxmlformats.org/drawingml/2006/main" xmlns:r="http://schemas.openxmlformats.org/officeDocument/2006/relationships" xmlns:p="http://schemas.openxmlformats.org/presentationml/2006/main">
+  <p:cSld>
+    <p:spTree>
+      <p:nvGrpSpPr>
+        <p:cNvPr id="1" name=""/>
+        <p:cNvGrpSpPr/>
+        <p:nvPr/>
+      </p:nvGrpSpPr>
+      <p:grpSpPr>
+        <a:xfrm>
+          <a:off x="0" y="0"/>
+          <a:ext cx="0" cy="0"/>
+          <a:chOff x="0" y="0"/>
+          <a:chExt cx="0" cy="0"/>
+        </a:xfrm>
+      </p:grpSpPr>
+      <p:sp>
+        <p:nvSpPr>
+          <p:cNvPr id="2" name="Title 1">
+            <a:extLst>
+              <a:ext uri="{FF2B5EF4-FFF2-40B4-BE49-F238E27FC236}">
+                <a16:creationId xmlns:a16="http://schemas.microsoft.com/office/drawing/2014/main" id="{49C735E6-F3E2-4C7D-BEFD-D14D795BD513}"/>
+              </a:ext>
+            </a:extLst>
+          </p:cNvPr>
+          <p:cNvSpPr>
+            <a:spLocks noGrp="1"/>
+          </p:cNvSpPr>
+          <p:nvPr>
+            <p:ph type="title"/>
+          </p:nvPr>
+        </p:nvSpPr>
+        <p:spPr/>
+        <p:txBody>
+          <a:bodyPr/>
+          <a:lstStyle/>
+          <a:p>
+            <a:r>
+              <a:rPr lang="en-US" dirty="0">
+                <a:solidFill>
+                  <a:schemeClr val="accent4"/>
+                </a:solidFill>
+              </a:rPr>
               <a:t>Persistent Data</a:t>
             </a:r>
           </a:p>
@@ -5480,7 +5575,7 @@
 </p:sld>
 </file>
 
-<file path=ppt/slides/slide18.xml><?xml version="1.0" encoding="utf-8"?>
+<file path=ppt/slides/slide19.xml><?xml version="1.0" encoding="utf-8"?>
 <p:sld xmlns:a="http://schemas.openxmlformats.org/drawingml/2006/main" xmlns:r="http://schemas.openxmlformats.org/officeDocument/2006/relationships" xmlns:p="http://schemas.openxmlformats.org/presentationml/2006/main">
   <p:cSld>
     <p:spTree>
@@ -6372,10 +6467,10 @@
       </p:sp>
       <p:pic>
         <p:nvPicPr>
-          <p:cNvPr id="8" name="Picture 7">
-            <a:extLst>
-              <a:ext uri="{FF2B5EF4-FFF2-40B4-BE49-F238E27FC236}">
-                <a16:creationId xmlns:a16="http://schemas.microsoft.com/office/drawing/2014/main" id="{0943CA9F-6DAB-4168-942E-F717978DC148}"/>
+          <p:cNvPr id="10" name="Picture 9">
+            <a:extLst>
+              <a:ext uri="{FF2B5EF4-FFF2-40B4-BE49-F238E27FC236}">
+                <a16:creationId xmlns:a16="http://schemas.microsoft.com/office/drawing/2014/main" id="{E01A35FC-3DC3-4680-B4C6-809BDA254553}"/>
               </a:ext>
             </a:extLst>
           </p:cNvPr>
@@ -6392,8 +6487,8 @@
         </p:blipFill>
         <p:spPr>
           <a:xfrm>
-            <a:off x="0" y="4448876"/>
-            <a:ext cx="7055213" cy="2311519"/>
+            <a:off x="7529401" y="1535197"/>
+            <a:ext cx="4115011" cy="2711589"/>
           </a:xfrm>
           <a:prstGeom prst="rect">
             <a:avLst/>
@@ -6402,17 +6497,19 @@
       </p:pic>
       <p:pic>
         <p:nvPicPr>
-          <p:cNvPr id="10" name="Picture 9">
-            <a:extLst>
-              <a:ext uri="{FF2B5EF4-FFF2-40B4-BE49-F238E27FC236}">
-                <a16:creationId xmlns:a16="http://schemas.microsoft.com/office/drawing/2014/main" id="{E01A35FC-3DC3-4680-B4C6-809BDA254553}"/>
+          <p:cNvPr id="16" name="Content Placeholder 15">
+            <a:extLst>
+              <a:ext uri="{FF2B5EF4-FFF2-40B4-BE49-F238E27FC236}">
+                <a16:creationId xmlns:a16="http://schemas.microsoft.com/office/drawing/2014/main" id="{E06989FE-0B01-4436-A53E-43F188EE9D97}"/>
               </a:ext>
             </a:extLst>
           </p:cNvPr>
           <p:cNvPicPr>
-            <a:picLocks noChangeAspect="1"/>
+            <a:picLocks noGrp="1" noChangeAspect="1"/>
           </p:cNvPicPr>
-          <p:nvPr/>
+          <p:nvPr>
+            <p:ph idx="1"/>
+          </p:nvPr>
         </p:nvPicPr>
         <p:blipFill>
           <a:blip r:embed="rId3"/>
@@ -6422,20 +6519,17 @@
         </p:blipFill>
         <p:spPr>
           <a:xfrm>
-            <a:off x="7529401" y="1535197"/>
-            <a:ext cx="4115011" cy="2711589"/>
-          </a:xfrm>
-          <a:prstGeom prst="rect">
-            <a:avLst/>
-          </a:prstGeom>
+            <a:off x="177175" y="1690688"/>
+            <a:ext cx="7144117" cy="2495678"/>
+          </a:xfrm>
         </p:spPr>
       </p:pic>
       <p:pic>
         <p:nvPicPr>
-          <p:cNvPr id="12" name="Picture 11">
-            <a:extLst>
-              <a:ext uri="{FF2B5EF4-FFF2-40B4-BE49-F238E27FC236}">
-                <a16:creationId xmlns:a16="http://schemas.microsoft.com/office/drawing/2014/main" id="{35B8C760-D0EC-4284-96AF-EA8E3D136908}"/>
+          <p:cNvPr id="4" name="Picture 3">
+            <a:extLst>
+              <a:ext uri="{FF2B5EF4-FFF2-40B4-BE49-F238E27FC236}">
+                <a16:creationId xmlns:a16="http://schemas.microsoft.com/office/drawing/2014/main" id="{B649F620-F138-40A2-9FFF-27562D2C9A92}"/>
               </a:ext>
             </a:extLst>
           </p:cNvPr>
@@ -6452,8 +6546,8 @@
         </p:blipFill>
         <p:spPr>
           <a:xfrm>
-            <a:off x="7567502" y="4908832"/>
-            <a:ext cx="4076910" cy="1016052"/>
+            <a:off x="7462722" y="4442650"/>
+            <a:ext cx="4248368" cy="2235315"/>
           </a:xfrm>
           <a:prstGeom prst="rect">
             <a:avLst/>
@@ -6462,19 +6556,17 @@
       </p:pic>
       <p:pic>
         <p:nvPicPr>
-          <p:cNvPr id="16" name="Content Placeholder 15">
-            <a:extLst>
-              <a:ext uri="{FF2B5EF4-FFF2-40B4-BE49-F238E27FC236}">
-                <a16:creationId xmlns:a16="http://schemas.microsoft.com/office/drawing/2014/main" id="{E06989FE-0B01-4436-A53E-43F188EE9D97}"/>
+          <p:cNvPr id="6" name="Picture 5">
+            <a:extLst>
+              <a:ext uri="{FF2B5EF4-FFF2-40B4-BE49-F238E27FC236}">
+                <a16:creationId xmlns:a16="http://schemas.microsoft.com/office/drawing/2014/main" id="{C169F5F9-B174-48D4-80E5-EC8388EA38AB}"/>
               </a:ext>
             </a:extLst>
           </p:cNvPr>
           <p:cNvPicPr>
-            <a:picLocks noGrp="1" noChangeAspect="1"/>
+            <a:picLocks noChangeAspect="1"/>
           </p:cNvPicPr>
-          <p:nvPr>
-            <p:ph idx="1"/>
-          </p:nvPr>
+          <p:nvPr/>
         </p:nvPicPr>
         <p:blipFill>
           <a:blip r:embed="rId5"/>
@@ -6484,9 +6576,12 @@
         </p:blipFill>
         <p:spPr>
           <a:xfrm>
-            <a:off x="177175" y="1690688"/>
-            <a:ext cx="7144117" cy="2495678"/>
-          </a:xfrm>
+            <a:off x="94621" y="4194236"/>
+            <a:ext cx="7226671" cy="2635385"/>
+          </a:xfrm>
+          <a:prstGeom prst="rect">
+            <a:avLst/>
+          </a:prstGeom>
         </p:spPr>
       </p:pic>
     </p:spTree>
@@ -6672,7 +6767,12 @@
             <p:ph type="title"/>
           </p:nvPr>
         </p:nvSpPr>
-        <p:spPr/>
+        <p:spPr>
+          <a:xfrm>
+            <a:off x="474133" y="102658"/>
+            <a:ext cx="10515600" cy="1325563"/>
+          </a:xfrm>
+        </p:spPr>
         <p:txBody>
           <a:bodyPr/>
           <a:lstStyle/>
@@ -6684,18 +6784,15 @@
                 </a:solidFill>
                 <a:latin typeface="-apple-system"/>
               </a:rPr>
-              <a:t>D</a:t>
-            </a:r>
-            <a:r>
-              <a:rPr lang="en-US" sz="4400" b="0" i="0" dirty="0">
-                <a:solidFill>
-                  <a:schemeClr val="accent4"/>
-                </a:solidFill>
-                <a:effectLst/>
-                <a:latin typeface="-apple-system"/>
-              </a:rPr>
-              <a:t>isplay details of an order</a:t>
-            </a:r>
+              <a:t>Crediting Winston</a:t>
+            </a:r>
+            <a:endParaRPr lang="en-US" sz="4400" b="0" i="0" dirty="0">
+              <a:solidFill>
+                <a:schemeClr val="accent4"/>
+              </a:solidFill>
+              <a:effectLst/>
+              <a:latin typeface="-apple-system"/>
+            </a:endParaRPr>
           </a:p>
         </p:txBody>
       </p:sp>
@@ -6704,7 +6801,7 @@
           <p:cNvPr id="9" name="Content Placeholder 8">
             <a:extLst>
               <a:ext uri="{FF2B5EF4-FFF2-40B4-BE49-F238E27FC236}">
-                <a16:creationId xmlns:a16="http://schemas.microsoft.com/office/drawing/2014/main" id="{7FCAC4CA-9130-461C-9642-B04C996AACA6}"/>
+                <a16:creationId xmlns:a16="http://schemas.microsoft.com/office/drawing/2014/main" id="{8EC356AE-F80C-45D9-B5BA-4C0D18275B25}"/>
               </a:ext>
             </a:extLst>
           </p:cNvPr>
@@ -6723,15 +6820,18 @@
         </p:blipFill>
         <p:spPr>
           <a:xfrm>
-            <a:off x="0" y="1810031"/>
-            <a:ext cx="8255424" cy="2292468"/>
-          </a:xfrm>
+            <a:off x="1531722" y="2774109"/>
+            <a:ext cx="8401482" cy="1835244"/>
+          </a:xfrm>
+          <a:prstGeom prst="rect">
+            <a:avLst/>
+          </a:prstGeom>
         </p:spPr>
       </p:pic>
     </p:spTree>
     <p:extLst>
       <p:ext uri="{BB962C8B-B14F-4D97-AF65-F5344CB8AC3E}">
-        <p14:creationId xmlns:p14="http://schemas.microsoft.com/office/powerpoint/2010/main" val="1712774209"/>
+        <p14:creationId xmlns:p14="http://schemas.microsoft.com/office/powerpoint/2010/main" val="3401543557"/>
       </p:ext>
     </p:extLst>
   </p:cSld>
@@ -6763,7 +6863,7 @@
           <p:cNvPr id="2" name="Title 1">
             <a:extLst>
               <a:ext uri="{FF2B5EF4-FFF2-40B4-BE49-F238E27FC236}">
-                <a16:creationId xmlns:a16="http://schemas.microsoft.com/office/drawing/2014/main" id="{49C735E6-F3E2-4C7D-BEFD-D14D795BD513}"/>
+                <a16:creationId xmlns:a16="http://schemas.microsoft.com/office/drawing/2014/main" id="{4D8E78A2-C586-43B3-817C-675DF0C0CB9F}"/>
               </a:ext>
             </a:extLst>
           </p:cNvPr>
@@ -6784,18 +6884,29 @@
                 <a:solidFill>
                   <a:schemeClr val="accent4"/>
                 </a:solidFill>
+                <a:latin typeface="-apple-system"/>
               </a:rPr>
-              <a:t>Input Validation</a:t>
+              <a:t>D</a:t>
+            </a:r>
+            <a:r>
+              <a:rPr lang="en-US" sz="4400" b="0" i="0" dirty="0">
+                <a:solidFill>
+                  <a:schemeClr val="accent4"/>
+                </a:solidFill>
+                <a:effectLst/>
+                <a:latin typeface="-apple-system"/>
+              </a:rPr>
+              <a:t>isplay details of an order</a:t>
             </a:r>
           </a:p>
         </p:txBody>
       </p:sp>
       <p:pic>
         <p:nvPicPr>
-          <p:cNvPr id="5" name="Content Placeholder 4">
-            <a:extLst>
-              <a:ext uri="{FF2B5EF4-FFF2-40B4-BE49-F238E27FC236}">
-                <a16:creationId xmlns:a16="http://schemas.microsoft.com/office/drawing/2014/main" id="{C3F0317C-2F09-4FBB-A7A7-362F21F6895E}"/>
+          <p:cNvPr id="9" name="Content Placeholder 8">
+            <a:extLst>
+              <a:ext uri="{FF2B5EF4-FFF2-40B4-BE49-F238E27FC236}">
+                <a16:creationId xmlns:a16="http://schemas.microsoft.com/office/drawing/2014/main" id="{7FCAC4CA-9130-461C-9642-B04C996AACA6}"/>
               </a:ext>
             </a:extLst>
           </p:cNvPr>
@@ -6806,52 +6917,23 @@
             <p:ph idx="1"/>
           </p:nvPr>
         </p:nvPicPr>
-        <p:blipFill rotWithShape="1">
+        <p:blipFill>
           <a:blip r:embed="rId2"/>
-          <a:srcRect r="4632" b="23330"/>
-          <a:stretch/>
-        </p:blipFill>
-        <p:spPr>
-          <a:xfrm>
-            <a:off x="294047" y="1536169"/>
-            <a:ext cx="8164167" cy="1215498"/>
-          </a:xfrm>
-        </p:spPr>
-      </p:pic>
-      <p:pic>
-        <p:nvPicPr>
-          <p:cNvPr id="7" name="Picture 6">
-            <a:extLst>
-              <a:ext uri="{FF2B5EF4-FFF2-40B4-BE49-F238E27FC236}">
-                <a16:creationId xmlns:a16="http://schemas.microsoft.com/office/drawing/2014/main" id="{E5706FA8-00B8-4E95-B2A2-776818983D2D}"/>
-              </a:ext>
-            </a:extLst>
-          </p:cNvPr>
-          <p:cNvPicPr>
-            <a:picLocks noChangeAspect="1"/>
-          </p:cNvPicPr>
-          <p:nvPr/>
-        </p:nvPicPr>
-        <p:blipFill>
-          <a:blip r:embed="rId3"/>
           <a:stretch>
             <a:fillRect/>
           </a:stretch>
         </p:blipFill>
         <p:spPr>
           <a:xfrm>
-            <a:off x="355600" y="3701867"/>
-            <a:ext cx="8576733" cy="897840"/>
-          </a:xfrm>
-          <a:prstGeom prst="rect">
-            <a:avLst/>
-          </a:prstGeom>
+            <a:off x="0" y="1810031"/>
+            <a:ext cx="8255424" cy="2292468"/>
+          </a:xfrm>
         </p:spPr>
       </p:pic>
     </p:spTree>
     <p:extLst>
       <p:ext uri="{BB962C8B-B14F-4D97-AF65-F5344CB8AC3E}">
-        <p14:creationId xmlns:p14="http://schemas.microsoft.com/office/powerpoint/2010/main" val="99630070"/>
+        <p14:creationId xmlns:p14="http://schemas.microsoft.com/office/powerpoint/2010/main" val="1712774209"/>
       </p:ext>
     </p:extLst>
   </p:cSld>
@@ -6902,20 +6984,20 @@
             <a:r>
               <a:rPr lang="en-US" dirty="0">
                 <a:solidFill>
-                  <a:srgbClr val="C00000"/>
+                  <a:schemeClr val="accent4"/>
                 </a:solidFill>
               </a:rPr>
-              <a:t>Exception Handling</a:t>
+              <a:t>Input Validation</a:t>
             </a:r>
           </a:p>
         </p:txBody>
       </p:sp>
       <p:pic>
         <p:nvPicPr>
-          <p:cNvPr id="12" name="Content Placeholder 11">
-            <a:extLst>
-              <a:ext uri="{FF2B5EF4-FFF2-40B4-BE49-F238E27FC236}">
-                <a16:creationId xmlns:a16="http://schemas.microsoft.com/office/drawing/2014/main" id="{B6D760C8-DDDA-4FF2-A40C-0528A71D1812}"/>
+          <p:cNvPr id="5" name="Content Placeholder 4">
+            <a:extLst>
+              <a:ext uri="{FF2B5EF4-FFF2-40B4-BE49-F238E27FC236}">
+                <a16:creationId xmlns:a16="http://schemas.microsoft.com/office/drawing/2014/main" id="{C3F0317C-2F09-4FBB-A7A7-362F21F6895E}"/>
               </a:ext>
             </a:extLst>
           </p:cNvPr>
@@ -6926,16 +7008,72 @@
             <p:ph idx="1"/>
           </p:nvPr>
         </p:nvPicPr>
+        <p:blipFill rotWithShape="1">
+          <a:blip r:embed="rId2"/>
+          <a:srcRect r="4632" b="23330"/>
+          <a:stretch/>
+        </p:blipFill>
+        <p:spPr>
+          <a:xfrm>
+            <a:off x="294047" y="1536169"/>
+            <a:ext cx="8164167" cy="1215498"/>
+          </a:xfrm>
+        </p:spPr>
+      </p:pic>
+      <p:pic>
+        <p:nvPicPr>
+          <p:cNvPr id="4" name="Picture 3">
+            <a:extLst>
+              <a:ext uri="{FF2B5EF4-FFF2-40B4-BE49-F238E27FC236}">
+                <a16:creationId xmlns:a16="http://schemas.microsoft.com/office/drawing/2014/main" id="{C4A7D303-FBFA-4398-9A81-47B32366C107}"/>
+              </a:ext>
+            </a:extLst>
+          </p:cNvPr>
+          <p:cNvPicPr>
+            <a:picLocks noChangeAspect="1"/>
+          </p:cNvPicPr>
+          <p:nvPr/>
+        </p:nvPicPr>
         <p:blipFill>
-          <a:blip r:embed="rId2"/>
+          <a:blip r:embed="rId3"/>
           <a:stretch>
             <a:fillRect/>
           </a:stretch>
         </p:blipFill>
         <p:spPr>
           <a:xfrm>
-            <a:off x="838200" y="2297951"/>
-            <a:ext cx="7417181" cy="2444876"/>
+            <a:off x="219841" y="3003273"/>
+            <a:ext cx="8312577" cy="3340272"/>
+          </a:xfrm>
+          <a:prstGeom prst="rect">
+            <a:avLst/>
+          </a:prstGeom>
+        </p:spPr>
+      </p:pic>
+      <p:pic>
+        <p:nvPicPr>
+          <p:cNvPr id="9" name="Content Placeholder 7">
+            <a:extLst>
+              <a:ext uri="{FF2B5EF4-FFF2-40B4-BE49-F238E27FC236}">
+                <a16:creationId xmlns:a16="http://schemas.microsoft.com/office/drawing/2014/main" id="{C702B05C-E145-4A62-968A-DFF7A4073289}"/>
+              </a:ext>
+            </a:extLst>
+          </p:cNvPr>
+          <p:cNvPicPr>
+            <a:picLocks noChangeAspect="1"/>
+          </p:cNvPicPr>
+          <p:nvPr/>
+        </p:nvPicPr>
+        <p:blipFill>
+          <a:blip r:embed="rId4"/>
+          <a:stretch>
+            <a:fillRect/>
+          </a:stretch>
+        </p:blipFill>
+        <p:spPr>
+          <a:xfrm>
+            <a:off x="7367265" y="801938"/>
+            <a:ext cx="4610337" cy="482625"/>
           </a:xfrm>
           <a:prstGeom prst="rect">
             <a:avLst/>
@@ -6945,7 +7083,7 @@
     </p:spTree>
     <p:extLst>
       <p:ext uri="{BB962C8B-B14F-4D97-AF65-F5344CB8AC3E}">
-        <p14:creationId xmlns:p14="http://schemas.microsoft.com/office/powerpoint/2010/main" val="4027085851"/>
+        <p14:creationId xmlns:p14="http://schemas.microsoft.com/office/powerpoint/2010/main" val="99630070"/>
       </p:ext>
     </p:extLst>
   </p:cSld>

</xml_diff>

<commit_message>
pushes reorganized PPT & P0 for p1 structure
</commit_message>
<xml_diff>
--- a/Study/P0 Presentation.pptx
+++ b/Study/P0 Presentation.pptx
@@ -6,24 +6,24 @@
   </p:sldMasterIdLst>
   <p:sldIdLst>
     <p:sldId id="256" r:id="rId2"/>
-    <p:sldId id="258" r:id="rId3"/>
-    <p:sldId id="259" r:id="rId4"/>
-    <p:sldId id="264" r:id="rId5"/>
-    <p:sldId id="266" r:id="rId6"/>
-    <p:sldId id="262" r:id="rId7"/>
-    <p:sldId id="278" r:id="rId8"/>
-    <p:sldId id="263" r:id="rId9"/>
-    <p:sldId id="269" r:id="rId10"/>
-    <p:sldId id="270" r:id="rId11"/>
-    <p:sldId id="268" r:id="rId12"/>
-    <p:sldId id="273" r:id="rId13"/>
-    <p:sldId id="274" r:id="rId14"/>
-    <p:sldId id="276" r:id="rId15"/>
-    <p:sldId id="260" r:id="rId16"/>
-    <p:sldId id="271" r:id="rId17"/>
-    <p:sldId id="275" r:id="rId18"/>
-    <p:sldId id="277" r:id="rId19"/>
-    <p:sldId id="272" r:id="rId20"/>
+    <p:sldId id="268" r:id="rId3"/>
+    <p:sldId id="273" r:id="rId4"/>
+    <p:sldId id="274" r:id="rId5"/>
+    <p:sldId id="276" r:id="rId6"/>
+    <p:sldId id="260" r:id="rId7"/>
+    <p:sldId id="271" r:id="rId8"/>
+    <p:sldId id="275" r:id="rId9"/>
+    <p:sldId id="277" r:id="rId10"/>
+    <p:sldId id="272" r:id="rId11"/>
+    <p:sldId id="258" r:id="rId12"/>
+    <p:sldId id="259" r:id="rId13"/>
+    <p:sldId id="264" r:id="rId14"/>
+    <p:sldId id="266" r:id="rId15"/>
+    <p:sldId id="262" r:id="rId16"/>
+    <p:sldId id="278" r:id="rId17"/>
+    <p:sldId id="263" r:id="rId18"/>
+    <p:sldId id="269" r:id="rId19"/>
+    <p:sldId id="270" r:id="rId20"/>
   </p:sldIdLst>
   <p:sldSz cx="12192000" cy="6858000"/>
   <p:notesSz cx="6858000" cy="9144000"/>
@@ -3860,20 +3860,20 @@
             <a:r>
               <a:rPr lang="en-US" dirty="0">
                 <a:solidFill>
-                  <a:srgbClr val="C00000"/>
+                  <a:schemeClr val="accent4"/>
                 </a:solidFill>
               </a:rPr>
-              <a:t>Exception Handling</a:t>
+              <a:t>Persistent Data</a:t>
             </a:r>
           </a:p>
         </p:txBody>
       </p:sp>
       <p:pic>
         <p:nvPicPr>
-          <p:cNvPr id="12" name="Content Placeholder 11">
-            <a:extLst>
-              <a:ext uri="{FF2B5EF4-FFF2-40B4-BE49-F238E27FC236}">
-                <a16:creationId xmlns:a16="http://schemas.microsoft.com/office/drawing/2014/main" id="{B6D760C8-DDDA-4FF2-A40C-0528A71D1812}"/>
+          <p:cNvPr id="6" name="Content Placeholder 5">
+            <a:extLst>
+              <a:ext uri="{FF2B5EF4-FFF2-40B4-BE49-F238E27FC236}">
+                <a16:creationId xmlns:a16="http://schemas.microsoft.com/office/drawing/2014/main" id="{FDC93C71-A87C-479D-9F9D-071E5DE6C310}"/>
               </a:ext>
             </a:extLst>
           </p:cNvPr>
@@ -3884,16 +3884,41 @@
             <p:ph idx="1"/>
           </p:nvPr>
         </p:nvPicPr>
-        <p:blipFill>
+        <p:blipFill rotWithShape="1">
           <a:blip r:embed="rId2"/>
-          <a:stretch>
-            <a:fillRect/>
-          </a:stretch>
+          <a:srcRect l="4741" r="6725" b="12263"/>
+          <a:stretch/>
         </p:blipFill>
         <p:spPr>
           <a:xfrm>
-            <a:off x="838200" y="2297951"/>
-            <a:ext cx="10111019" cy="3332828"/>
+            <a:off x="0" y="1617856"/>
+            <a:ext cx="6426200" cy="2429211"/>
+          </a:xfrm>
+        </p:spPr>
+      </p:pic>
+      <p:pic>
+        <p:nvPicPr>
+          <p:cNvPr id="8" name="Picture 7">
+            <a:extLst>
+              <a:ext uri="{FF2B5EF4-FFF2-40B4-BE49-F238E27FC236}">
+                <a16:creationId xmlns:a16="http://schemas.microsoft.com/office/drawing/2014/main" id="{CD595194-55A9-44A3-AA20-C3D76EA87820}"/>
+              </a:ext>
+            </a:extLst>
+          </p:cNvPr>
+          <p:cNvPicPr>
+            <a:picLocks noChangeAspect="1"/>
+          </p:cNvPicPr>
+          <p:nvPr/>
+        </p:nvPicPr>
+        <p:blipFill rotWithShape="1">
+          <a:blip r:embed="rId3"/>
+          <a:srcRect l="6281" r="1487"/>
+          <a:stretch/>
+        </p:blipFill>
+        <p:spPr>
+          <a:xfrm>
+            <a:off x="5842000" y="190333"/>
+            <a:ext cx="6197601" cy="6477333"/>
           </a:xfrm>
           <a:prstGeom prst="rect">
             <a:avLst/>
@@ -3903,7 +3928,7 @@
     </p:spTree>
     <p:extLst>
       <p:ext uri="{BB962C8B-B14F-4D97-AF65-F5344CB8AC3E}">
-        <p14:creationId xmlns:p14="http://schemas.microsoft.com/office/powerpoint/2010/main" val="4027085851"/>
+        <p14:creationId xmlns:p14="http://schemas.microsoft.com/office/powerpoint/2010/main" val="885914222"/>
       </p:ext>
     </p:extLst>
   </p:cSld>
@@ -4148,7 +4173,7 @@
           <a:p>
             <a:r>
               <a:rPr lang="en-US" dirty="0"/>
-              <a:t>Design</a:t>
+              <a:t>Functionality</a:t>
             </a:r>
           </a:p>
         </p:txBody>
@@ -4238,7 +4263,7 @@
         </p:spPr>
         <p:txBody>
           <a:bodyPr>
-            <a:normAutofit fontScale="92500" lnSpcReduction="10000"/>
+            <a:normAutofit/>
           </a:bodyPr>
           <a:lstStyle/>
           <a:p>
@@ -4250,40 +4275,7 @@
                 <a:effectLst/>
                 <a:latin typeface="-apple-system"/>
               </a:rPr>
-              <a:t>Db 3</a:t>
-            </a:r>
-            <a:r>
-              <a:rPr lang="en-US" sz="2200" baseline="30000" dirty="0">
-                <a:solidFill>
-                  <a:schemeClr val="accent6"/>
-                </a:solidFill>
-                <a:latin typeface="-apple-system"/>
-              </a:rPr>
-              <a:t>rd</a:t>
-            </a:r>
-            <a:r>
-              <a:rPr lang="en-US" sz="2200" dirty="0">
-                <a:solidFill>
-                  <a:schemeClr val="accent6"/>
-                </a:solidFill>
-                <a:latin typeface="-apple-system"/>
-              </a:rPr>
-              <a:t> Normal Form</a:t>
-            </a:r>
-          </a:p>
-          <a:p>
-            <a:pPr>
-              <a:buFont typeface="Arial" panose="020B0604020202020204" pitchFamily="34" charset="0"/>
-              <a:buChar char="•"/>
-            </a:pPr>
-            <a:r>
-              <a:rPr lang="en-US" sz="2200" dirty="0">
-                <a:solidFill>
-                  <a:schemeClr val="accent6"/>
-                </a:solidFill>
-                <a:latin typeface="-apple-system"/>
-              </a:rPr>
-              <a:t>EF Core w/ Db Approach</a:t>
+              <a:t>search customers by name</a:t>
             </a:r>
           </a:p>
           <a:p>
@@ -4295,77 +4287,22 @@
                 <a:effectLst/>
                 <a:latin typeface="-apple-system"/>
               </a:rPr>
-              <a:t>Locations have an inventory</a:t>
-            </a:r>
-          </a:p>
-          <a:p>
-            <a:r>
-              <a:rPr lang="en-US" sz="2200" dirty="0">
-                <a:solidFill>
-                  <a:schemeClr val="accent6"/>
-                </a:solidFill>
-                <a:latin typeface="-apple-system"/>
-              </a:rPr>
-              <a:t>“Solution Design”</a:t>
-            </a:r>
-          </a:p>
-          <a:p>
-            <a:pPr lvl="1"/>
-            <a:r>
-              <a:rPr lang="en-US" sz="1800" b="0" i="0" dirty="0">
+              <a:t>place orders to store locations for customers</a:t>
+            </a:r>
+          </a:p>
+          <a:p>
+            <a:r>
+              <a:rPr lang="en-US" sz="2200" b="0" i="0" dirty="0">
                 <a:solidFill>
                   <a:schemeClr val="accent6"/>
                 </a:solidFill>
                 <a:effectLst/>
                 <a:latin typeface="-apple-system"/>
               </a:rPr>
-              <a:t>Domain classes</a:t>
-            </a:r>
-          </a:p>
-          <a:p>
-            <a:pPr lvl="1"/>
-            <a:r>
-              <a:rPr lang="en-US" sz="1800" dirty="0">
-                <a:solidFill>
-                  <a:schemeClr val="accent6"/>
-                </a:solidFill>
-                <a:latin typeface="-apple-system"/>
-              </a:rPr>
-              <a:t>Db Access library</a:t>
-            </a:r>
-          </a:p>
-          <a:p>
-            <a:pPr lvl="1"/>
-            <a:r>
-              <a:rPr lang="en-US" sz="1800" dirty="0" err="1">
-                <a:solidFill>
-                  <a:schemeClr val="accent4"/>
-                </a:solidFill>
-                <a:latin typeface="-apple-system"/>
-              </a:rPr>
-              <a:t>BusLogic</a:t>
-            </a:r>
-            <a:r>
-              <a:rPr lang="en-US" sz="1800" dirty="0">
-                <a:solidFill>
-                  <a:schemeClr val="accent4"/>
-                </a:solidFill>
-                <a:latin typeface="-apple-system"/>
-              </a:rPr>
-              <a:t> project</a:t>
-            </a:r>
-            <a:endParaRPr lang="en-US" sz="1800" dirty="0">
-              <a:solidFill>
-                <a:schemeClr val="accent6"/>
-              </a:solidFill>
-              <a:latin typeface="-apple-system"/>
-            </a:endParaRPr>
-          </a:p>
-          <a:p>
-            <a:pPr>
-              <a:buFont typeface="Arial" panose="020B0604020202020204" pitchFamily="34" charset="0"/>
-              <a:buChar char="•"/>
-            </a:pPr>
+              <a:t>display all order history of a customer</a:t>
+            </a:r>
+          </a:p>
+          <a:p>
             <a:r>
               <a:rPr lang="en-US" sz="2200" b="0" i="0" dirty="0">
                 <a:solidFill>
@@ -4374,8 +4311,15 @@
                 <a:effectLst/>
                 <a:latin typeface="-apple-system"/>
               </a:rPr>
-              <a:t>Interfaces for helper classes</a:t>
-            </a:r>
+              <a:t>add a new customer</a:t>
+            </a:r>
+            <a:endParaRPr lang="en-US" sz="2200" b="0" i="0" dirty="0">
+              <a:solidFill>
+                <a:schemeClr val="accent6"/>
+              </a:solidFill>
+              <a:effectLst/>
+              <a:latin typeface="-apple-system"/>
+            </a:endParaRPr>
           </a:p>
           <a:p>
             <a:r>
@@ -4386,7 +4330,19 @@
                 <a:effectLst/>
                 <a:latin typeface="-apple-system"/>
               </a:rPr>
-              <a:t>persistent data (to a DB); no hardcoding of data.(prices, customers, order history, etc.)</a:t>
+              <a:t>display details of an order</a:t>
+            </a:r>
+          </a:p>
+          <a:p>
+            <a:r>
+              <a:rPr lang="en-US" sz="2200" b="0" i="0" dirty="0">
+                <a:solidFill>
+                  <a:schemeClr val="accent4"/>
+                </a:solidFill>
+                <a:effectLst/>
+                <a:latin typeface="-apple-system"/>
+              </a:rPr>
+              <a:t>input validation</a:t>
             </a:r>
           </a:p>
           <a:p>
@@ -4402,23 +4358,10 @@
                 <a:effectLst/>
                 <a:latin typeface="-apple-system"/>
               </a:rPr>
-              <a:t>XML</a:t>
-            </a:r>
-            <a:r>
-              <a:rPr lang="en-US" sz="2200" dirty="0">
-                <a:solidFill>
-                  <a:srgbClr val="C00000"/>
-                </a:solidFill>
-                <a:latin typeface="-apple-system"/>
-              </a:rPr>
-              <a:t> comments</a:t>
-            </a:r>
-          </a:p>
-          <a:p>
-            <a:pPr>
-              <a:buFont typeface="Arial" panose="020B0604020202020204" pitchFamily="34" charset="0"/>
-              <a:buChar char="•"/>
-            </a:pPr>
+              <a:t>exception handling</a:t>
+            </a:r>
+          </a:p>
+          <a:p>
             <a:r>
               <a:rPr lang="en-US" sz="2200" b="0" i="0" dirty="0">
                 <a:solidFill>
@@ -4427,47 +4370,8 @@
                 <a:effectLst/>
                 <a:latin typeface="-apple-system"/>
               </a:rPr>
-              <a:t>Inventory </a:t>
-            </a:r>
-            <a:r>
-              <a:rPr lang="en-US" sz="2200" b="0" i="0" dirty="0" err="1">
-                <a:solidFill>
-                  <a:srgbClr val="C00000"/>
-                </a:solidFill>
-                <a:effectLst/>
-                <a:latin typeface="-apple-system"/>
-              </a:rPr>
-              <a:t>deprementation</a:t>
-            </a:r>
-            <a:endParaRPr lang="en-US" sz="2200" b="0" i="0" dirty="0">
-              <a:solidFill>
-                <a:srgbClr val="C00000"/>
-              </a:solidFill>
-              <a:effectLst/>
-              <a:latin typeface="-apple-system"/>
-            </a:endParaRPr>
-          </a:p>
-          <a:p>
-            <a:pPr>
-              <a:buFont typeface="Arial" panose="020B0604020202020204" pitchFamily="34" charset="0"/>
-              <a:buChar char="•"/>
-            </a:pPr>
-            <a:r>
-              <a:rPr lang="en-US" sz="2200" dirty="0">
-                <a:solidFill>
-                  <a:srgbClr val="C00000"/>
-                </a:solidFill>
-                <a:latin typeface="-apple-system"/>
-              </a:rPr>
-              <a:t>10 Unit testing methods</a:t>
-            </a:r>
-            <a:endParaRPr lang="en-US" sz="2200" b="0" i="0" dirty="0">
-              <a:solidFill>
-                <a:srgbClr val="C00000"/>
-              </a:solidFill>
-              <a:effectLst/>
-              <a:latin typeface="-apple-system"/>
-            </a:endParaRPr>
+              <a:t>display all order history of a store location</a:t>
+            </a:r>
           </a:p>
           <a:p>
             <a:pPr marL="0" indent="0">
@@ -4480,7 +4384,7 @@
     </p:spTree>
     <p:extLst>
       <p:ext uri="{BB962C8B-B14F-4D97-AF65-F5344CB8AC3E}">
-        <p14:creationId xmlns:p14="http://schemas.microsoft.com/office/powerpoint/2010/main" val="3274383637"/>
+        <p14:creationId xmlns:p14="http://schemas.microsoft.com/office/powerpoint/2010/main" val="3012487353"/>
       </p:ext>
     </p:extLst>
   </p:cSld>
@@ -4512,7 +4416,7 @@
           <p:cNvPr id="2" name="Title 1">
             <a:extLst>
               <a:ext uri="{FF2B5EF4-FFF2-40B4-BE49-F238E27FC236}">
-                <a16:creationId xmlns:a16="http://schemas.microsoft.com/office/drawing/2014/main" id="{49C735E6-F3E2-4C7D-BEFD-D14D795BD513}"/>
+                <a16:creationId xmlns:a16="http://schemas.microsoft.com/office/drawing/2014/main" id="{4D8E78A2-C586-43B3-817C-675DF0C0CB9F}"/>
               </a:ext>
             </a:extLst>
           </p:cNvPr>
@@ -4529,22 +4433,34 @@
           <a:lstStyle/>
           <a:p>
             <a:r>
-              <a:rPr lang="en-US" dirty="0">
+              <a:rPr lang="en-US">
                 <a:solidFill>
                   <a:schemeClr val="accent6"/>
                 </a:solidFill>
+                <a:latin typeface="-apple-system"/>
               </a:rPr>
-              <a:t>3NF</a:t>
-            </a:r>
+              <a:t>S</a:t>
+            </a:r>
+            <a:r>
+              <a:rPr lang="en-US" sz="4400" b="0" i="0">
+                <a:solidFill>
+                  <a:schemeClr val="accent6"/>
+                </a:solidFill>
+                <a:effectLst/>
+                <a:latin typeface="-apple-system"/>
+              </a:rPr>
+              <a:t>earch customers by name (&amp; other parameters)</a:t>
+            </a:r>
+            <a:endParaRPr lang="en-US" dirty="0"/>
           </a:p>
         </p:txBody>
       </p:sp>
       <p:pic>
         <p:nvPicPr>
-          <p:cNvPr id="10" name="Content Placeholder 9">
-            <a:extLst>
-              <a:ext uri="{FF2B5EF4-FFF2-40B4-BE49-F238E27FC236}">
-                <a16:creationId xmlns:a16="http://schemas.microsoft.com/office/drawing/2014/main" id="{80D67C7D-C832-4800-8CEE-C201EDA72CBE}"/>
+          <p:cNvPr id="5" name="Content Placeholder 4">
+            <a:extLst>
+              <a:ext uri="{FF2B5EF4-FFF2-40B4-BE49-F238E27FC236}">
+                <a16:creationId xmlns:a16="http://schemas.microsoft.com/office/drawing/2014/main" id="{59AE665B-2931-4756-AB8F-6A54B539E847}"/>
               </a:ext>
             </a:extLst>
           </p:cNvPr>
@@ -4563,15 +4479,74 @@
         </p:blipFill>
         <p:spPr>
           <a:xfrm>
-            <a:off x="2803293" y="746740"/>
-            <a:ext cx="8550507" cy="5552459"/>
-          </a:xfrm>
+            <a:off x="210790" y="1825625"/>
+            <a:ext cx="6130743" cy="4351338"/>
+          </a:xfrm>
+        </p:spPr>
+      </p:pic>
+      <p:pic>
+        <p:nvPicPr>
+          <p:cNvPr id="4" name="Picture 3">
+            <a:extLst>
+              <a:ext uri="{FF2B5EF4-FFF2-40B4-BE49-F238E27FC236}">
+                <a16:creationId xmlns:a16="http://schemas.microsoft.com/office/drawing/2014/main" id="{68B9441A-1A54-4D00-BA90-B19BF5E37ABF}"/>
+              </a:ext>
+            </a:extLst>
+          </p:cNvPr>
+          <p:cNvPicPr>
+            <a:picLocks noChangeAspect="1"/>
+          </p:cNvPicPr>
+          <p:nvPr/>
+        </p:nvPicPr>
+        <p:blipFill rotWithShape="1">
+          <a:blip r:embed="rId3"/>
+          <a:srcRect r="3445"/>
+          <a:stretch/>
+        </p:blipFill>
+        <p:spPr>
+          <a:xfrm>
+            <a:off x="4673601" y="1983393"/>
+            <a:ext cx="7307610" cy="749339"/>
+          </a:xfrm>
+          <a:prstGeom prst="rect">
+            <a:avLst/>
+          </a:prstGeom>
+        </p:spPr>
+      </p:pic>
+      <p:pic>
+        <p:nvPicPr>
+          <p:cNvPr id="9" name="Picture 8">
+            <a:extLst>
+              <a:ext uri="{FF2B5EF4-FFF2-40B4-BE49-F238E27FC236}">
+                <a16:creationId xmlns:a16="http://schemas.microsoft.com/office/drawing/2014/main" id="{676B5EDF-2AEC-4C4F-AF77-55C01AAB5913}"/>
+              </a:ext>
+            </a:extLst>
+          </p:cNvPr>
+          <p:cNvPicPr>
+            <a:picLocks noChangeAspect="1"/>
+          </p:cNvPicPr>
+          <p:nvPr/>
+        </p:nvPicPr>
+        <p:blipFill>
+          <a:blip r:embed="rId4"/>
+          <a:stretch>
+            <a:fillRect/>
+          </a:stretch>
+        </p:blipFill>
+        <p:spPr>
+          <a:xfrm>
+            <a:off x="4612465" y="4130425"/>
+            <a:ext cx="7429882" cy="654084"/>
+          </a:xfrm>
+          <a:prstGeom prst="rect">
+            <a:avLst/>
+          </a:prstGeom>
         </p:spPr>
       </p:pic>
     </p:spTree>
     <p:extLst>
       <p:ext uri="{BB962C8B-B14F-4D97-AF65-F5344CB8AC3E}">
-        <p14:creationId xmlns:p14="http://schemas.microsoft.com/office/powerpoint/2010/main" val="3735348199"/>
+        <p14:creationId xmlns:p14="http://schemas.microsoft.com/office/powerpoint/2010/main" val="229285352"/>
       </p:ext>
     </p:extLst>
   </p:cSld>
@@ -4603,7 +4578,7 @@
           <p:cNvPr id="2" name="Title 1">
             <a:extLst>
               <a:ext uri="{FF2B5EF4-FFF2-40B4-BE49-F238E27FC236}">
-                <a16:creationId xmlns:a16="http://schemas.microsoft.com/office/drawing/2014/main" id="{49C735E6-F3E2-4C7D-BEFD-D14D795BD513}"/>
+                <a16:creationId xmlns:a16="http://schemas.microsoft.com/office/drawing/2014/main" id="{4D8E78A2-C586-43B3-817C-675DF0C0CB9F}"/>
               </a:ext>
             </a:extLst>
           </p:cNvPr>
@@ -4620,81 +4595,33 @@
           <a:lstStyle/>
           <a:p>
             <a:r>
-              <a:rPr lang="en-US" dirty="0">
+              <a:rPr lang="en-US" sz="4400" b="0" i="0" dirty="0">
                 <a:solidFill>
                   <a:schemeClr val="accent6"/>
                 </a:solidFill>
+                <a:effectLst/>
+                <a:latin typeface="-apple-system"/>
               </a:rPr>
-              <a:t>EF Core w/ Db 1</a:t>
-            </a:r>
-            <a:r>
-              <a:rPr lang="en-US" baseline="30000" dirty="0">
-                <a:solidFill>
-                  <a:schemeClr val="accent6"/>
-                </a:solidFill>
-              </a:rPr>
-              <a:t>st</a:t>
-            </a:r>
-            <a:r>
-              <a:rPr lang="en-US" dirty="0">
-                <a:solidFill>
-                  <a:schemeClr val="accent6"/>
-                </a:solidFill>
-              </a:rPr>
-              <a:t> Approach</a:t>
-            </a:r>
-          </a:p>
-        </p:txBody>
-      </p:sp>
-      <p:sp>
-        <p:nvSpPr>
-          <p:cNvPr id="4" name="Content Placeholder 3">
-            <a:extLst>
-              <a:ext uri="{FF2B5EF4-FFF2-40B4-BE49-F238E27FC236}">
-                <a16:creationId xmlns:a16="http://schemas.microsoft.com/office/drawing/2014/main" id="{28E17A24-B23D-4F9E-B65F-7CB82BF5184D}"/>
-              </a:ext>
-            </a:extLst>
-          </p:cNvPr>
-          <p:cNvSpPr>
-            <a:spLocks noGrp="1"/>
-          </p:cNvSpPr>
-          <p:nvPr>
-            <p:ph idx="1"/>
-          </p:nvPr>
-        </p:nvSpPr>
-        <p:spPr>
-          <a:xfrm>
-            <a:off x="838200" y="1825624"/>
-            <a:ext cx="2482341" cy="4351338"/>
-          </a:xfrm>
-        </p:spPr>
-        <p:txBody>
-          <a:bodyPr/>
-          <a:lstStyle/>
-          <a:p>
-            <a:r>
-              <a:rPr lang="en-US" dirty="0"/>
-              <a:t>P0DbContext repo contains full Model builder</a:t>
-            </a:r>
-          </a:p>
-          <a:p>
-            <a:endParaRPr lang="en-US" dirty="0"/>
+              <a:t>Place orders to store locations for customers</a:t>
+            </a:r>
           </a:p>
         </p:txBody>
       </p:sp>
       <p:pic>
         <p:nvPicPr>
-          <p:cNvPr id="9" name="Picture 8">
-            <a:extLst>
-              <a:ext uri="{FF2B5EF4-FFF2-40B4-BE49-F238E27FC236}">
-                <a16:creationId xmlns:a16="http://schemas.microsoft.com/office/drawing/2014/main" id="{BE623E61-484E-4A2A-A171-3F141B27A156}"/>
+          <p:cNvPr id="5" name="Content Placeholder 4">
+            <a:extLst>
+              <a:ext uri="{FF2B5EF4-FFF2-40B4-BE49-F238E27FC236}">
+                <a16:creationId xmlns:a16="http://schemas.microsoft.com/office/drawing/2014/main" id="{E985FB2E-E5E6-4586-934B-1E9319E4AE74}"/>
               </a:ext>
             </a:extLst>
           </p:cNvPr>
           <p:cNvPicPr>
-            <a:picLocks noChangeAspect="1"/>
+            <a:picLocks noGrp="1" noChangeAspect="1"/>
           </p:cNvPicPr>
-          <p:nvPr/>
+          <p:nvPr>
+            <p:ph idx="1"/>
+          </p:nvPr>
         </p:nvPicPr>
         <p:blipFill>
           <a:blip r:embed="rId2"/>
@@ -4704,18 +4631,15 @@
         </p:blipFill>
         <p:spPr>
           <a:xfrm>
-            <a:off x="4555066" y="1281544"/>
-            <a:ext cx="6968067" cy="5439499"/>
-          </a:xfrm>
-          <a:prstGeom prst="rect">
-            <a:avLst/>
-          </a:prstGeom>
+            <a:off x="210807" y="1887679"/>
+            <a:ext cx="6820251" cy="2590933"/>
+          </a:xfrm>
         </p:spPr>
       </p:pic>
     </p:spTree>
     <p:extLst>
       <p:ext uri="{BB962C8B-B14F-4D97-AF65-F5344CB8AC3E}">
-        <p14:creationId xmlns:p14="http://schemas.microsoft.com/office/powerpoint/2010/main" val="1139084455"/>
+        <p14:creationId xmlns:p14="http://schemas.microsoft.com/office/powerpoint/2010/main" val="2848077745"/>
       </p:ext>
     </p:extLst>
   </p:cSld>
@@ -4747,7 +4671,7 @@
           <p:cNvPr id="2" name="Title 1">
             <a:extLst>
               <a:ext uri="{FF2B5EF4-FFF2-40B4-BE49-F238E27FC236}">
-                <a16:creationId xmlns:a16="http://schemas.microsoft.com/office/drawing/2014/main" id="{8A26F4CD-BFCB-482D-B8EA-8D40F40063FB}"/>
+                <a16:creationId xmlns:a16="http://schemas.microsoft.com/office/drawing/2014/main" id="{4D8E78A2-C586-43B3-817C-675DF0C0CB9F}"/>
               </a:ext>
             </a:extLst>
           </p:cNvPr>
@@ -4763,6 +4687,15 @@
           <a:bodyPr/>
           <a:lstStyle/>
           <a:p>
+            <a:r>
+              <a:rPr lang="en-US" dirty="0">
+                <a:solidFill>
+                  <a:schemeClr val="accent6"/>
+                </a:solidFill>
+                <a:latin typeface="-apple-system"/>
+              </a:rPr>
+              <a:t>D</a:t>
+            </a:r>
             <a:r>
               <a:rPr lang="en-US" sz="4400" b="0" i="0" dirty="0">
                 <a:solidFill>
@@ -4771,26 +4704,24 @@
                 <a:effectLst/>
                 <a:latin typeface="-apple-system"/>
               </a:rPr>
-              <a:t>Locations have an inventory</a:t>
+              <a:t>isplay all order history of a customer</a:t>
             </a:r>
           </a:p>
         </p:txBody>
       </p:sp>
       <p:pic>
         <p:nvPicPr>
-          <p:cNvPr id="8" name="Content Placeholder 7">
-            <a:extLst>
-              <a:ext uri="{FF2B5EF4-FFF2-40B4-BE49-F238E27FC236}">
-                <a16:creationId xmlns:a16="http://schemas.microsoft.com/office/drawing/2014/main" id="{3A81C12B-FC64-4B52-9C46-C1002C149DE3}"/>
+          <p:cNvPr id="10" name="Picture 9">
+            <a:extLst>
+              <a:ext uri="{FF2B5EF4-FFF2-40B4-BE49-F238E27FC236}">
+                <a16:creationId xmlns:a16="http://schemas.microsoft.com/office/drawing/2014/main" id="{E01A35FC-3DC3-4680-B4C6-809BDA254553}"/>
               </a:ext>
             </a:extLst>
           </p:cNvPr>
           <p:cNvPicPr>
-            <a:picLocks noGrp="1" noChangeAspect="1"/>
+            <a:picLocks noChangeAspect="1"/>
           </p:cNvPicPr>
-          <p:nvPr>
-            <p:ph idx="1"/>
-          </p:nvPr>
+          <p:nvPr/>
         </p:nvPicPr>
         <p:blipFill>
           <a:blip r:embed="rId2"/>
@@ -4800,15 +4731,107 @@
         </p:blipFill>
         <p:spPr>
           <a:xfrm>
-            <a:off x="838199" y="1621982"/>
-            <a:ext cx="8271933" cy="4575606"/>
-          </a:xfrm>
+            <a:off x="7529401" y="1535197"/>
+            <a:ext cx="4115011" cy="2711589"/>
+          </a:xfrm>
+          <a:prstGeom prst="rect">
+            <a:avLst/>
+          </a:prstGeom>
+        </p:spPr>
+      </p:pic>
+      <p:pic>
+        <p:nvPicPr>
+          <p:cNvPr id="16" name="Content Placeholder 15">
+            <a:extLst>
+              <a:ext uri="{FF2B5EF4-FFF2-40B4-BE49-F238E27FC236}">
+                <a16:creationId xmlns:a16="http://schemas.microsoft.com/office/drawing/2014/main" id="{E06989FE-0B01-4436-A53E-43F188EE9D97}"/>
+              </a:ext>
+            </a:extLst>
+          </p:cNvPr>
+          <p:cNvPicPr>
+            <a:picLocks noGrp="1" noChangeAspect="1"/>
+          </p:cNvPicPr>
+          <p:nvPr>
+            <p:ph idx="1"/>
+          </p:nvPr>
+        </p:nvPicPr>
+        <p:blipFill>
+          <a:blip r:embed="rId3"/>
+          <a:stretch>
+            <a:fillRect/>
+          </a:stretch>
+        </p:blipFill>
+        <p:spPr>
+          <a:xfrm>
+            <a:off x="177175" y="1690688"/>
+            <a:ext cx="7144117" cy="2495678"/>
+          </a:xfrm>
+        </p:spPr>
+      </p:pic>
+      <p:pic>
+        <p:nvPicPr>
+          <p:cNvPr id="4" name="Picture 3">
+            <a:extLst>
+              <a:ext uri="{FF2B5EF4-FFF2-40B4-BE49-F238E27FC236}">
+                <a16:creationId xmlns:a16="http://schemas.microsoft.com/office/drawing/2014/main" id="{B649F620-F138-40A2-9FFF-27562D2C9A92}"/>
+              </a:ext>
+            </a:extLst>
+          </p:cNvPr>
+          <p:cNvPicPr>
+            <a:picLocks noChangeAspect="1"/>
+          </p:cNvPicPr>
+          <p:nvPr/>
+        </p:nvPicPr>
+        <p:blipFill>
+          <a:blip r:embed="rId4"/>
+          <a:stretch>
+            <a:fillRect/>
+          </a:stretch>
+        </p:blipFill>
+        <p:spPr>
+          <a:xfrm>
+            <a:off x="7462722" y="4442650"/>
+            <a:ext cx="4248368" cy="2235315"/>
+          </a:xfrm>
+          <a:prstGeom prst="rect">
+            <a:avLst/>
+          </a:prstGeom>
+        </p:spPr>
+      </p:pic>
+      <p:pic>
+        <p:nvPicPr>
+          <p:cNvPr id="6" name="Picture 5">
+            <a:extLst>
+              <a:ext uri="{FF2B5EF4-FFF2-40B4-BE49-F238E27FC236}">
+                <a16:creationId xmlns:a16="http://schemas.microsoft.com/office/drawing/2014/main" id="{C169F5F9-B174-48D4-80E5-EC8388EA38AB}"/>
+              </a:ext>
+            </a:extLst>
+          </p:cNvPr>
+          <p:cNvPicPr>
+            <a:picLocks noChangeAspect="1"/>
+          </p:cNvPicPr>
+          <p:nvPr/>
+        </p:nvPicPr>
+        <p:blipFill>
+          <a:blip r:embed="rId5"/>
+          <a:stretch>
+            <a:fillRect/>
+          </a:stretch>
+        </p:blipFill>
+        <p:spPr>
+          <a:xfrm>
+            <a:off x="94621" y="4194236"/>
+            <a:ext cx="7226671" cy="2635385"/>
+          </a:xfrm>
+          <a:prstGeom prst="rect">
+            <a:avLst/>
+          </a:prstGeom>
         </p:spPr>
       </p:pic>
     </p:spTree>
     <p:extLst>
       <p:ext uri="{BB962C8B-B14F-4D97-AF65-F5344CB8AC3E}">
-        <p14:creationId xmlns:p14="http://schemas.microsoft.com/office/powerpoint/2010/main" val="913143922"/>
+        <p14:creationId xmlns:p14="http://schemas.microsoft.com/office/powerpoint/2010/main" val="2050616"/>
       </p:ext>
     </p:extLst>
   </p:cSld>
@@ -4840,7 +4863,7 @@
           <p:cNvPr id="2" name="Title 1">
             <a:extLst>
               <a:ext uri="{FF2B5EF4-FFF2-40B4-BE49-F238E27FC236}">
-                <a16:creationId xmlns:a16="http://schemas.microsoft.com/office/drawing/2014/main" id="{8A26F4CD-BFCB-482D-B8EA-8D40F40063FB}"/>
+                <a16:creationId xmlns:a16="http://schemas.microsoft.com/office/drawing/2014/main" id="{4D8E78A2-C586-43B3-817C-675DF0C0CB9F}"/>
               </a:ext>
             </a:extLst>
           </p:cNvPr>
@@ -4851,11 +4874,25 @@
             <p:ph type="title"/>
           </p:nvPr>
         </p:nvSpPr>
-        <p:spPr/>
+        <p:spPr>
+          <a:xfrm>
+            <a:off x="474133" y="102658"/>
+            <a:ext cx="10515600" cy="1325563"/>
+          </a:xfrm>
+        </p:spPr>
         <p:txBody>
           <a:bodyPr/>
           <a:lstStyle/>
           <a:p>
+            <a:r>
+              <a:rPr lang="en-US" dirty="0">
+                <a:solidFill>
+                  <a:schemeClr val="accent6"/>
+                </a:solidFill>
+                <a:latin typeface="-apple-system"/>
+              </a:rPr>
+              <a:t>A</a:t>
+            </a:r>
             <a:r>
               <a:rPr lang="en-US" sz="4400" b="0" i="0" dirty="0">
                 <a:solidFill>
@@ -4864,7 +4901,7 @@
                 <a:effectLst/>
                 <a:latin typeface="-apple-system"/>
               </a:rPr>
-              <a:t>Locations have an inventory</a:t>
+              <a:t>dd a new customer (converted int to bool)</a:t>
             </a:r>
           </a:p>
         </p:txBody>
@@ -4874,7 +4911,7 @@
           <p:cNvPr id="5" name="Content Placeholder 4">
             <a:extLst>
               <a:ext uri="{FF2B5EF4-FFF2-40B4-BE49-F238E27FC236}">
-                <a16:creationId xmlns:a16="http://schemas.microsoft.com/office/drawing/2014/main" id="{144645DD-0C6C-40AD-BD11-99889D69F95C}"/>
+                <a16:creationId xmlns:a16="http://schemas.microsoft.com/office/drawing/2014/main" id="{0BAF3597-FC96-41E2-8B54-6C37B10D2F80}"/>
               </a:ext>
             </a:extLst>
           </p:cNvPr>
@@ -4885,15 +4922,16 @@
             <p:ph idx="1"/>
           </p:nvPr>
         </p:nvPicPr>
-        <p:blipFill rotWithShape="1">
+        <p:blipFill>
           <a:blip r:embed="rId2"/>
-          <a:srcRect r="6418"/>
-          <a:stretch/>
+          <a:stretch>
+            <a:fillRect/>
+          </a:stretch>
         </p:blipFill>
         <p:spPr>
           <a:xfrm>
-            <a:off x="54551" y="1367232"/>
-            <a:ext cx="5925590" cy="4818035"/>
+            <a:off x="97780" y="1145251"/>
+            <a:ext cx="5998220" cy="5398451"/>
           </a:xfrm>
         </p:spPr>
       </p:pic>
@@ -4902,7 +4940,7 @@
           <p:cNvPr id="7" name="Picture 6">
             <a:extLst>
               <a:ext uri="{FF2B5EF4-FFF2-40B4-BE49-F238E27FC236}">
-                <a16:creationId xmlns:a16="http://schemas.microsoft.com/office/drawing/2014/main" id="{2A31BE37-A996-4B19-A1FF-D624C9B08EB3}"/>
+                <a16:creationId xmlns:a16="http://schemas.microsoft.com/office/drawing/2014/main" id="{D801E9C3-BBFC-4251-B6C2-4DAACD3F9B78}"/>
               </a:ext>
             </a:extLst>
           </p:cNvPr>
@@ -4911,129 +4949,26 @@
           </p:cNvPicPr>
           <p:nvPr/>
         </p:nvPicPr>
-        <p:blipFill rotWithShape="1">
+        <p:blipFill>
           <a:blip r:embed="rId3"/>
-          <a:srcRect l="-2321" t="-4142" r="7996" b="4142"/>
-          <a:stretch/>
+          <a:stretch>
+            <a:fillRect/>
+          </a:stretch>
         </p:blipFill>
         <p:spPr>
           <a:xfrm>
-            <a:off x="5852637" y="1206611"/>
-            <a:ext cx="6192505" cy="4978656"/>
+            <a:off x="5427272" y="1676272"/>
+            <a:ext cx="6764728" cy="3683189"/>
           </a:xfrm>
           <a:prstGeom prst="rect">
             <a:avLst/>
           </a:prstGeom>
         </p:spPr>
       </p:pic>
-      <p:sp>
-        <p:nvSpPr>
-          <p:cNvPr id="9" name="Rectangle 8">
-            <a:extLst>
-              <a:ext uri="{FF2B5EF4-FFF2-40B4-BE49-F238E27FC236}">
-                <a16:creationId xmlns:a16="http://schemas.microsoft.com/office/drawing/2014/main" id="{0F113BA0-EFB0-41E2-8DCF-B6BF0BD64DB8}"/>
-              </a:ext>
-            </a:extLst>
-          </p:cNvPr>
-          <p:cNvSpPr/>
-          <p:nvPr/>
-        </p:nvSpPr>
-        <p:spPr>
-          <a:xfrm>
-            <a:off x="-48127" y="3578002"/>
-            <a:ext cx="5231322" cy="135467"/>
-          </a:xfrm>
-          <a:prstGeom prst="rect">
-            <a:avLst/>
-          </a:prstGeom>
-          <a:noFill/>
-          <a:ln>
-            <a:solidFill>
-              <a:srgbClr val="FF0000"/>
-            </a:solidFill>
-          </a:ln>
-        </p:spPr>
-        <p:style>
-          <a:lnRef idx="2">
-            <a:schemeClr val="accent1">
-              <a:shade val="50000"/>
-            </a:schemeClr>
-          </a:lnRef>
-          <a:fillRef idx="1">
-            <a:schemeClr val="accent1"/>
-          </a:fillRef>
-          <a:effectRef idx="0">
-            <a:schemeClr val="accent1"/>
-          </a:effectRef>
-          <a:fontRef idx="minor">
-            <a:schemeClr val="lt1"/>
-          </a:fontRef>
-        </p:style>
-        <p:txBody>
-          <a:bodyPr rtlCol="0" anchor="ctr"/>
-          <a:lstStyle/>
-          <a:p>
-            <a:pPr algn="ctr"/>
-            <a:endParaRPr lang="en-US"/>
-          </a:p>
-        </p:txBody>
-      </p:sp>
-      <p:sp>
-        <p:nvSpPr>
-          <p:cNvPr id="10" name="Rectangle 9">
-            <a:extLst>
-              <a:ext uri="{FF2B5EF4-FFF2-40B4-BE49-F238E27FC236}">
-                <a16:creationId xmlns:a16="http://schemas.microsoft.com/office/drawing/2014/main" id="{4E252113-EAE8-4185-9E19-4BABBFD72A4C}"/>
-              </a:ext>
-            </a:extLst>
-          </p:cNvPr>
-          <p:cNvSpPr/>
-          <p:nvPr/>
-        </p:nvSpPr>
-        <p:spPr>
-          <a:xfrm>
-            <a:off x="5980141" y="3713469"/>
-            <a:ext cx="5747034" cy="135467"/>
-          </a:xfrm>
-          <a:prstGeom prst="rect">
-            <a:avLst/>
-          </a:prstGeom>
-          <a:noFill/>
-          <a:ln>
-            <a:solidFill>
-              <a:srgbClr val="FF0000"/>
-            </a:solidFill>
-          </a:ln>
-        </p:spPr>
-        <p:style>
-          <a:lnRef idx="2">
-            <a:schemeClr val="accent1">
-              <a:shade val="50000"/>
-            </a:schemeClr>
-          </a:lnRef>
-          <a:fillRef idx="1">
-            <a:schemeClr val="accent1"/>
-          </a:fillRef>
-          <a:effectRef idx="0">
-            <a:schemeClr val="accent1"/>
-          </a:effectRef>
-          <a:fontRef idx="minor">
-            <a:schemeClr val="lt1"/>
-          </a:fontRef>
-        </p:style>
-        <p:txBody>
-          <a:bodyPr rtlCol="0" anchor="ctr"/>
-          <a:lstStyle/>
-          <a:p>
-            <a:pPr algn="ctr"/>
-            <a:endParaRPr lang="en-US"/>
-          </a:p>
-        </p:txBody>
-      </p:sp>
     </p:spTree>
     <p:extLst>
       <p:ext uri="{BB962C8B-B14F-4D97-AF65-F5344CB8AC3E}">
-        <p14:creationId xmlns:p14="http://schemas.microsoft.com/office/powerpoint/2010/main" val="2026282212"/>
+        <p14:creationId xmlns:p14="http://schemas.microsoft.com/office/powerpoint/2010/main" val="2394070289"/>
       </p:ext>
     </p:extLst>
   </p:cSld>
@@ -5044,6 +4979,459 @@
 </file>
 
 <file path=ppt/slides/slide16.xml><?xml version="1.0" encoding="utf-8"?>
+<p:sld xmlns:a="http://schemas.openxmlformats.org/drawingml/2006/main" xmlns:r="http://schemas.openxmlformats.org/officeDocument/2006/relationships" xmlns:p="http://schemas.openxmlformats.org/presentationml/2006/main">
+  <p:cSld>
+    <p:spTree>
+      <p:nvGrpSpPr>
+        <p:cNvPr id="1" name=""/>
+        <p:cNvGrpSpPr/>
+        <p:nvPr/>
+      </p:nvGrpSpPr>
+      <p:grpSpPr>
+        <a:xfrm>
+          <a:off x="0" y="0"/>
+          <a:ext cx="0" cy="0"/>
+          <a:chOff x="0" y="0"/>
+          <a:chExt cx="0" cy="0"/>
+        </a:xfrm>
+      </p:grpSpPr>
+      <p:sp>
+        <p:nvSpPr>
+          <p:cNvPr id="2" name="Title 1">
+            <a:extLst>
+              <a:ext uri="{FF2B5EF4-FFF2-40B4-BE49-F238E27FC236}">
+                <a16:creationId xmlns:a16="http://schemas.microsoft.com/office/drawing/2014/main" id="{4D8E78A2-C586-43B3-817C-675DF0C0CB9F}"/>
+              </a:ext>
+            </a:extLst>
+          </p:cNvPr>
+          <p:cNvSpPr>
+            <a:spLocks noGrp="1"/>
+          </p:cNvSpPr>
+          <p:nvPr>
+            <p:ph type="title"/>
+          </p:nvPr>
+        </p:nvSpPr>
+        <p:spPr>
+          <a:xfrm>
+            <a:off x="474133" y="102658"/>
+            <a:ext cx="10515600" cy="1325563"/>
+          </a:xfrm>
+        </p:spPr>
+        <p:txBody>
+          <a:bodyPr/>
+          <a:lstStyle/>
+          <a:p>
+            <a:r>
+              <a:rPr lang="en-US" dirty="0">
+                <a:solidFill>
+                  <a:schemeClr val="accent4"/>
+                </a:solidFill>
+                <a:latin typeface="-apple-system"/>
+              </a:rPr>
+              <a:t>Crediting Winston</a:t>
+            </a:r>
+            <a:endParaRPr lang="en-US" sz="4400" b="0" i="0" dirty="0">
+              <a:solidFill>
+                <a:schemeClr val="accent4"/>
+              </a:solidFill>
+              <a:effectLst/>
+              <a:latin typeface="-apple-system"/>
+            </a:endParaRPr>
+          </a:p>
+        </p:txBody>
+      </p:sp>
+      <p:pic>
+        <p:nvPicPr>
+          <p:cNvPr id="9" name="Content Placeholder 8">
+            <a:extLst>
+              <a:ext uri="{FF2B5EF4-FFF2-40B4-BE49-F238E27FC236}">
+                <a16:creationId xmlns:a16="http://schemas.microsoft.com/office/drawing/2014/main" id="{8EC356AE-F80C-45D9-B5BA-4C0D18275B25}"/>
+              </a:ext>
+            </a:extLst>
+          </p:cNvPr>
+          <p:cNvPicPr>
+            <a:picLocks noGrp="1" noChangeAspect="1"/>
+          </p:cNvPicPr>
+          <p:nvPr>
+            <p:ph idx="1"/>
+          </p:nvPr>
+        </p:nvPicPr>
+        <p:blipFill>
+          <a:blip r:embed="rId2"/>
+          <a:stretch>
+            <a:fillRect/>
+          </a:stretch>
+        </p:blipFill>
+        <p:spPr>
+          <a:xfrm>
+            <a:off x="1531722" y="2774109"/>
+            <a:ext cx="8401482" cy="1835244"/>
+          </a:xfrm>
+          <a:prstGeom prst="rect">
+            <a:avLst/>
+          </a:prstGeom>
+        </p:spPr>
+      </p:pic>
+    </p:spTree>
+    <p:extLst>
+      <p:ext uri="{BB962C8B-B14F-4D97-AF65-F5344CB8AC3E}">
+        <p14:creationId xmlns:p14="http://schemas.microsoft.com/office/powerpoint/2010/main" val="3401543557"/>
+      </p:ext>
+    </p:extLst>
+  </p:cSld>
+  <p:clrMapOvr>
+    <a:masterClrMapping/>
+  </p:clrMapOvr>
+</p:sld>
+</file>
+
+<file path=ppt/slides/slide17.xml><?xml version="1.0" encoding="utf-8"?>
+<p:sld xmlns:a="http://schemas.openxmlformats.org/drawingml/2006/main" xmlns:r="http://schemas.openxmlformats.org/officeDocument/2006/relationships" xmlns:p="http://schemas.openxmlformats.org/presentationml/2006/main">
+  <p:cSld>
+    <p:spTree>
+      <p:nvGrpSpPr>
+        <p:cNvPr id="1" name=""/>
+        <p:cNvGrpSpPr/>
+        <p:nvPr/>
+      </p:nvGrpSpPr>
+      <p:grpSpPr>
+        <a:xfrm>
+          <a:off x="0" y="0"/>
+          <a:ext cx="0" cy="0"/>
+          <a:chOff x="0" y="0"/>
+          <a:chExt cx="0" cy="0"/>
+        </a:xfrm>
+      </p:grpSpPr>
+      <p:sp>
+        <p:nvSpPr>
+          <p:cNvPr id="2" name="Title 1">
+            <a:extLst>
+              <a:ext uri="{FF2B5EF4-FFF2-40B4-BE49-F238E27FC236}">
+                <a16:creationId xmlns:a16="http://schemas.microsoft.com/office/drawing/2014/main" id="{4D8E78A2-C586-43B3-817C-675DF0C0CB9F}"/>
+              </a:ext>
+            </a:extLst>
+          </p:cNvPr>
+          <p:cNvSpPr>
+            <a:spLocks noGrp="1"/>
+          </p:cNvSpPr>
+          <p:nvPr>
+            <p:ph type="title"/>
+          </p:nvPr>
+        </p:nvSpPr>
+        <p:spPr/>
+        <p:txBody>
+          <a:bodyPr/>
+          <a:lstStyle/>
+          <a:p>
+            <a:r>
+              <a:rPr lang="en-US" dirty="0">
+                <a:solidFill>
+                  <a:schemeClr val="accent4"/>
+                </a:solidFill>
+                <a:latin typeface="-apple-system"/>
+              </a:rPr>
+              <a:t>D</a:t>
+            </a:r>
+            <a:r>
+              <a:rPr lang="en-US" sz="4400" b="0" i="0" dirty="0">
+                <a:solidFill>
+                  <a:schemeClr val="accent4"/>
+                </a:solidFill>
+                <a:effectLst/>
+                <a:latin typeface="-apple-system"/>
+              </a:rPr>
+              <a:t>isplay details of an order</a:t>
+            </a:r>
+          </a:p>
+        </p:txBody>
+      </p:sp>
+      <p:pic>
+        <p:nvPicPr>
+          <p:cNvPr id="9" name="Content Placeholder 8">
+            <a:extLst>
+              <a:ext uri="{FF2B5EF4-FFF2-40B4-BE49-F238E27FC236}">
+                <a16:creationId xmlns:a16="http://schemas.microsoft.com/office/drawing/2014/main" id="{7FCAC4CA-9130-461C-9642-B04C996AACA6}"/>
+              </a:ext>
+            </a:extLst>
+          </p:cNvPr>
+          <p:cNvPicPr>
+            <a:picLocks noGrp="1" noChangeAspect="1"/>
+          </p:cNvPicPr>
+          <p:nvPr>
+            <p:ph idx="1"/>
+          </p:nvPr>
+        </p:nvPicPr>
+        <p:blipFill>
+          <a:blip r:embed="rId2"/>
+          <a:stretch>
+            <a:fillRect/>
+          </a:stretch>
+        </p:blipFill>
+        <p:spPr>
+          <a:xfrm>
+            <a:off x="0" y="1810031"/>
+            <a:ext cx="8255424" cy="2292468"/>
+          </a:xfrm>
+        </p:spPr>
+      </p:pic>
+    </p:spTree>
+    <p:extLst>
+      <p:ext uri="{BB962C8B-B14F-4D97-AF65-F5344CB8AC3E}">
+        <p14:creationId xmlns:p14="http://schemas.microsoft.com/office/powerpoint/2010/main" val="1712774209"/>
+      </p:ext>
+    </p:extLst>
+  </p:cSld>
+  <p:clrMapOvr>
+    <a:masterClrMapping/>
+  </p:clrMapOvr>
+</p:sld>
+</file>
+
+<file path=ppt/slides/slide18.xml><?xml version="1.0" encoding="utf-8"?>
+<p:sld xmlns:a="http://schemas.openxmlformats.org/drawingml/2006/main" xmlns:r="http://schemas.openxmlformats.org/officeDocument/2006/relationships" xmlns:p="http://schemas.openxmlformats.org/presentationml/2006/main">
+  <p:cSld>
+    <p:spTree>
+      <p:nvGrpSpPr>
+        <p:cNvPr id="1" name=""/>
+        <p:cNvGrpSpPr/>
+        <p:nvPr/>
+      </p:nvGrpSpPr>
+      <p:grpSpPr>
+        <a:xfrm>
+          <a:off x="0" y="0"/>
+          <a:ext cx="0" cy="0"/>
+          <a:chOff x="0" y="0"/>
+          <a:chExt cx="0" cy="0"/>
+        </a:xfrm>
+      </p:grpSpPr>
+      <p:sp>
+        <p:nvSpPr>
+          <p:cNvPr id="2" name="Title 1">
+            <a:extLst>
+              <a:ext uri="{FF2B5EF4-FFF2-40B4-BE49-F238E27FC236}">
+                <a16:creationId xmlns:a16="http://schemas.microsoft.com/office/drawing/2014/main" id="{49C735E6-F3E2-4C7D-BEFD-D14D795BD513}"/>
+              </a:ext>
+            </a:extLst>
+          </p:cNvPr>
+          <p:cNvSpPr>
+            <a:spLocks noGrp="1"/>
+          </p:cNvSpPr>
+          <p:nvPr>
+            <p:ph type="title"/>
+          </p:nvPr>
+        </p:nvSpPr>
+        <p:spPr/>
+        <p:txBody>
+          <a:bodyPr/>
+          <a:lstStyle/>
+          <a:p>
+            <a:r>
+              <a:rPr lang="en-US" dirty="0">
+                <a:solidFill>
+                  <a:schemeClr val="accent4"/>
+                </a:solidFill>
+              </a:rPr>
+              <a:t>Input Validation</a:t>
+            </a:r>
+          </a:p>
+        </p:txBody>
+      </p:sp>
+      <p:pic>
+        <p:nvPicPr>
+          <p:cNvPr id="5" name="Content Placeholder 4">
+            <a:extLst>
+              <a:ext uri="{FF2B5EF4-FFF2-40B4-BE49-F238E27FC236}">
+                <a16:creationId xmlns:a16="http://schemas.microsoft.com/office/drawing/2014/main" id="{C3F0317C-2F09-4FBB-A7A7-362F21F6895E}"/>
+              </a:ext>
+            </a:extLst>
+          </p:cNvPr>
+          <p:cNvPicPr>
+            <a:picLocks noGrp="1" noChangeAspect="1"/>
+          </p:cNvPicPr>
+          <p:nvPr>
+            <p:ph idx="1"/>
+          </p:nvPr>
+        </p:nvPicPr>
+        <p:blipFill rotWithShape="1">
+          <a:blip r:embed="rId2"/>
+          <a:srcRect r="4632" b="23330"/>
+          <a:stretch/>
+        </p:blipFill>
+        <p:spPr>
+          <a:xfrm>
+            <a:off x="294047" y="1536169"/>
+            <a:ext cx="8164167" cy="1215498"/>
+          </a:xfrm>
+        </p:spPr>
+      </p:pic>
+      <p:pic>
+        <p:nvPicPr>
+          <p:cNvPr id="4" name="Picture 3">
+            <a:extLst>
+              <a:ext uri="{FF2B5EF4-FFF2-40B4-BE49-F238E27FC236}">
+                <a16:creationId xmlns:a16="http://schemas.microsoft.com/office/drawing/2014/main" id="{C4A7D303-FBFA-4398-9A81-47B32366C107}"/>
+              </a:ext>
+            </a:extLst>
+          </p:cNvPr>
+          <p:cNvPicPr>
+            <a:picLocks noChangeAspect="1"/>
+          </p:cNvPicPr>
+          <p:nvPr/>
+        </p:nvPicPr>
+        <p:blipFill>
+          <a:blip r:embed="rId3"/>
+          <a:stretch>
+            <a:fillRect/>
+          </a:stretch>
+        </p:blipFill>
+        <p:spPr>
+          <a:xfrm>
+            <a:off x="219841" y="3003273"/>
+            <a:ext cx="8312577" cy="3340272"/>
+          </a:xfrm>
+          <a:prstGeom prst="rect">
+            <a:avLst/>
+          </a:prstGeom>
+        </p:spPr>
+      </p:pic>
+      <p:pic>
+        <p:nvPicPr>
+          <p:cNvPr id="9" name="Content Placeholder 7">
+            <a:extLst>
+              <a:ext uri="{FF2B5EF4-FFF2-40B4-BE49-F238E27FC236}">
+                <a16:creationId xmlns:a16="http://schemas.microsoft.com/office/drawing/2014/main" id="{C702B05C-E145-4A62-968A-DFF7A4073289}"/>
+              </a:ext>
+            </a:extLst>
+          </p:cNvPr>
+          <p:cNvPicPr>
+            <a:picLocks noChangeAspect="1"/>
+          </p:cNvPicPr>
+          <p:nvPr/>
+        </p:nvPicPr>
+        <p:blipFill>
+          <a:blip r:embed="rId4"/>
+          <a:stretch>
+            <a:fillRect/>
+          </a:stretch>
+        </p:blipFill>
+        <p:spPr>
+          <a:xfrm>
+            <a:off x="7367265" y="801938"/>
+            <a:ext cx="4610337" cy="482625"/>
+          </a:xfrm>
+          <a:prstGeom prst="rect">
+            <a:avLst/>
+          </a:prstGeom>
+        </p:spPr>
+      </p:pic>
+    </p:spTree>
+    <p:extLst>
+      <p:ext uri="{BB962C8B-B14F-4D97-AF65-F5344CB8AC3E}">
+        <p14:creationId xmlns:p14="http://schemas.microsoft.com/office/powerpoint/2010/main" val="99630070"/>
+      </p:ext>
+    </p:extLst>
+  </p:cSld>
+  <p:clrMapOvr>
+    <a:masterClrMapping/>
+  </p:clrMapOvr>
+</p:sld>
+</file>
+
+<file path=ppt/slides/slide19.xml><?xml version="1.0" encoding="utf-8"?>
+<p:sld xmlns:a="http://schemas.openxmlformats.org/drawingml/2006/main" xmlns:r="http://schemas.openxmlformats.org/officeDocument/2006/relationships" xmlns:p="http://schemas.openxmlformats.org/presentationml/2006/main">
+  <p:cSld>
+    <p:spTree>
+      <p:nvGrpSpPr>
+        <p:cNvPr id="1" name=""/>
+        <p:cNvGrpSpPr/>
+        <p:nvPr/>
+      </p:nvGrpSpPr>
+      <p:grpSpPr>
+        <a:xfrm>
+          <a:off x="0" y="0"/>
+          <a:ext cx="0" cy="0"/>
+          <a:chOff x="0" y="0"/>
+          <a:chExt cx="0" cy="0"/>
+        </a:xfrm>
+      </p:grpSpPr>
+      <p:sp>
+        <p:nvSpPr>
+          <p:cNvPr id="2" name="Title 1">
+            <a:extLst>
+              <a:ext uri="{FF2B5EF4-FFF2-40B4-BE49-F238E27FC236}">
+                <a16:creationId xmlns:a16="http://schemas.microsoft.com/office/drawing/2014/main" id="{49C735E6-F3E2-4C7D-BEFD-D14D795BD513}"/>
+              </a:ext>
+            </a:extLst>
+          </p:cNvPr>
+          <p:cNvSpPr>
+            <a:spLocks noGrp="1"/>
+          </p:cNvSpPr>
+          <p:nvPr>
+            <p:ph type="title"/>
+          </p:nvPr>
+        </p:nvSpPr>
+        <p:spPr/>
+        <p:txBody>
+          <a:bodyPr/>
+          <a:lstStyle/>
+          <a:p>
+            <a:r>
+              <a:rPr lang="en-US" dirty="0">
+                <a:solidFill>
+                  <a:srgbClr val="C00000"/>
+                </a:solidFill>
+              </a:rPr>
+              <a:t>Exception Handling</a:t>
+            </a:r>
+          </a:p>
+        </p:txBody>
+      </p:sp>
+      <p:pic>
+        <p:nvPicPr>
+          <p:cNvPr id="12" name="Content Placeholder 11">
+            <a:extLst>
+              <a:ext uri="{FF2B5EF4-FFF2-40B4-BE49-F238E27FC236}">
+                <a16:creationId xmlns:a16="http://schemas.microsoft.com/office/drawing/2014/main" id="{B6D760C8-DDDA-4FF2-A40C-0528A71D1812}"/>
+              </a:ext>
+            </a:extLst>
+          </p:cNvPr>
+          <p:cNvPicPr>
+            <a:picLocks noGrp="1" noChangeAspect="1"/>
+          </p:cNvPicPr>
+          <p:nvPr>
+            <p:ph idx="1"/>
+          </p:nvPr>
+        </p:nvPicPr>
+        <p:blipFill>
+          <a:blip r:embed="rId2"/>
+          <a:stretch>
+            <a:fillRect/>
+          </a:stretch>
+        </p:blipFill>
+        <p:spPr>
+          <a:xfrm>
+            <a:off x="838200" y="2297951"/>
+            <a:ext cx="10111019" cy="3332828"/>
+          </a:xfrm>
+          <a:prstGeom prst="rect">
+            <a:avLst/>
+          </a:prstGeom>
+        </p:spPr>
+      </p:pic>
+    </p:spTree>
+    <p:extLst>
+      <p:ext uri="{BB962C8B-B14F-4D97-AF65-F5344CB8AC3E}">
+        <p14:creationId xmlns:p14="http://schemas.microsoft.com/office/powerpoint/2010/main" val="4027085851"/>
+      </p:ext>
+    </p:extLst>
+  </p:cSld>
+  <p:clrMapOvr>
+    <a:masterClrMapping/>
+  </p:clrMapOvr>
+</p:sld>
+</file>
+
+<file path=ppt/slides/slide2.xml><?xml version="1.0" encoding="utf-8"?>
 <p:sld xmlns:a="http://schemas.openxmlformats.org/drawingml/2006/main" xmlns:r="http://schemas.openxmlformats.org/officeDocument/2006/relationships" xmlns:p="http://schemas.openxmlformats.org/presentationml/2006/main">
   <p:cSld>
     <p:bg>
@@ -5277,12 +5665,8 @@
           <a:lstStyle/>
           <a:p>
             <a:r>
-              <a:rPr lang="en-US" dirty="0">
-                <a:solidFill>
-                  <a:schemeClr val="accent4"/>
-                </a:solidFill>
-              </a:rPr>
-              <a:t>Solution Design</a:t>
+              <a:rPr lang="en-US" dirty="0"/>
+              <a:t>Design</a:t>
             </a:r>
           </a:p>
         </p:txBody>
@@ -5348,39 +5732,273 @@
           </a:p>
         </p:txBody>
       </p:sp>
-      <p:pic>
-        <p:nvPicPr>
-          <p:cNvPr id="5" name="Content Placeholder 4">
-            <a:extLst>
-              <a:ext uri="{FF2B5EF4-FFF2-40B4-BE49-F238E27FC236}">
-                <a16:creationId xmlns:a16="http://schemas.microsoft.com/office/drawing/2014/main" id="{91936902-80E5-42EE-A914-1041CA1651B1}"/>
-              </a:ext>
-            </a:extLst>
-          </p:cNvPr>
-          <p:cNvPicPr>
-            <a:picLocks noGrp="1" noChangeAspect="1"/>
-          </p:cNvPicPr>
+      <p:sp>
+        <p:nvSpPr>
+          <p:cNvPr id="3" name="Content Placeholder 2">
+            <a:extLst>
+              <a:ext uri="{FF2B5EF4-FFF2-40B4-BE49-F238E27FC236}">
+                <a16:creationId xmlns:a16="http://schemas.microsoft.com/office/drawing/2014/main" id="{B0E6C757-079E-465A-8C76-073E2B3C476E}"/>
+              </a:ext>
+            </a:extLst>
+          </p:cNvPr>
+          <p:cNvSpPr>
+            <a:spLocks noGrp="1"/>
+          </p:cNvSpPr>
           <p:nvPr>
             <p:ph idx="1"/>
           </p:nvPr>
-        </p:nvPicPr>
-        <p:blipFill>
-          <a:blip r:embed="rId2"/>
-          <a:stretch>
-            <a:fillRect/>
-          </a:stretch>
-        </p:blipFill>
-        <p:spPr>
-          <a:xfrm>
-            <a:off x="1205817" y="1698241"/>
-            <a:ext cx="2657671" cy="4351338"/>
-          </a:xfrm>
-        </p:spPr>
-      </p:pic>
+        </p:nvSpPr>
+        <p:spPr>
+          <a:xfrm>
+            <a:off x="838200" y="1825625"/>
+            <a:ext cx="10515600" cy="4351338"/>
+          </a:xfrm>
+        </p:spPr>
+        <p:txBody>
+          <a:bodyPr>
+            <a:normAutofit fontScale="92500" lnSpcReduction="10000"/>
+          </a:bodyPr>
+          <a:lstStyle/>
+          <a:p>
+            <a:r>
+              <a:rPr lang="en-US" sz="2200" b="0" i="0" dirty="0">
+                <a:solidFill>
+                  <a:schemeClr val="accent6"/>
+                </a:solidFill>
+                <a:effectLst/>
+                <a:latin typeface="-apple-system"/>
+              </a:rPr>
+              <a:t>Db 3</a:t>
+            </a:r>
+            <a:r>
+              <a:rPr lang="en-US" sz="2200" baseline="30000" dirty="0">
+                <a:solidFill>
+                  <a:schemeClr val="accent6"/>
+                </a:solidFill>
+                <a:latin typeface="-apple-system"/>
+              </a:rPr>
+              <a:t>rd</a:t>
+            </a:r>
+            <a:r>
+              <a:rPr lang="en-US" sz="2200" dirty="0">
+                <a:solidFill>
+                  <a:schemeClr val="accent6"/>
+                </a:solidFill>
+                <a:latin typeface="-apple-system"/>
+              </a:rPr>
+              <a:t> Normal Form</a:t>
+            </a:r>
+          </a:p>
+          <a:p>
+            <a:pPr>
+              <a:buFont typeface="Arial" panose="020B0604020202020204" pitchFamily="34" charset="0"/>
+              <a:buChar char="•"/>
+            </a:pPr>
+            <a:r>
+              <a:rPr lang="en-US" sz="2200" dirty="0">
+                <a:solidFill>
+                  <a:schemeClr val="accent6"/>
+                </a:solidFill>
+                <a:latin typeface="-apple-system"/>
+              </a:rPr>
+              <a:t>EF Core w/ Db Approach</a:t>
+            </a:r>
+          </a:p>
+          <a:p>
+            <a:r>
+              <a:rPr lang="en-US" sz="2200" b="0" i="0" dirty="0">
+                <a:solidFill>
+                  <a:schemeClr val="accent6"/>
+                </a:solidFill>
+                <a:effectLst/>
+                <a:latin typeface="-apple-system"/>
+              </a:rPr>
+              <a:t>Locations have an inventory</a:t>
+            </a:r>
+          </a:p>
+          <a:p>
+            <a:r>
+              <a:rPr lang="en-US" sz="2200" dirty="0">
+                <a:solidFill>
+                  <a:schemeClr val="accent6"/>
+                </a:solidFill>
+                <a:latin typeface="-apple-system"/>
+              </a:rPr>
+              <a:t>“Solution Design”</a:t>
+            </a:r>
+          </a:p>
+          <a:p>
+            <a:pPr lvl="1"/>
+            <a:r>
+              <a:rPr lang="en-US" sz="1800" b="0" i="0" dirty="0">
+                <a:solidFill>
+                  <a:schemeClr val="accent6"/>
+                </a:solidFill>
+                <a:effectLst/>
+                <a:latin typeface="-apple-system"/>
+              </a:rPr>
+              <a:t>Domain classes</a:t>
+            </a:r>
+          </a:p>
+          <a:p>
+            <a:pPr lvl="1"/>
+            <a:r>
+              <a:rPr lang="en-US" sz="1800" dirty="0">
+                <a:solidFill>
+                  <a:schemeClr val="accent6"/>
+                </a:solidFill>
+                <a:latin typeface="-apple-system"/>
+              </a:rPr>
+              <a:t>Db Access library</a:t>
+            </a:r>
+          </a:p>
+          <a:p>
+            <a:pPr lvl="1"/>
+            <a:r>
+              <a:rPr lang="en-US" sz="1800" dirty="0" err="1">
+                <a:solidFill>
+                  <a:schemeClr val="accent4"/>
+                </a:solidFill>
+                <a:latin typeface="-apple-system"/>
+              </a:rPr>
+              <a:t>BusLogic</a:t>
+            </a:r>
+            <a:r>
+              <a:rPr lang="en-US" sz="1800" dirty="0">
+                <a:solidFill>
+                  <a:schemeClr val="accent4"/>
+                </a:solidFill>
+                <a:latin typeface="-apple-system"/>
+              </a:rPr>
+              <a:t> project</a:t>
+            </a:r>
+            <a:endParaRPr lang="en-US" sz="1800" dirty="0">
+              <a:solidFill>
+                <a:schemeClr val="accent6"/>
+              </a:solidFill>
+              <a:latin typeface="-apple-system"/>
+            </a:endParaRPr>
+          </a:p>
+          <a:p>
+            <a:pPr>
+              <a:buFont typeface="Arial" panose="020B0604020202020204" pitchFamily="34" charset="0"/>
+              <a:buChar char="•"/>
+            </a:pPr>
+            <a:r>
+              <a:rPr lang="en-US" sz="2200" b="0" i="0" dirty="0">
+                <a:solidFill>
+                  <a:schemeClr val="accent4"/>
+                </a:solidFill>
+                <a:effectLst/>
+                <a:latin typeface="-apple-system"/>
+              </a:rPr>
+              <a:t>Interfaces for helper classes</a:t>
+            </a:r>
+          </a:p>
+          <a:p>
+            <a:r>
+              <a:rPr lang="en-US" sz="2200" b="0" i="0" dirty="0">
+                <a:solidFill>
+                  <a:schemeClr val="accent4"/>
+                </a:solidFill>
+                <a:effectLst/>
+                <a:latin typeface="-apple-system"/>
+              </a:rPr>
+              <a:t>persistent data (to a DB); no hardcoding of data.(prices, customers, order history, etc.)</a:t>
+            </a:r>
+          </a:p>
+          <a:p>
+            <a:pPr>
+              <a:buFont typeface="Arial" panose="020B0604020202020204" pitchFamily="34" charset="0"/>
+              <a:buChar char="•"/>
+            </a:pPr>
+            <a:r>
+              <a:rPr lang="en-US" sz="2200" b="0" i="0" dirty="0">
+                <a:solidFill>
+                  <a:srgbClr val="C00000"/>
+                </a:solidFill>
+                <a:effectLst/>
+                <a:latin typeface="-apple-system"/>
+              </a:rPr>
+              <a:t>XML</a:t>
+            </a:r>
+            <a:r>
+              <a:rPr lang="en-US" sz="2200" dirty="0">
+                <a:solidFill>
+                  <a:srgbClr val="C00000"/>
+                </a:solidFill>
+                <a:latin typeface="-apple-system"/>
+              </a:rPr>
+              <a:t> comments</a:t>
+            </a:r>
+          </a:p>
+          <a:p>
+            <a:pPr>
+              <a:buFont typeface="Arial" panose="020B0604020202020204" pitchFamily="34" charset="0"/>
+              <a:buChar char="•"/>
+            </a:pPr>
+            <a:r>
+              <a:rPr lang="en-US" sz="2200" b="0" i="0" dirty="0">
+                <a:solidFill>
+                  <a:srgbClr val="C00000"/>
+                </a:solidFill>
+                <a:effectLst/>
+                <a:latin typeface="-apple-system"/>
+              </a:rPr>
+              <a:t>Inventory </a:t>
+            </a:r>
+            <a:r>
+              <a:rPr lang="en-US" sz="2200" b="0" i="0" dirty="0" err="1">
+                <a:solidFill>
+                  <a:srgbClr val="C00000"/>
+                </a:solidFill>
+                <a:effectLst/>
+                <a:latin typeface="-apple-system"/>
+              </a:rPr>
+              <a:t>decrementation</a:t>
+            </a:r>
+            <a:endParaRPr lang="en-US" sz="2200" b="0" i="0" dirty="0">
+              <a:solidFill>
+                <a:srgbClr val="C00000"/>
+              </a:solidFill>
+              <a:effectLst/>
+              <a:latin typeface="-apple-system"/>
+            </a:endParaRPr>
+          </a:p>
+          <a:p>
+            <a:pPr>
+              <a:buFont typeface="Arial" panose="020B0604020202020204" pitchFamily="34" charset="0"/>
+              <a:buChar char="•"/>
+            </a:pPr>
+            <a:r>
+              <a:rPr lang="en-US" sz="2200" dirty="0">
+                <a:solidFill>
+                  <a:srgbClr val="C00000"/>
+                </a:solidFill>
+                <a:latin typeface="-apple-system"/>
+              </a:rPr>
+              <a:t>10 Unit testing methods</a:t>
+            </a:r>
+            <a:endParaRPr lang="en-US" sz="2200" b="0" i="0" dirty="0">
+              <a:solidFill>
+                <a:srgbClr val="C00000"/>
+              </a:solidFill>
+              <a:effectLst/>
+              <a:latin typeface="-apple-system"/>
+            </a:endParaRPr>
+          </a:p>
+          <a:p>
+            <a:pPr marL="0" indent="0">
+              <a:buNone/>
+            </a:pPr>
+            <a:endParaRPr lang="en-US" sz="2200" dirty="0"/>
+          </a:p>
+        </p:txBody>
+      </p:sp>
     </p:spTree>
     <p:extLst>
       <p:ext uri="{BB962C8B-B14F-4D97-AF65-F5344CB8AC3E}">
-        <p14:creationId xmlns:p14="http://schemas.microsoft.com/office/powerpoint/2010/main" val="4054503862"/>
+        <p14:creationId xmlns:p14="http://schemas.microsoft.com/office/powerpoint/2010/main" val="3274383637"/>
       </p:ext>
     </p:extLst>
   </p:cSld>
@@ -5390,7 +6008,515 @@
 </p:sld>
 </file>
 
-<file path=ppt/slides/slide17.xml><?xml version="1.0" encoding="utf-8"?>
+<file path=ppt/slides/slide3.xml><?xml version="1.0" encoding="utf-8"?>
+<p:sld xmlns:a="http://schemas.openxmlformats.org/drawingml/2006/main" xmlns:r="http://schemas.openxmlformats.org/officeDocument/2006/relationships" xmlns:p="http://schemas.openxmlformats.org/presentationml/2006/main">
+  <p:cSld>
+    <p:bg>
+      <p:bgPr>
+        <a:solidFill>
+          <a:schemeClr val="bg1"/>
+        </a:solidFill>
+        <a:effectLst/>
+      </p:bgPr>
+    </p:bg>
+    <p:spTree>
+      <p:nvGrpSpPr>
+        <p:cNvPr id="1" name=""/>
+        <p:cNvGrpSpPr/>
+        <p:nvPr/>
+      </p:nvGrpSpPr>
+      <p:grpSpPr>
+        <a:xfrm>
+          <a:off x="0" y="0"/>
+          <a:ext cx="0" cy="0"/>
+          <a:chOff x="0" y="0"/>
+          <a:chExt cx="0" cy="0"/>
+        </a:xfrm>
+      </p:grpSpPr>
+      <p:sp useBgFill="1">
+        <p:nvSpPr>
+          <p:cNvPr id="17" name="Rectangle 16">
+            <a:extLst>
+              <a:ext uri="{FF2B5EF4-FFF2-40B4-BE49-F238E27FC236}">
+                <a16:creationId xmlns:a16="http://schemas.microsoft.com/office/drawing/2014/main" id="{AC5782D3-6CED-43A7-BE35-09C48F8091FB}"/>
+              </a:ext>
+              <a:ext uri="{C183D7F6-B498-43B3-948B-1728B52AA6E4}">
+                <adec:decorative xmlns:adec="http://schemas.microsoft.com/office/drawing/2017/decorative" val="1"/>
+              </a:ext>
+            </a:extLst>
+          </p:cNvPr>
+          <p:cNvSpPr>
+            <a:spLocks noGrp="1" noRot="1" noChangeAspect="1" noMove="1" noResize="1" noEditPoints="1" noAdjustHandles="1" noChangeArrowheads="1" noChangeShapeType="1" noTextEdit="1"/>
+          </p:cNvSpPr>
+          <p:nvPr>
+            <p:extLst>
+              <p:ext uri="{386F3935-93C4-4BCD-93E2-E3B085C9AB24}">
+                <p16:designElem xmlns:p16="http://schemas.microsoft.com/office/powerpoint/2015/main" val="1"/>
+              </p:ext>
+            </p:extLst>
+          </p:nvPr>
+        </p:nvSpPr>
+        <p:spPr>
+          <a:xfrm>
+            <a:off x="0" y="0"/>
+            <a:ext cx="12188952" cy="6858000"/>
+          </a:xfrm>
+          <a:prstGeom prst="rect">
+            <a:avLst/>
+          </a:prstGeom>
+          <a:ln>
+            <a:noFill/>
+          </a:ln>
+        </p:spPr>
+        <p:style>
+          <a:lnRef idx="2">
+            <a:schemeClr val="accent1">
+              <a:shade val="50000"/>
+            </a:schemeClr>
+          </a:lnRef>
+          <a:fillRef idx="1">
+            <a:schemeClr val="accent1"/>
+          </a:fillRef>
+          <a:effectRef idx="0">
+            <a:schemeClr val="accent1"/>
+          </a:effectRef>
+          <a:fontRef idx="minor">
+            <a:schemeClr val="lt1"/>
+          </a:fontRef>
+        </p:style>
+        <p:txBody>
+          <a:bodyPr rtlCol="0" anchor="ctr"/>
+          <a:lstStyle/>
+          <a:p>
+            <a:pPr algn="ctr"/>
+            <a:endParaRPr lang="en-US"/>
+          </a:p>
+        </p:txBody>
+      </p:sp>
+      <p:sp>
+        <p:nvSpPr>
+          <p:cNvPr id="19" name="Freeform 6">
+            <a:extLst>
+              <a:ext uri="{FF2B5EF4-FFF2-40B4-BE49-F238E27FC236}">
+                <a16:creationId xmlns:a16="http://schemas.microsoft.com/office/drawing/2014/main" id="{6721F593-ECD2-4B5B-AAE4-0866A4CDC970}"/>
+              </a:ext>
+              <a:ext uri="{C183D7F6-B498-43B3-948B-1728B52AA6E4}">
+                <adec:decorative xmlns:adec="http://schemas.microsoft.com/office/drawing/2017/decorative" val="1"/>
+              </a:ext>
+            </a:extLst>
+          </p:cNvPr>
+          <p:cNvSpPr>
+            <a:spLocks noGrp="1" noRot="1" noChangeAspect="1" noMove="1" noResize="1" noEditPoints="1" noAdjustHandles="1" noChangeArrowheads="1" noChangeShapeType="1" noTextEdit="1"/>
+          </p:cNvSpPr>
+          <p:nvPr>
+            <p:extLst>
+              <p:ext uri="{386F3935-93C4-4BCD-93E2-E3B085C9AB24}">
+                <p16:designElem xmlns:p16="http://schemas.microsoft.com/office/powerpoint/2015/main" val="1"/>
+              </p:ext>
+            </p:extLst>
+          </p:nvPr>
+        </p:nvSpPr>
+        <p:spPr bwMode="auto">
+          <a:xfrm>
+            <a:off x="10989586" y="1070835"/>
+            <a:ext cx="687754" cy="5710965"/>
+          </a:xfrm>
+          <a:custGeom>
+            <a:avLst/>
+            <a:gdLst>
+              <a:gd name="T0" fmla="*/ 414 w 414"/>
+              <a:gd name="T1" fmla="*/ 2447 h 2447"/>
+              <a:gd name="T2" fmla="*/ 0 w 414"/>
+              <a:gd name="T3" fmla="*/ 2247 h 2447"/>
+              <a:gd name="T4" fmla="*/ 0 w 414"/>
+              <a:gd name="T5" fmla="*/ 0 h 2447"/>
+              <a:gd name="T6" fmla="*/ 414 w 414"/>
+              <a:gd name="T7" fmla="*/ 200 h 2447"/>
+              <a:gd name="T8" fmla="*/ 414 w 414"/>
+              <a:gd name="T9" fmla="*/ 2447 h 2447"/>
+            </a:gdLst>
+            <a:ahLst/>
+            <a:cxnLst>
+              <a:cxn ang="0">
+                <a:pos x="T0" y="T1"/>
+              </a:cxn>
+              <a:cxn ang="0">
+                <a:pos x="T2" y="T3"/>
+              </a:cxn>
+              <a:cxn ang="0">
+                <a:pos x="T4" y="T5"/>
+              </a:cxn>
+              <a:cxn ang="0">
+                <a:pos x="T6" y="T7"/>
+              </a:cxn>
+              <a:cxn ang="0">
+                <a:pos x="T8" y="T9"/>
+              </a:cxn>
+            </a:cxnLst>
+            <a:rect l="0" t="0" r="r" b="b"/>
+            <a:pathLst>
+              <a:path w="414" h="2447">
+                <a:moveTo>
+                  <a:pt x="414" y="2447"/>
+                </a:moveTo>
+                <a:lnTo>
+                  <a:pt x="0" y="2247"/>
+                </a:lnTo>
+                <a:lnTo>
+                  <a:pt x="0" y="0"/>
+                </a:lnTo>
+                <a:lnTo>
+                  <a:pt x="414" y="200"/>
+                </a:lnTo>
+                <a:lnTo>
+                  <a:pt x="414" y="2447"/>
+                </a:lnTo>
+                <a:close/>
+              </a:path>
+            </a:pathLst>
+          </a:custGeom>
+          <a:solidFill>
+            <a:schemeClr val="accent1">
+              <a:lumMod val="75000"/>
+            </a:schemeClr>
+          </a:solidFill>
+          <a:ln>
+            <a:noFill/>
+          </a:ln>
+        </p:spPr>
+        <p:txBody>
+          <a:bodyPr vert="horz" wrap="square" lIns="91440" tIns="45720" rIns="91440" bIns="45720" numCol="1" anchor="t" anchorCtr="0" compatLnSpc="1">
+            <a:prstTxWarp prst="textNoShape">
+              <a:avLst/>
+            </a:prstTxWarp>
+          </a:bodyPr>
+          <a:lstStyle/>
+          <a:p>
+            <a:endParaRPr lang="en-US"/>
+          </a:p>
+        </p:txBody>
+      </p:sp>
+      <p:sp>
+        <p:nvSpPr>
+          <p:cNvPr id="21" name="Freeform 7">
+            <a:extLst>
+              <a:ext uri="{FF2B5EF4-FFF2-40B4-BE49-F238E27FC236}">
+                <a16:creationId xmlns:a16="http://schemas.microsoft.com/office/drawing/2014/main" id="{71DEE99F-D18C-4025-BA3F-CEBF5258ED3D}"/>
+              </a:ext>
+              <a:ext uri="{C183D7F6-B498-43B3-948B-1728B52AA6E4}">
+                <adec:decorative xmlns:adec="http://schemas.microsoft.com/office/drawing/2017/decorative" val="1"/>
+              </a:ext>
+            </a:extLst>
+          </p:cNvPr>
+          <p:cNvSpPr>
+            <a:spLocks noGrp="1" noRot="1" noChangeAspect="1" noMove="1" noResize="1" noEditPoints="1" noAdjustHandles="1" noChangeArrowheads="1" noChangeShapeType="1" noTextEdit="1"/>
+          </p:cNvSpPr>
+          <p:nvPr>
+            <p:extLst>
+              <p:ext uri="{386F3935-93C4-4BCD-93E2-E3B085C9AB24}">
+                <p16:designElem xmlns:p16="http://schemas.microsoft.com/office/powerpoint/2015/main" val="1"/>
+              </p:ext>
+            </p:extLst>
+          </p:nvPr>
+        </p:nvSpPr>
+        <p:spPr bwMode="auto">
+          <a:xfrm>
+            <a:off x="10988949" y="803186"/>
+            <a:ext cx="409371" cy="5521414"/>
+          </a:xfrm>
+          <a:custGeom>
+            <a:avLst/>
+            <a:gdLst>
+              <a:gd name="T0" fmla="*/ 209 w 209"/>
+              <a:gd name="T1" fmla="*/ 2246 h 2358"/>
+              <a:gd name="T2" fmla="*/ 0 w 209"/>
+              <a:gd name="T3" fmla="*/ 2358 h 2358"/>
+              <a:gd name="T4" fmla="*/ 0 w 209"/>
+              <a:gd name="T5" fmla="*/ 111 h 2358"/>
+              <a:gd name="T6" fmla="*/ 209 w 209"/>
+              <a:gd name="T7" fmla="*/ 0 h 2358"/>
+              <a:gd name="T8" fmla="*/ 209 w 209"/>
+              <a:gd name="T9" fmla="*/ 2246 h 2358"/>
+            </a:gdLst>
+            <a:ahLst/>
+            <a:cxnLst>
+              <a:cxn ang="0">
+                <a:pos x="T0" y="T1"/>
+              </a:cxn>
+              <a:cxn ang="0">
+                <a:pos x="T2" y="T3"/>
+              </a:cxn>
+              <a:cxn ang="0">
+                <a:pos x="T4" y="T5"/>
+              </a:cxn>
+              <a:cxn ang="0">
+                <a:pos x="T6" y="T7"/>
+              </a:cxn>
+              <a:cxn ang="0">
+                <a:pos x="T8" y="T9"/>
+              </a:cxn>
+            </a:cxnLst>
+            <a:rect l="0" t="0" r="r" b="b"/>
+            <a:pathLst>
+              <a:path w="209" h="2358">
+                <a:moveTo>
+                  <a:pt x="209" y="2246"/>
+                </a:moveTo>
+                <a:lnTo>
+                  <a:pt x="0" y="2358"/>
+                </a:lnTo>
+                <a:lnTo>
+                  <a:pt x="0" y="111"/>
+                </a:lnTo>
+                <a:lnTo>
+                  <a:pt x="209" y="0"/>
+                </a:lnTo>
+                <a:lnTo>
+                  <a:pt x="209" y="2246"/>
+                </a:lnTo>
+                <a:close/>
+              </a:path>
+            </a:pathLst>
+          </a:custGeom>
+          <a:solidFill>
+            <a:schemeClr val="accent1">
+              <a:lumMod val="50000"/>
+            </a:schemeClr>
+          </a:solidFill>
+          <a:ln>
+            <a:noFill/>
+          </a:ln>
+        </p:spPr>
+        <p:txBody>
+          <a:bodyPr vert="horz" wrap="square" lIns="91440" tIns="45720" rIns="91440" bIns="45720" numCol="1" anchor="t" anchorCtr="0" compatLnSpc="1">
+            <a:prstTxWarp prst="textNoShape">
+              <a:avLst/>
+            </a:prstTxWarp>
+          </a:bodyPr>
+          <a:lstStyle/>
+          <a:p>
+            <a:endParaRPr lang="en-US"/>
+          </a:p>
+        </p:txBody>
+      </p:sp>
+      <p:sp>
+        <p:nvSpPr>
+          <p:cNvPr id="23" name="Rectangle 8">
+            <a:extLst>
+              <a:ext uri="{FF2B5EF4-FFF2-40B4-BE49-F238E27FC236}">
+                <a16:creationId xmlns:a16="http://schemas.microsoft.com/office/drawing/2014/main" id="{976FA5D9-3A7C-4FA7-9BA8-1905D703FD77}"/>
+              </a:ext>
+              <a:ext uri="{C183D7F6-B498-43B3-948B-1728B52AA6E4}">
+                <adec:decorative xmlns:adec="http://schemas.microsoft.com/office/drawing/2017/decorative" val="1"/>
+              </a:ext>
+            </a:extLst>
+          </p:cNvPr>
+          <p:cNvSpPr>
+            <a:spLocks noGrp="1" noRot="1" noChangeAspect="1" noMove="1" noResize="1" noEditPoints="1" noAdjustHandles="1" noChangeArrowheads="1" noChangeShapeType="1" noTextEdit="1"/>
+          </p:cNvSpPr>
+          <p:nvPr>
+            <p:extLst>
+              <p:ext uri="{386F3935-93C4-4BCD-93E2-E3B085C9AB24}">
+                <p16:designElem xmlns:p16="http://schemas.microsoft.com/office/powerpoint/2015/main" val="1"/>
+              </p:ext>
+            </p:extLst>
+          </p:nvPr>
+        </p:nvSpPr>
+        <p:spPr bwMode="auto">
+          <a:xfrm>
+            <a:off x="7513372" y="804101"/>
+            <a:ext cx="3880238" cy="5251646"/>
+          </a:xfrm>
+          <a:prstGeom prst="rect">
+            <a:avLst/>
+          </a:prstGeom>
+          <a:solidFill>
+            <a:schemeClr val="accent1"/>
+          </a:solidFill>
+          <a:ln>
+            <a:noFill/>
+          </a:ln>
+        </p:spPr>
+        <p:txBody>
+          <a:bodyPr vert="horz" wrap="square" lIns="91440" tIns="45720" rIns="91440" bIns="45720" numCol="1" anchor="t" anchorCtr="0" compatLnSpc="1">
+            <a:prstTxWarp prst="textNoShape">
+              <a:avLst/>
+            </a:prstTxWarp>
+          </a:bodyPr>
+          <a:lstStyle/>
+          <a:p>
+            <a:endParaRPr lang="en-US"/>
+          </a:p>
+        </p:txBody>
+      </p:sp>
+      <p:sp>
+        <p:nvSpPr>
+          <p:cNvPr id="2" name="Title 1">
+            <a:extLst>
+              <a:ext uri="{FF2B5EF4-FFF2-40B4-BE49-F238E27FC236}">
+                <a16:creationId xmlns:a16="http://schemas.microsoft.com/office/drawing/2014/main" id="{49C735E6-F3E2-4C7D-BEFD-D14D795BD513}"/>
+              </a:ext>
+            </a:extLst>
+          </p:cNvPr>
+          <p:cNvSpPr>
+            <a:spLocks noGrp="1"/>
+          </p:cNvSpPr>
+          <p:nvPr>
+            <p:ph type="title"/>
+          </p:nvPr>
+        </p:nvSpPr>
+        <p:spPr>
+          <a:xfrm>
+            <a:off x="7835104" y="1213968"/>
+            <a:ext cx="3220127" cy="1715106"/>
+          </a:xfrm>
+        </p:spPr>
+        <p:txBody>
+          <a:bodyPr anchor="b">
+            <a:normAutofit/>
+          </a:bodyPr>
+          <a:lstStyle/>
+          <a:p>
+            <a:r>
+              <a:rPr lang="en-US" sz="3600">
+                <a:solidFill>
+                  <a:srgbClr val="FFFFFF"/>
+                </a:solidFill>
+              </a:rPr>
+              <a:t>3NF</a:t>
+            </a:r>
+          </a:p>
+        </p:txBody>
+      </p:sp>
+      <p:pic>
+        <p:nvPicPr>
+          <p:cNvPr id="10" name="Content Placeholder 9">
+            <a:extLst>
+              <a:ext uri="{FF2B5EF4-FFF2-40B4-BE49-F238E27FC236}">
+                <a16:creationId xmlns:a16="http://schemas.microsoft.com/office/drawing/2014/main" id="{80D67C7D-C832-4800-8CEE-C201EDA72CBE}"/>
+              </a:ext>
+            </a:extLst>
+          </p:cNvPr>
+          <p:cNvPicPr>
+            <a:picLocks noChangeAspect="1"/>
+          </p:cNvPicPr>
+          <p:nvPr/>
+        </p:nvPicPr>
+        <p:blipFill rotWithShape="1">
+          <a:blip r:embed="rId2"/>
+          <a:srcRect l="386" r="16282" b="2"/>
+          <a:stretch/>
+        </p:blipFill>
+        <p:spPr>
+          <a:xfrm>
+            <a:off x="313916" y="803186"/>
+            <a:ext cx="6730556" cy="5249798"/>
+          </a:xfrm>
+          <a:prstGeom prst="rect">
+            <a:avLst/>
+          </a:prstGeom>
+        </p:spPr>
+      </p:pic>
+      <p:sp>
+        <p:nvSpPr>
+          <p:cNvPr id="14" name="Content Placeholder 13">
+            <a:extLst>
+              <a:ext uri="{FF2B5EF4-FFF2-40B4-BE49-F238E27FC236}">
+                <a16:creationId xmlns:a16="http://schemas.microsoft.com/office/drawing/2014/main" id="{A4D83E73-DF11-49E9-B800-894130994C38}"/>
+              </a:ext>
+            </a:extLst>
+          </p:cNvPr>
+          <p:cNvSpPr>
+            <a:spLocks noGrp="1"/>
+          </p:cNvSpPr>
+          <p:nvPr>
+            <p:ph idx="1"/>
+          </p:nvPr>
+        </p:nvSpPr>
+        <p:spPr>
+          <a:xfrm>
+            <a:off x="7835105" y="3072208"/>
+            <a:ext cx="3264916" cy="2660684"/>
+          </a:xfrm>
+        </p:spPr>
+        <p:txBody>
+          <a:bodyPr anchor="t">
+            <a:normAutofit/>
+          </a:bodyPr>
+          <a:lstStyle/>
+          <a:p>
+            <a:endParaRPr lang="en-US" sz="2000">
+              <a:solidFill>
+                <a:srgbClr val="FFFFFF"/>
+              </a:solidFill>
+            </a:endParaRPr>
+          </a:p>
+        </p:txBody>
+      </p:sp>
+      <p:sp>
+        <p:nvSpPr>
+          <p:cNvPr id="25" name="Rectangle 8">
+            <a:extLst>
+              <a:ext uri="{FF2B5EF4-FFF2-40B4-BE49-F238E27FC236}">
+                <a16:creationId xmlns:a16="http://schemas.microsoft.com/office/drawing/2014/main" id="{4652D57C-331F-43B8-9C07-69FBA9C0279E}"/>
+              </a:ext>
+              <a:ext uri="{C183D7F6-B498-43B3-948B-1728B52AA6E4}">
+                <adec:decorative xmlns:adec="http://schemas.microsoft.com/office/drawing/2017/decorative" val="1"/>
+              </a:ext>
+            </a:extLst>
+          </p:cNvPr>
+          <p:cNvSpPr>
+            <a:spLocks noGrp="1" noRot="1" noChangeAspect="1" noMove="1" noResize="1" noEditPoints="1" noAdjustHandles="1" noChangeArrowheads="1" noChangeShapeType="1" noTextEdit="1"/>
+          </p:cNvSpPr>
+          <p:nvPr>
+            <p:extLst>
+              <p:ext uri="{386F3935-93C4-4BCD-93E2-E3B085C9AB24}">
+                <p16:designElem xmlns:p16="http://schemas.microsoft.com/office/powerpoint/2015/main" val="1"/>
+              </p:ext>
+            </p:extLst>
+          </p:nvPr>
+        </p:nvSpPr>
+        <p:spPr bwMode="auto">
+          <a:xfrm>
+            <a:off x="11671258" y="1530154"/>
+            <a:ext cx="520741" cy="5251646"/>
+          </a:xfrm>
+          <a:prstGeom prst="rect">
+            <a:avLst/>
+          </a:prstGeom>
+          <a:solidFill>
+            <a:schemeClr val="accent1"/>
+          </a:solidFill>
+          <a:ln>
+            <a:noFill/>
+          </a:ln>
+        </p:spPr>
+        <p:txBody>
+          <a:bodyPr vert="horz" wrap="square" lIns="91440" tIns="45720" rIns="91440" bIns="45720" numCol="1" anchor="t" anchorCtr="0" compatLnSpc="1">
+            <a:prstTxWarp prst="textNoShape">
+              <a:avLst/>
+            </a:prstTxWarp>
+          </a:bodyPr>
+          <a:lstStyle/>
+          <a:p>
+            <a:endParaRPr lang="en-US"/>
+          </a:p>
+        </p:txBody>
+      </p:sp>
+    </p:spTree>
+    <p:extLst>
+      <p:ext uri="{BB962C8B-B14F-4D97-AF65-F5344CB8AC3E}">
+        <p14:creationId xmlns:p14="http://schemas.microsoft.com/office/powerpoint/2010/main" val="3735348199"/>
+      </p:ext>
+    </p:extLst>
+  </p:cSld>
+  <p:clrMapOvr>
+    <a:masterClrMapping/>
+  </p:clrMapOvr>
+</p:sld>
+</file>
+
+<file path=ppt/slides/slide4.xml><?xml version="1.0" encoding="utf-8"?>
 <p:sld xmlns:a="http://schemas.openxmlformats.org/drawingml/2006/main" xmlns:r="http://schemas.openxmlformats.org/officeDocument/2006/relationships" xmlns:p="http://schemas.openxmlformats.org/presentationml/2006/main">
   <p:cSld>
     <p:spTree>
@@ -5431,29 +6557,79 @@
             <a:r>
               <a:rPr lang="en-US" dirty="0">
                 <a:solidFill>
-                  <a:schemeClr val="accent4"/>
+                  <a:schemeClr val="accent6"/>
                 </a:solidFill>
               </a:rPr>
-              <a:t>Interfaces</a:t>
-            </a:r>
+              <a:t>EF Core w/ Db 1</a:t>
+            </a:r>
+            <a:r>
+              <a:rPr lang="en-US" baseline="30000" dirty="0">
+                <a:solidFill>
+                  <a:schemeClr val="accent6"/>
+                </a:solidFill>
+              </a:rPr>
+              <a:t>st</a:t>
+            </a:r>
+            <a:r>
+              <a:rPr lang="en-US" dirty="0">
+                <a:solidFill>
+                  <a:schemeClr val="accent6"/>
+                </a:solidFill>
+              </a:rPr>
+              <a:t> Approach</a:t>
+            </a:r>
+          </a:p>
+        </p:txBody>
+      </p:sp>
+      <p:sp>
+        <p:nvSpPr>
+          <p:cNvPr id="4" name="Content Placeholder 3">
+            <a:extLst>
+              <a:ext uri="{FF2B5EF4-FFF2-40B4-BE49-F238E27FC236}">
+                <a16:creationId xmlns:a16="http://schemas.microsoft.com/office/drawing/2014/main" id="{28E17A24-B23D-4F9E-B65F-7CB82BF5184D}"/>
+              </a:ext>
+            </a:extLst>
+          </p:cNvPr>
+          <p:cNvSpPr>
+            <a:spLocks noGrp="1"/>
+          </p:cNvSpPr>
+          <p:nvPr>
+            <p:ph idx="1"/>
+          </p:nvPr>
+        </p:nvSpPr>
+        <p:spPr>
+          <a:xfrm>
+            <a:off x="838200" y="1825624"/>
+            <a:ext cx="2482341" cy="4351338"/>
+          </a:xfrm>
+        </p:spPr>
+        <p:txBody>
+          <a:bodyPr/>
+          <a:lstStyle/>
+          <a:p>
+            <a:r>
+              <a:rPr lang="en-US" dirty="0"/>
+              <a:t>P0DbContext repo contains full Model builder</a:t>
+            </a:r>
+          </a:p>
+          <a:p>
+            <a:endParaRPr lang="en-US" dirty="0"/>
           </a:p>
         </p:txBody>
       </p:sp>
       <p:pic>
         <p:nvPicPr>
-          <p:cNvPr id="8" name="Content Placeholder 7">
-            <a:extLst>
-              <a:ext uri="{FF2B5EF4-FFF2-40B4-BE49-F238E27FC236}">
-                <a16:creationId xmlns:a16="http://schemas.microsoft.com/office/drawing/2014/main" id="{96EDF869-4375-4055-AF1D-E2DDE2E28CFF}"/>
+          <p:cNvPr id="9" name="Picture 8">
+            <a:extLst>
+              <a:ext uri="{FF2B5EF4-FFF2-40B4-BE49-F238E27FC236}">
+                <a16:creationId xmlns:a16="http://schemas.microsoft.com/office/drawing/2014/main" id="{BE623E61-484E-4A2A-A171-3F141B27A156}"/>
               </a:ext>
             </a:extLst>
           </p:cNvPr>
           <p:cNvPicPr>
-            <a:picLocks noGrp="1" noChangeAspect="1"/>
+            <a:picLocks noChangeAspect="1"/>
           </p:cNvPicPr>
-          <p:nvPr>
-            <p:ph idx="1"/>
-          </p:nvPr>
+          <p:nvPr/>
         </p:nvPicPr>
         <p:blipFill>
           <a:blip r:embed="rId2"/>
@@ -5463,8 +6639,8 @@
         </p:blipFill>
         <p:spPr>
           <a:xfrm>
-            <a:off x="4166365" y="416211"/>
-            <a:ext cx="6644296" cy="6244038"/>
+            <a:off x="4555066" y="1281544"/>
+            <a:ext cx="6968067" cy="5439499"/>
           </a:xfrm>
           <a:prstGeom prst="rect">
             <a:avLst/>
@@ -5474,7 +6650,7 @@
     </p:spTree>
     <p:extLst>
       <p:ext uri="{BB962C8B-B14F-4D97-AF65-F5344CB8AC3E}">
-        <p14:creationId xmlns:p14="http://schemas.microsoft.com/office/powerpoint/2010/main" val="1362093315"/>
+        <p14:creationId xmlns:p14="http://schemas.microsoft.com/office/powerpoint/2010/main" val="1139084455"/>
       </p:ext>
     </p:extLst>
   </p:cSld>
@@ -5484,7 +6660,7 @@
 </p:sld>
 </file>
 
-<file path=ppt/slides/slide18.xml><?xml version="1.0" encoding="utf-8"?>
+<file path=ppt/slides/slide5.xml><?xml version="1.0" encoding="utf-8"?>
 <p:sld xmlns:a="http://schemas.openxmlformats.org/drawingml/2006/main" xmlns:r="http://schemas.openxmlformats.org/officeDocument/2006/relationships" xmlns:p="http://schemas.openxmlformats.org/presentationml/2006/main">
   <p:cSld>
     <p:spTree>
@@ -5506,7 +6682,7 @@
           <p:cNvPr id="2" name="Title 1">
             <a:extLst>
               <a:ext uri="{FF2B5EF4-FFF2-40B4-BE49-F238E27FC236}">
-                <a16:creationId xmlns:a16="http://schemas.microsoft.com/office/drawing/2014/main" id="{49C735E6-F3E2-4C7D-BEFD-D14D795BD513}"/>
+                <a16:creationId xmlns:a16="http://schemas.microsoft.com/office/drawing/2014/main" id="{8A26F4CD-BFCB-482D-B8EA-8D40F40063FB}"/>
               </a:ext>
             </a:extLst>
           </p:cNvPr>
@@ -5523,22 +6699,24 @@
           <a:lstStyle/>
           <a:p>
             <a:r>
-              <a:rPr lang="en-US" dirty="0">
+              <a:rPr lang="en-US" sz="4400" b="0" i="0" dirty="0">
                 <a:solidFill>
-                  <a:schemeClr val="accent4"/>
+                  <a:schemeClr val="accent6"/>
                 </a:solidFill>
+                <a:effectLst/>
+                <a:latin typeface="-apple-system"/>
               </a:rPr>
-              <a:t>Persistent Data</a:t>
+              <a:t>Locations have an inventory</a:t>
             </a:r>
           </a:p>
         </p:txBody>
       </p:sp>
       <p:pic>
         <p:nvPicPr>
-          <p:cNvPr id="7" name="Content Placeholder 6">
-            <a:extLst>
-              <a:ext uri="{FF2B5EF4-FFF2-40B4-BE49-F238E27FC236}">
-                <a16:creationId xmlns:a16="http://schemas.microsoft.com/office/drawing/2014/main" id="{0C1E1915-2CE8-4330-B721-EF48AB884E71}"/>
+          <p:cNvPr id="8" name="Content Placeholder 7">
+            <a:extLst>
+              <a:ext uri="{FF2B5EF4-FFF2-40B4-BE49-F238E27FC236}">
+                <a16:creationId xmlns:a16="http://schemas.microsoft.com/office/drawing/2014/main" id="{3A81C12B-FC64-4B52-9C46-C1002C149DE3}"/>
               </a:ext>
             </a:extLst>
           </p:cNvPr>
@@ -5557,15 +6735,15 @@
         </p:blipFill>
         <p:spPr>
           <a:xfrm>
-            <a:off x="1283765" y="1690688"/>
-            <a:ext cx="8627950" cy="4351338"/>
+            <a:off x="838199" y="1621982"/>
+            <a:ext cx="8271933" cy="4575606"/>
           </a:xfrm>
         </p:spPr>
       </p:pic>
     </p:spTree>
     <p:extLst>
       <p:ext uri="{BB962C8B-B14F-4D97-AF65-F5344CB8AC3E}">
-        <p14:creationId xmlns:p14="http://schemas.microsoft.com/office/powerpoint/2010/main" val="1166251522"/>
+        <p14:creationId xmlns:p14="http://schemas.microsoft.com/office/powerpoint/2010/main" val="913143922"/>
       </p:ext>
     </p:extLst>
   </p:cSld>
@@ -5575,7 +6753,7 @@
 </p:sld>
 </file>
 
-<file path=ppt/slides/slide19.xml><?xml version="1.0" encoding="utf-8"?>
+<file path=ppt/slides/slide6.xml><?xml version="1.0" encoding="utf-8"?>
 <p:sld xmlns:a="http://schemas.openxmlformats.org/drawingml/2006/main" xmlns:r="http://schemas.openxmlformats.org/officeDocument/2006/relationships" xmlns:p="http://schemas.openxmlformats.org/presentationml/2006/main">
   <p:cSld>
     <p:spTree>
@@ -5597,7 +6775,7 @@
           <p:cNvPr id="2" name="Title 1">
             <a:extLst>
               <a:ext uri="{FF2B5EF4-FFF2-40B4-BE49-F238E27FC236}">
-                <a16:creationId xmlns:a16="http://schemas.microsoft.com/office/drawing/2014/main" id="{49C735E6-F3E2-4C7D-BEFD-D14D795BD513}"/>
+                <a16:creationId xmlns:a16="http://schemas.microsoft.com/office/drawing/2014/main" id="{8A26F4CD-BFCB-482D-B8EA-8D40F40063FB}"/>
               </a:ext>
             </a:extLst>
           </p:cNvPr>
@@ -5614,22 +6792,24 @@
           <a:lstStyle/>
           <a:p>
             <a:r>
-              <a:rPr lang="en-US" dirty="0">
+              <a:rPr lang="en-US" sz="4400" b="0" i="0" dirty="0">
                 <a:solidFill>
-                  <a:schemeClr val="accent4"/>
+                  <a:schemeClr val="accent6"/>
                 </a:solidFill>
+                <a:effectLst/>
+                <a:latin typeface="-apple-system"/>
               </a:rPr>
-              <a:t>Persistent Data</a:t>
+              <a:t>Locations have an inventory</a:t>
             </a:r>
           </a:p>
         </p:txBody>
       </p:sp>
       <p:pic>
         <p:nvPicPr>
-          <p:cNvPr id="6" name="Content Placeholder 5">
-            <a:extLst>
-              <a:ext uri="{FF2B5EF4-FFF2-40B4-BE49-F238E27FC236}">
-                <a16:creationId xmlns:a16="http://schemas.microsoft.com/office/drawing/2014/main" id="{FDC93C71-A87C-479D-9F9D-071E5DE6C310}"/>
+          <p:cNvPr id="5" name="Content Placeholder 4">
+            <a:extLst>
+              <a:ext uri="{FF2B5EF4-FFF2-40B4-BE49-F238E27FC236}">
+                <a16:creationId xmlns:a16="http://schemas.microsoft.com/office/drawing/2014/main" id="{144645DD-0C6C-40AD-BD11-99889D69F95C}"/>
               </a:ext>
             </a:extLst>
           </p:cNvPr>
@@ -5642,22 +6822,22 @@
         </p:nvPicPr>
         <p:blipFill rotWithShape="1">
           <a:blip r:embed="rId2"/>
-          <a:srcRect l="4741" r="6725" b="12263"/>
+          <a:srcRect r="6418"/>
           <a:stretch/>
         </p:blipFill>
         <p:spPr>
           <a:xfrm>
-            <a:off x="0" y="1617856"/>
-            <a:ext cx="6426200" cy="2429211"/>
+            <a:off x="54551" y="1367232"/>
+            <a:ext cx="5925590" cy="4818035"/>
           </a:xfrm>
         </p:spPr>
       </p:pic>
       <p:pic>
         <p:nvPicPr>
-          <p:cNvPr id="8" name="Picture 7">
-            <a:extLst>
-              <a:ext uri="{FF2B5EF4-FFF2-40B4-BE49-F238E27FC236}">
-                <a16:creationId xmlns:a16="http://schemas.microsoft.com/office/drawing/2014/main" id="{CD595194-55A9-44A3-AA20-C3D76EA87820}"/>
+          <p:cNvPr id="7" name="Picture 6">
+            <a:extLst>
+              <a:ext uri="{FF2B5EF4-FFF2-40B4-BE49-F238E27FC236}">
+                <a16:creationId xmlns:a16="http://schemas.microsoft.com/office/drawing/2014/main" id="{2A31BE37-A996-4B19-A1FF-D624C9B08EB3}"/>
               </a:ext>
             </a:extLst>
           </p:cNvPr>
@@ -5668,23 +6848,127 @@
         </p:nvPicPr>
         <p:blipFill rotWithShape="1">
           <a:blip r:embed="rId3"/>
-          <a:srcRect l="6281" r="1487"/>
+          <a:srcRect l="-2321" t="-4142" r="7996" b="4142"/>
           <a:stretch/>
         </p:blipFill>
         <p:spPr>
           <a:xfrm>
-            <a:off x="5842000" y="190333"/>
-            <a:ext cx="6197601" cy="6477333"/>
+            <a:off x="5852637" y="1206611"/>
+            <a:ext cx="6192505" cy="4978656"/>
           </a:xfrm>
           <a:prstGeom prst="rect">
             <a:avLst/>
           </a:prstGeom>
         </p:spPr>
       </p:pic>
+      <p:sp>
+        <p:nvSpPr>
+          <p:cNvPr id="9" name="Rectangle 8">
+            <a:extLst>
+              <a:ext uri="{FF2B5EF4-FFF2-40B4-BE49-F238E27FC236}">
+                <a16:creationId xmlns:a16="http://schemas.microsoft.com/office/drawing/2014/main" id="{0F113BA0-EFB0-41E2-8DCF-B6BF0BD64DB8}"/>
+              </a:ext>
+            </a:extLst>
+          </p:cNvPr>
+          <p:cNvSpPr/>
+          <p:nvPr/>
+        </p:nvSpPr>
+        <p:spPr>
+          <a:xfrm>
+            <a:off x="-48127" y="3578002"/>
+            <a:ext cx="5231322" cy="135467"/>
+          </a:xfrm>
+          <a:prstGeom prst="rect">
+            <a:avLst/>
+          </a:prstGeom>
+          <a:noFill/>
+          <a:ln>
+            <a:solidFill>
+              <a:srgbClr val="FF0000"/>
+            </a:solidFill>
+          </a:ln>
+        </p:spPr>
+        <p:style>
+          <a:lnRef idx="2">
+            <a:schemeClr val="accent1">
+              <a:shade val="50000"/>
+            </a:schemeClr>
+          </a:lnRef>
+          <a:fillRef idx="1">
+            <a:schemeClr val="accent1"/>
+          </a:fillRef>
+          <a:effectRef idx="0">
+            <a:schemeClr val="accent1"/>
+          </a:effectRef>
+          <a:fontRef idx="minor">
+            <a:schemeClr val="lt1"/>
+          </a:fontRef>
+        </p:style>
+        <p:txBody>
+          <a:bodyPr rtlCol="0" anchor="ctr"/>
+          <a:lstStyle/>
+          <a:p>
+            <a:pPr algn="ctr"/>
+            <a:endParaRPr lang="en-US"/>
+          </a:p>
+        </p:txBody>
+      </p:sp>
+      <p:sp>
+        <p:nvSpPr>
+          <p:cNvPr id="10" name="Rectangle 9">
+            <a:extLst>
+              <a:ext uri="{FF2B5EF4-FFF2-40B4-BE49-F238E27FC236}">
+                <a16:creationId xmlns:a16="http://schemas.microsoft.com/office/drawing/2014/main" id="{4E252113-EAE8-4185-9E19-4BABBFD72A4C}"/>
+              </a:ext>
+            </a:extLst>
+          </p:cNvPr>
+          <p:cNvSpPr/>
+          <p:nvPr/>
+        </p:nvSpPr>
+        <p:spPr>
+          <a:xfrm>
+            <a:off x="5980141" y="3713469"/>
+            <a:ext cx="5747034" cy="135467"/>
+          </a:xfrm>
+          <a:prstGeom prst="rect">
+            <a:avLst/>
+          </a:prstGeom>
+          <a:noFill/>
+          <a:ln>
+            <a:solidFill>
+              <a:srgbClr val="FF0000"/>
+            </a:solidFill>
+          </a:ln>
+        </p:spPr>
+        <p:style>
+          <a:lnRef idx="2">
+            <a:schemeClr val="accent1">
+              <a:shade val="50000"/>
+            </a:schemeClr>
+          </a:lnRef>
+          <a:fillRef idx="1">
+            <a:schemeClr val="accent1"/>
+          </a:fillRef>
+          <a:effectRef idx="0">
+            <a:schemeClr val="accent1"/>
+          </a:effectRef>
+          <a:fontRef idx="minor">
+            <a:schemeClr val="lt1"/>
+          </a:fontRef>
+        </p:style>
+        <p:txBody>
+          <a:bodyPr rtlCol="0" anchor="ctr"/>
+          <a:lstStyle/>
+          <a:p>
+            <a:pPr algn="ctr"/>
+            <a:endParaRPr lang="en-US"/>
+          </a:p>
+        </p:txBody>
+      </p:sp>
     </p:spTree>
     <p:extLst>
       <p:ext uri="{BB962C8B-B14F-4D97-AF65-F5344CB8AC3E}">
-        <p14:creationId xmlns:p14="http://schemas.microsoft.com/office/powerpoint/2010/main" val="885914222"/>
+        <p14:creationId xmlns:p14="http://schemas.microsoft.com/office/powerpoint/2010/main" val="2026282212"/>
       </p:ext>
     </p:extLst>
   </p:cSld>
@@ -5694,7 +6978,7 @@
 </p:sld>
 </file>
 
-<file path=ppt/slides/slide2.xml><?xml version="1.0" encoding="utf-8"?>
+<file path=ppt/slides/slide7.xml><?xml version="1.0" encoding="utf-8"?>
 <p:sld xmlns:a="http://schemas.openxmlformats.org/drawingml/2006/main" xmlns:r="http://schemas.openxmlformats.org/officeDocument/2006/relationships" xmlns:p="http://schemas.openxmlformats.org/presentationml/2006/main">
   <p:cSld>
     <p:bg>
@@ -5928,8 +7212,12 @@
           <a:lstStyle/>
           <a:p>
             <a:r>
-              <a:rPr lang="en-US" dirty="0"/>
-              <a:t>Functionality</a:t>
+              <a:rPr lang="en-US" dirty="0">
+                <a:solidFill>
+                  <a:schemeClr val="accent4"/>
+                </a:solidFill>
+              </a:rPr>
+              <a:t>Solution Design</a:t>
             </a:r>
           </a:p>
         </p:txBody>
@@ -5995,228 +7283,12 @@
           </a:p>
         </p:txBody>
       </p:sp>
-      <p:sp>
-        <p:nvSpPr>
-          <p:cNvPr id="3" name="Content Placeholder 2">
-            <a:extLst>
-              <a:ext uri="{FF2B5EF4-FFF2-40B4-BE49-F238E27FC236}">
-                <a16:creationId xmlns:a16="http://schemas.microsoft.com/office/drawing/2014/main" id="{B0E6C757-079E-465A-8C76-073E2B3C476E}"/>
-              </a:ext>
-            </a:extLst>
-          </p:cNvPr>
-          <p:cNvSpPr>
-            <a:spLocks noGrp="1"/>
-          </p:cNvSpPr>
-          <p:nvPr>
-            <p:ph idx="1"/>
-          </p:nvPr>
-        </p:nvSpPr>
-        <p:spPr>
-          <a:xfrm>
-            <a:off x="838200" y="1825625"/>
-            <a:ext cx="10515600" cy="4351338"/>
-          </a:xfrm>
-        </p:spPr>
-        <p:txBody>
-          <a:bodyPr>
-            <a:normAutofit/>
-          </a:bodyPr>
-          <a:lstStyle/>
-          <a:p>
-            <a:r>
-              <a:rPr lang="en-US" sz="2200" b="0" i="0" dirty="0">
-                <a:solidFill>
-                  <a:schemeClr val="accent6"/>
-                </a:solidFill>
-                <a:effectLst/>
-                <a:latin typeface="-apple-system"/>
-              </a:rPr>
-              <a:t>search customers by name</a:t>
-            </a:r>
-          </a:p>
-          <a:p>
-            <a:r>
-              <a:rPr lang="en-US" sz="2200" b="0" i="0" dirty="0">
-                <a:solidFill>
-                  <a:schemeClr val="accent6"/>
-                </a:solidFill>
-                <a:effectLst/>
-                <a:latin typeface="-apple-system"/>
-              </a:rPr>
-              <a:t>place orders to store locations for customers</a:t>
-            </a:r>
-          </a:p>
-          <a:p>
-            <a:r>
-              <a:rPr lang="en-US" sz="2200" b="0" i="0" dirty="0">
-                <a:solidFill>
-                  <a:schemeClr val="accent6"/>
-                </a:solidFill>
-                <a:effectLst/>
-                <a:latin typeface="-apple-system"/>
-              </a:rPr>
-              <a:t>display all order history of a customer</a:t>
-            </a:r>
-          </a:p>
-          <a:p>
-            <a:r>
-              <a:rPr lang="en-US" sz="2200" b="0" i="0" dirty="0">
-                <a:solidFill>
-                  <a:schemeClr val="accent4"/>
-                </a:solidFill>
-                <a:effectLst/>
-                <a:latin typeface="-apple-system"/>
-              </a:rPr>
-              <a:t>add a new customer</a:t>
-            </a:r>
-            <a:endParaRPr lang="en-US" sz="2200" b="0" i="0" dirty="0">
-              <a:solidFill>
-                <a:schemeClr val="accent6"/>
-              </a:solidFill>
-              <a:effectLst/>
-              <a:latin typeface="-apple-system"/>
-            </a:endParaRPr>
-          </a:p>
-          <a:p>
-            <a:r>
-              <a:rPr lang="en-US" sz="2200" b="0" i="0" dirty="0">
-                <a:solidFill>
-                  <a:schemeClr val="accent4"/>
-                </a:solidFill>
-                <a:effectLst/>
-                <a:latin typeface="-apple-system"/>
-              </a:rPr>
-              <a:t>display details of an order</a:t>
-            </a:r>
-          </a:p>
-          <a:p>
-            <a:r>
-              <a:rPr lang="en-US" sz="2200" b="0" i="0" dirty="0">
-                <a:solidFill>
-                  <a:schemeClr val="accent4"/>
-                </a:solidFill>
-                <a:effectLst/>
-                <a:latin typeface="-apple-system"/>
-              </a:rPr>
-              <a:t>input validation</a:t>
-            </a:r>
-          </a:p>
-          <a:p>
-            <a:pPr>
-              <a:buFont typeface="Arial" panose="020B0604020202020204" pitchFamily="34" charset="0"/>
-              <a:buChar char="•"/>
-            </a:pPr>
-            <a:r>
-              <a:rPr lang="en-US" sz="2200" b="0" i="0" dirty="0">
-                <a:solidFill>
-                  <a:srgbClr val="C00000"/>
-                </a:solidFill>
-                <a:effectLst/>
-                <a:latin typeface="-apple-system"/>
-              </a:rPr>
-              <a:t>exception handling</a:t>
-            </a:r>
-          </a:p>
-          <a:p>
-            <a:r>
-              <a:rPr lang="en-US" sz="2200" b="0" i="0" dirty="0">
-                <a:solidFill>
-                  <a:srgbClr val="C00000"/>
-                </a:solidFill>
-                <a:effectLst/>
-                <a:latin typeface="-apple-system"/>
-              </a:rPr>
-              <a:t>display all order history of a store location</a:t>
-            </a:r>
-          </a:p>
-          <a:p>
-            <a:pPr marL="0" indent="0">
-              <a:buNone/>
-            </a:pPr>
-            <a:endParaRPr lang="en-US" sz="2200" dirty="0"/>
-          </a:p>
-        </p:txBody>
-      </p:sp>
-    </p:spTree>
-    <p:extLst>
-      <p:ext uri="{BB962C8B-B14F-4D97-AF65-F5344CB8AC3E}">
-        <p14:creationId xmlns:p14="http://schemas.microsoft.com/office/powerpoint/2010/main" val="3012487353"/>
-      </p:ext>
-    </p:extLst>
-  </p:cSld>
-  <p:clrMapOvr>
-    <a:masterClrMapping/>
-  </p:clrMapOvr>
-</p:sld>
-</file>
-
-<file path=ppt/slides/slide3.xml><?xml version="1.0" encoding="utf-8"?>
-<p:sld xmlns:a="http://schemas.openxmlformats.org/drawingml/2006/main" xmlns:r="http://schemas.openxmlformats.org/officeDocument/2006/relationships" xmlns:p="http://schemas.openxmlformats.org/presentationml/2006/main">
-  <p:cSld>
-    <p:spTree>
-      <p:nvGrpSpPr>
-        <p:cNvPr id="1" name=""/>
-        <p:cNvGrpSpPr/>
-        <p:nvPr/>
-      </p:nvGrpSpPr>
-      <p:grpSpPr>
-        <a:xfrm>
-          <a:off x="0" y="0"/>
-          <a:ext cx="0" cy="0"/>
-          <a:chOff x="0" y="0"/>
-          <a:chExt cx="0" cy="0"/>
-        </a:xfrm>
-      </p:grpSpPr>
-      <p:sp>
-        <p:nvSpPr>
-          <p:cNvPr id="2" name="Title 1">
-            <a:extLst>
-              <a:ext uri="{FF2B5EF4-FFF2-40B4-BE49-F238E27FC236}">
-                <a16:creationId xmlns:a16="http://schemas.microsoft.com/office/drawing/2014/main" id="{4D8E78A2-C586-43B3-817C-675DF0C0CB9F}"/>
-              </a:ext>
-            </a:extLst>
-          </p:cNvPr>
-          <p:cNvSpPr>
-            <a:spLocks noGrp="1"/>
-          </p:cNvSpPr>
-          <p:nvPr>
-            <p:ph type="title"/>
-          </p:nvPr>
-        </p:nvSpPr>
-        <p:spPr/>
-        <p:txBody>
-          <a:bodyPr/>
-          <a:lstStyle/>
-          <a:p>
-            <a:r>
-              <a:rPr lang="en-US">
-                <a:solidFill>
-                  <a:schemeClr val="accent6"/>
-                </a:solidFill>
-                <a:latin typeface="-apple-system"/>
-              </a:rPr>
-              <a:t>S</a:t>
-            </a:r>
-            <a:r>
-              <a:rPr lang="en-US" sz="4400" b="0" i="0">
-                <a:solidFill>
-                  <a:schemeClr val="accent6"/>
-                </a:solidFill>
-                <a:effectLst/>
-                <a:latin typeface="-apple-system"/>
-              </a:rPr>
-              <a:t>earch customers by name (&amp; other parameters)</a:t>
-            </a:r>
-            <a:endParaRPr lang="en-US" dirty="0"/>
-          </a:p>
-        </p:txBody>
-      </p:sp>
       <p:pic>
         <p:nvPicPr>
           <p:cNvPr id="5" name="Content Placeholder 4">
             <a:extLst>
               <a:ext uri="{FF2B5EF4-FFF2-40B4-BE49-F238E27FC236}">
-                <a16:creationId xmlns:a16="http://schemas.microsoft.com/office/drawing/2014/main" id="{59AE665B-2931-4756-AB8F-6A54B539E847}"/>
+                <a16:creationId xmlns:a16="http://schemas.microsoft.com/office/drawing/2014/main" id="{91936902-80E5-42EE-A914-1041CA1651B1}"/>
               </a:ext>
             </a:extLst>
           </p:cNvPr>
@@ -6235,603 +7307,15 @@
         </p:blipFill>
         <p:spPr>
           <a:xfrm>
-            <a:off x="210790" y="1825625"/>
-            <a:ext cx="6130743" cy="4351338"/>
-          </a:xfrm>
-        </p:spPr>
-      </p:pic>
-      <p:pic>
-        <p:nvPicPr>
-          <p:cNvPr id="4" name="Picture 3">
-            <a:extLst>
-              <a:ext uri="{FF2B5EF4-FFF2-40B4-BE49-F238E27FC236}">
-                <a16:creationId xmlns:a16="http://schemas.microsoft.com/office/drawing/2014/main" id="{68B9441A-1A54-4D00-BA90-B19BF5E37ABF}"/>
-              </a:ext>
-            </a:extLst>
-          </p:cNvPr>
-          <p:cNvPicPr>
-            <a:picLocks noChangeAspect="1"/>
-          </p:cNvPicPr>
-          <p:nvPr/>
-        </p:nvPicPr>
-        <p:blipFill rotWithShape="1">
-          <a:blip r:embed="rId3"/>
-          <a:srcRect r="3445"/>
-          <a:stretch/>
-        </p:blipFill>
-        <p:spPr>
-          <a:xfrm>
-            <a:off x="4673601" y="1983393"/>
-            <a:ext cx="7307610" cy="749339"/>
-          </a:xfrm>
-          <a:prstGeom prst="rect">
-            <a:avLst/>
-          </a:prstGeom>
-        </p:spPr>
-      </p:pic>
-      <p:pic>
-        <p:nvPicPr>
-          <p:cNvPr id="9" name="Picture 8">
-            <a:extLst>
-              <a:ext uri="{FF2B5EF4-FFF2-40B4-BE49-F238E27FC236}">
-                <a16:creationId xmlns:a16="http://schemas.microsoft.com/office/drawing/2014/main" id="{676B5EDF-2AEC-4C4F-AF77-55C01AAB5913}"/>
-              </a:ext>
-            </a:extLst>
-          </p:cNvPr>
-          <p:cNvPicPr>
-            <a:picLocks noChangeAspect="1"/>
-          </p:cNvPicPr>
-          <p:nvPr/>
-        </p:nvPicPr>
-        <p:blipFill>
-          <a:blip r:embed="rId4"/>
-          <a:stretch>
-            <a:fillRect/>
-          </a:stretch>
-        </p:blipFill>
-        <p:spPr>
-          <a:xfrm>
-            <a:off x="4612465" y="4130425"/>
-            <a:ext cx="7429882" cy="654084"/>
-          </a:xfrm>
-          <a:prstGeom prst="rect">
-            <a:avLst/>
-          </a:prstGeom>
+            <a:off x="1205817" y="1698241"/>
+            <a:ext cx="2657671" cy="4351338"/>
+          </a:xfrm>
         </p:spPr>
       </p:pic>
     </p:spTree>
     <p:extLst>
       <p:ext uri="{BB962C8B-B14F-4D97-AF65-F5344CB8AC3E}">
-        <p14:creationId xmlns:p14="http://schemas.microsoft.com/office/powerpoint/2010/main" val="229285352"/>
-      </p:ext>
-    </p:extLst>
-  </p:cSld>
-  <p:clrMapOvr>
-    <a:masterClrMapping/>
-  </p:clrMapOvr>
-</p:sld>
-</file>
-
-<file path=ppt/slides/slide4.xml><?xml version="1.0" encoding="utf-8"?>
-<p:sld xmlns:a="http://schemas.openxmlformats.org/drawingml/2006/main" xmlns:r="http://schemas.openxmlformats.org/officeDocument/2006/relationships" xmlns:p="http://schemas.openxmlformats.org/presentationml/2006/main">
-  <p:cSld>
-    <p:spTree>
-      <p:nvGrpSpPr>
-        <p:cNvPr id="1" name=""/>
-        <p:cNvGrpSpPr/>
-        <p:nvPr/>
-      </p:nvGrpSpPr>
-      <p:grpSpPr>
-        <a:xfrm>
-          <a:off x="0" y="0"/>
-          <a:ext cx="0" cy="0"/>
-          <a:chOff x="0" y="0"/>
-          <a:chExt cx="0" cy="0"/>
-        </a:xfrm>
-      </p:grpSpPr>
-      <p:sp>
-        <p:nvSpPr>
-          <p:cNvPr id="2" name="Title 1">
-            <a:extLst>
-              <a:ext uri="{FF2B5EF4-FFF2-40B4-BE49-F238E27FC236}">
-                <a16:creationId xmlns:a16="http://schemas.microsoft.com/office/drawing/2014/main" id="{4D8E78A2-C586-43B3-817C-675DF0C0CB9F}"/>
-              </a:ext>
-            </a:extLst>
-          </p:cNvPr>
-          <p:cNvSpPr>
-            <a:spLocks noGrp="1"/>
-          </p:cNvSpPr>
-          <p:nvPr>
-            <p:ph type="title"/>
-          </p:nvPr>
-        </p:nvSpPr>
-        <p:spPr/>
-        <p:txBody>
-          <a:bodyPr/>
-          <a:lstStyle/>
-          <a:p>
-            <a:r>
-              <a:rPr lang="en-US" sz="4400" b="0" i="0" dirty="0">
-                <a:solidFill>
-                  <a:schemeClr val="accent6"/>
-                </a:solidFill>
-                <a:effectLst/>
-                <a:latin typeface="-apple-system"/>
-              </a:rPr>
-              <a:t>Place orders to store locations for customers</a:t>
-            </a:r>
-          </a:p>
-        </p:txBody>
-      </p:sp>
-      <p:pic>
-        <p:nvPicPr>
-          <p:cNvPr id="5" name="Content Placeholder 4">
-            <a:extLst>
-              <a:ext uri="{FF2B5EF4-FFF2-40B4-BE49-F238E27FC236}">
-                <a16:creationId xmlns:a16="http://schemas.microsoft.com/office/drawing/2014/main" id="{E985FB2E-E5E6-4586-934B-1E9319E4AE74}"/>
-              </a:ext>
-            </a:extLst>
-          </p:cNvPr>
-          <p:cNvPicPr>
-            <a:picLocks noGrp="1" noChangeAspect="1"/>
-          </p:cNvPicPr>
-          <p:nvPr>
-            <p:ph idx="1"/>
-          </p:nvPr>
-        </p:nvPicPr>
-        <p:blipFill>
-          <a:blip r:embed="rId2"/>
-          <a:stretch>
-            <a:fillRect/>
-          </a:stretch>
-        </p:blipFill>
-        <p:spPr>
-          <a:xfrm>
-            <a:off x="210807" y="1887679"/>
-            <a:ext cx="6820251" cy="2590933"/>
-          </a:xfrm>
-        </p:spPr>
-      </p:pic>
-    </p:spTree>
-    <p:extLst>
-      <p:ext uri="{BB962C8B-B14F-4D97-AF65-F5344CB8AC3E}">
-        <p14:creationId xmlns:p14="http://schemas.microsoft.com/office/powerpoint/2010/main" val="2848077745"/>
-      </p:ext>
-    </p:extLst>
-  </p:cSld>
-  <p:clrMapOvr>
-    <a:masterClrMapping/>
-  </p:clrMapOvr>
-</p:sld>
-</file>
-
-<file path=ppt/slides/slide5.xml><?xml version="1.0" encoding="utf-8"?>
-<p:sld xmlns:a="http://schemas.openxmlformats.org/drawingml/2006/main" xmlns:r="http://schemas.openxmlformats.org/officeDocument/2006/relationships" xmlns:p="http://schemas.openxmlformats.org/presentationml/2006/main">
-  <p:cSld>
-    <p:spTree>
-      <p:nvGrpSpPr>
-        <p:cNvPr id="1" name=""/>
-        <p:cNvGrpSpPr/>
-        <p:nvPr/>
-      </p:nvGrpSpPr>
-      <p:grpSpPr>
-        <a:xfrm>
-          <a:off x="0" y="0"/>
-          <a:ext cx="0" cy="0"/>
-          <a:chOff x="0" y="0"/>
-          <a:chExt cx="0" cy="0"/>
-        </a:xfrm>
-      </p:grpSpPr>
-      <p:sp>
-        <p:nvSpPr>
-          <p:cNvPr id="2" name="Title 1">
-            <a:extLst>
-              <a:ext uri="{FF2B5EF4-FFF2-40B4-BE49-F238E27FC236}">
-                <a16:creationId xmlns:a16="http://schemas.microsoft.com/office/drawing/2014/main" id="{4D8E78A2-C586-43B3-817C-675DF0C0CB9F}"/>
-              </a:ext>
-            </a:extLst>
-          </p:cNvPr>
-          <p:cNvSpPr>
-            <a:spLocks noGrp="1"/>
-          </p:cNvSpPr>
-          <p:nvPr>
-            <p:ph type="title"/>
-          </p:nvPr>
-        </p:nvSpPr>
-        <p:spPr/>
-        <p:txBody>
-          <a:bodyPr/>
-          <a:lstStyle/>
-          <a:p>
-            <a:r>
-              <a:rPr lang="en-US" dirty="0">
-                <a:solidFill>
-                  <a:schemeClr val="accent6"/>
-                </a:solidFill>
-                <a:latin typeface="-apple-system"/>
-              </a:rPr>
-              <a:t>D</a:t>
-            </a:r>
-            <a:r>
-              <a:rPr lang="en-US" sz="4400" b="0" i="0" dirty="0">
-                <a:solidFill>
-                  <a:schemeClr val="accent6"/>
-                </a:solidFill>
-                <a:effectLst/>
-                <a:latin typeface="-apple-system"/>
-              </a:rPr>
-              <a:t>isplay all order history of a customer</a:t>
-            </a:r>
-          </a:p>
-        </p:txBody>
-      </p:sp>
-      <p:pic>
-        <p:nvPicPr>
-          <p:cNvPr id="10" name="Picture 9">
-            <a:extLst>
-              <a:ext uri="{FF2B5EF4-FFF2-40B4-BE49-F238E27FC236}">
-                <a16:creationId xmlns:a16="http://schemas.microsoft.com/office/drawing/2014/main" id="{E01A35FC-3DC3-4680-B4C6-809BDA254553}"/>
-              </a:ext>
-            </a:extLst>
-          </p:cNvPr>
-          <p:cNvPicPr>
-            <a:picLocks noChangeAspect="1"/>
-          </p:cNvPicPr>
-          <p:nvPr/>
-        </p:nvPicPr>
-        <p:blipFill>
-          <a:blip r:embed="rId2"/>
-          <a:stretch>
-            <a:fillRect/>
-          </a:stretch>
-        </p:blipFill>
-        <p:spPr>
-          <a:xfrm>
-            <a:off x="7529401" y="1535197"/>
-            <a:ext cx="4115011" cy="2711589"/>
-          </a:xfrm>
-          <a:prstGeom prst="rect">
-            <a:avLst/>
-          </a:prstGeom>
-        </p:spPr>
-      </p:pic>
-      <p:pic>
-        <p:nvPicPr>
-          <p:cNvPr id="16" name="Content Placeholder 15">
-            <a:extLst>
-              <a:ext uri="{FF2B5EF4-FFF2-40B4-BE49-F238E27FC236}">
-                <a16:creationId xmlns:a16="http://schemas.microsoft.com/office/drawing/2014/main" id="{E06989FE-0B01-4436-A53E-43F188EE9D97}"/>
-              </a:ext>
-            </a:extLst>
-          </p:cNvPr>
-          <p:cNvPicPr>
-            <a:picLocks noGrp="1" noChangeAspect="1"/>
-          </p:cNvPicPr>
-          <p:nvPr>
-            <p:ph idx="1"/>
-          </p:nvPr>
-        </p:nvPicPr>
-        <p:blipFill>
-          <a:blip r:embed="rId3"/>
-          <a:stretch>
-            <a:fillRect/>
-          </a:stretch>
-        </p:blipFill>
-        <p:spPr>
-          <a:xfrm>
-            <a:off x="177175" y="1690688"/>
-            <a:ext cx="7144117" cy="2495678"/>
-          </a:xfrm>
-        </p:spPr>
-      </p:pic>
-      <p:pic>
-        <p:nvPicPr>
-          <p:cNvPr id="4" name="Picture 3">
-            <a:extLst>
-              <a:ext uri="{FF2B5EF4-FFF2-40B4-BE49-F238E27FC236}">
-                <a16:creationId xmlns:a16="http://schemas.microsoft.com/office/drawing/2014/main" id="{B649F620-F138-40A2-9FFF-27562D2C9A92}"/>
-              </a:ext>
-            </a:extLst>
-          </p:cNvPr>
-          <p:cNvPicPr>
-            <a:picLocks noChangeAspect="1"/>
-          </p:cNvPicPr>
-          <p:nvPr/>
-        </p:nvPicPr>
-        <p:blipFill>
-          <a:blip r:embed="rId4"/>
-          <a:stretch>
-            <a:fillRect/>
-          </a:stretch>
-        </p:blipFill>
-        <p:spPr>
-          <a:xfrm>
-            <a:off x="7462722" y="4442650"/>
-            <a:ext cx="4248368" cy="2235315"/>
-          </a:xfrm>
-          <a:prstGeom prst="rect">
-            <a:avLst/>
-          </a:prstGeom>
-        </p:spPr>
-      </p:pic>
-      <p:pic>
-        <p:nvPicPr>
-          <p:cNvPr id="6" name="Picture 5">
-            <a:extLst>
-              <a:ext uri="{FF2B5EF4-FFF2-40B4-BE49-F238E27FC236}">
-                <a16:creationId xmlns:a16="http://schemas.microsoft.com/office/drawing/2014/main" id="{C169F5F9-B174-48D4-80E5-EC8388EA38AB}"/>
-              </a:ext>
-            </a:extLst>
-          </p:cNvPr>
-          <p:cNvPicPr>
-            <a:picLocks noChangeAspect="1"/>
-          </p:cNvPicPr>
-          <p:nvPr/>
-        </p:nvPicPr>
-        <p:blipFill>
-          <a:blip r:embed="rId5"/>
-          <a:stretch>
-            <a:fillRect/>
-          </a:stretch>
-        </p:blipFill>
-        <p:spPr>
-          <a:xfrm>
-            <a:off x="94621" y="4194236"/>
-            <a:ext cx="7226671" cy="2635385"/>
-          </a:xfrm>
-          <a:prstGeom prst="rect">
-            <a:avLst/>
-          </a:prstGeom>
-        </p:spPr>
-      </p:pic>
-    </p:spTree>
-    <p:extLst>
-      <p:ext uri="{BB962C8B-B14F-4D97-AF65-F5344CB8AC3E}">
-        <p14:creationId xmlns:p14="http://schemas.microsoft.com/office/powerpoint/2010/main" val="2050616"/>
-      </p:ext>
-    </p:extLst>
-  </p:cSld>
-  <p:clrMapOvr>
-    <a:masterClrMapping/>
-  </p:clrMapOvr>
-</p:sld>
-</file>
-
-<file path=ppt/slides/slide6.xml><?xml version="1.0" encoding="utf-8"?>
-<p:sld xmlns:a="http://schemas.openxmlformats.org/drawingml/2006/main" xmlns:r="http://schemas.openxmlformats.org/officeDocument/2006/relationships" xmlns:p="http://schemas.openxmlformats.org/presentationml/2006/main">
-  <p:cSld>
-    <p:spTree>
-      <p:nvGrpSpPr>
-        <p:cNvPr id="1" name=""/>
-        <p:cNvGrpSpPr/>
-        <p:nvPr/>
-      </p:nvGrpSpPr>
-      <p:grpSpPr>
-        <a:xfrm>
-          <a:off x="0" y="0"/>
-          <a:ext cx="0" cy="0"/>
-          <a:chOff x="0" y="0"/>
-          <a:chExt cx="0" cy="0"/>
-        </a:xfrm>
-      </p:grpSpPr>
-      <p:sp>
-        <p:nvSpPr>
-          <p:cNvPr id="2" name="Title 1">
-            <a:extLst>
-              <a:ext uri="{FF2B5EF4-FFF2-40B4-BE49-F238E27FC236}">
-                <a16:creationId xmlns:a16="http://schemas.microsoft.com/office/drawing/2014/main" id="{4D8E78A2-C586-43B3-817C-675DF0C0CB9F}"/>
-              </a:ext>
-            </a:extLst>
-          </p:cNvPr>
-          <p:cNvSpPr>
-            <a:spLocks noGrp="1"/>
-          </p:cNvSpPr>
-          <p:nvPr>
-            <p:ph type="title"/>
-          </p:nvPr>
-        </p:nvSpPr>
-        <p:spPr>
-          <a:xfrm>
-            <a:off x="474133" y="102658"/>
-            <a:ext cx="10515600" cy="1325563"/>
-          </a:xfrm>
-        </p:spPr>
-        <p:txBody>
-          <a:bodyPr/>
-          <a:lstStyle/>
-          <a:p>
-            <a:r>
-              <a:rPr lang="en-US" dirty="0">
-                <a:solidFill>
-                  <a:schemeClr val="accent4"/>
-                </a:solidFill>
-                <a:latin typeface="-apple-system"/>
-              </a:rPr>
-              <a:t>A</a:t>
-            </a:r>
-            <a:r>
-              <a:rPr lang="en-US" sz="4400" b="0" i="0" dirty="0">
-                <a:solidFill>
-                  <a:schemeClr val="accent4"/>
-                </a:solidFill>
-                <a:effectLst/>
-                <a:latin typeface="-apple-system"/>
-              </a:rPr>
-              <a:t>dd a new customer</a:t>
-            </a:r>
-          </a:p>
-        </p:txBody>
-      </p:sp>
-      <p:pic>
-        <p:nvPicPr>
-          <p:cNvPr id="5" name="Content Placeholder 4">
-            <a:extLst>
-              <a:ext uri="{FF2B5EF4-FFF2-40B4-BE49-F238E27FC236}">
-                <a16:creationId xmlns:a16="http://schemas.microsoft.com/office/drawing/2014/main" id="{0BAF3597-FC96-41E2-8B54-6C37B10D2F80}"/>
-              </a:ext>
-            </a:extLst>
-          </p:cNvPr>
-          <p:cNvPicPr>
-            <a:picLocks noGrp="1" noChangeAspect="1"/>
-          </p:cNvPicPr>
-          <p:nvPr>
-            <p:ph idx="1"/>
-          </p:nvPr>
-        </p:nvPicPr>
-        <p:blipFill>
-          <a:blip r:embed="rId2"/>
-          <a:stretch>
-            <a:fillRect/>
-          </a:stretch>
-        </p:blipFill>
-        <p:spPr>
-          <a:xfrm>
-            <a:off x="97780" y="1145251"/>
-            <a:ext cx="5998220" cy="5398451"/>
-          </a:xfrm>
-        </p:spPr>
-      </p:pic>
-      <p:pic>
-        <p:nvPicPr>
-          <p:cNvPr id="7" name="Picture 6">
-            <a:extLst>
-              <a:ext uri="{FF2B5EF4-FFF2-40B4-BE49-F238E27FC236}">
-                <a16:creationId xmlns:a16="http://schemas.microsoft.com/office/drawing/2014/main" id="{D801E9C3-BBFC-4251-B6C2-4DAACD3F9B78}"/>
-              </a:ext>
-            </a:extLst>
-          </p:cNvPr>
-          <p:cNvPicPr>
-            <a:picLocks noChangeAspect="1"/>
-          </p:cNvPicPr>
-          <p:nvPr/>
-        </p:nvPicPr>
-        <p:blipFill>
-          <a:blip r:embed="rId3"/>
-          <a:stretch>
-            <a:fillRect/>
-          </a:stretch>
-        </p:blipFill>
-        <p:spPr>
-          <a:xfrm>
-            <a:off x="5427272" y="1676272"/>
-            <a:ext cx="6764728" cy="3683189"/>
-          </a:xfrm>
-          <a:prstGeom prst="rect">
-            <a:avLst/>
-          </a:prstGeom>
-        </p:spPr>
-      </p:pic>
-    </p:spTree>
-    <p:extLst>
-      <p:ext uri="{BB962C8B-B14F-4D97-AF65-F5344CB8AC3E}">
-        <p14:creationId xmlns:p14="http://schemas.microsoft.com/office/powerpoint/2010/main" val="2394070289"/>
-      </p:ext>
-    </p:extLst>
-  </p:cSld>
-  <p:clrMapOvr>
-    <a:masterClrMapping/>
-  </p:clrMapOvr>
-</p:sld>
-</file>
-
-<file path=ppt/slides/slide7.xml><?xml version="1.0" encoding="utf-8"?>
-<p:sld xmlns:a="http://schemas.openxmlformats.org/drawingml/2006/main" xmlns:r="http://schemas.openxmlformats.org/officeDocument/2006/relationships" xmlns:p="http://schemas.openxmlformats.org/presentationml/2006/main">
-  <p:cSld>
-    <p:spTree>
-      <p:nvGrpSpPr>
-        <p:cNvPr id="1" name=""/>
-        <p:cNvGrpSpPr/>
-        <p:nvPr/>
-      </p:nvGrpSpPr>
-      <p:grpSpPr>
-        <a:xfrm>
-          <a:off x="0" y="0"/>
-          <a:ext cx="0" cy="0"/>
-          <a:chOff x="0" y="0"/>
-          <a:chExt cx="0" cy="0"/>
-        </a:xfrm>
-      </p:grpSpPr>
-      <p:sp>
-        <p:nvSpPr>
-          <p:cNvPr id="2" name="Title 1">
-            <a:extLst>
-              <a:ext uri="{FF2B5EF4-FFF2-40B4-BE49-F238E27FC236}">
-                <a16:creationId xmlns:a16="http://schemas.microsoft.com/office/drawing/2014/main" id="{4D8E78A2-C586-43B3-817C-675DF0C0CB9F}"/>
-              </a:ext>
-            </a:extLst>
-          </p:cNvPr>
-          <p:cNvSpPr>
-            <a:spLocks noGrp="1"/>
-          </p:cNvSpPr>
-          <p:nvPr>
-            <p:ph type="title"/>
-          </p:nvPr>
-        </p:nvSpPr>
-        <p:spPr>
-          <a:xfrm>
-            <a:off x="474133" y="102658"/>
-            <a:ext cx="10515600" cy="1325563"/>
-          </a:xfrm>
-        </p:spPr>
-        <p:txBody>
-          <a:bodyPr/>
-          <a:lstStyle/>
-          <a:p>
-            <a:r>
-              <a:rPr lang="en-US" dirty="0">
-                <a:solidFill>
-                  <a:schemeClr val="accent4"/>
-                </a:solidFill>
-                <a:latin typeface="-apple-system"/>
-              </a:rPr>
-              <a:t>Crediting Winston</a:t>
-            </a:r>
-            <a:endParaRPr lang="en-US" sz="4400" b="0" i="0" dirty="0">
-              <a:solidFill>
-                <a:schemeClr val="accent4"/>
-              </a:solidFill>
-              <a:effectLst/>
-              <a:latin typeface="-apple-system"/>
-            </a:endParaRPr>
-          </a:p>
-        </p:txBody>
-      </p:sp>
-      <p:pic>
-        <p:nvPicPr>
-          <p:cNvPr id="9" name="Content Placeholder 8">
-            <a:extLst>
-              <a:ext uri="{FF2B5EF4-FFF2-40B4-BE49-F238E27FC236}">
-                <a16:creationId xmlns:a16="http://schemas.microsoft.com/office/drawing/2014/main" id="{8EC356AE-F80C-45D9-B5BA-4C0D18275B25}"/>
-              </a:ext>
-            </a:extLst>
-          </p:cNvPr>
-          <p:cNvPicPr>
-            <a:picLocks noGrp="1" noChangeAspect="1"/>
-          </p:cNvPicPr>
-          <p:nvPr>
-            <p:ph idx="1"/>
-          </p:nvPr>
-        </p:nvPicPr>
-        <p:blipFill>
-          <a:blip r:embed="rId2"/>
-          <a:stretch>
-            <a:fillRect/>
-          </a:stretch>
-        </p:blipFill>
-        <p:spPr>
-          <a:xfrm>
-            <a:off x="1531722" y="2774109"/>
-            <a:ext cx="8401482" cy="1835244"/>
-          </a:xfrm>
-          <a:prstGeom prst="rect">
-            <a:avLst/>
-          </a:prstGeom>
-        </p:spPr>
-      </p:pic>
-    </p:spTree>
-    <p:extLst>
-      <p:ext uri="{BB962C8B-B14F-4D97-AF65-F5344CB8AC3E}">
-        <p14:creationId xmlns:p14="http://schemas.microsoft.com/office/powerpoint/2010/main" val="3401543557"/>
+        <p14:creationId xmlns:p14="http://schemas.microsoft.com/office/powerpoint/2010/main" val="4054503862"/>
       </p:ext>
     </p:extLst>
   </p:cSld>
@@ -6863,7 +7347,7 @@
           <p:cNvPr id="2" name="Title 1">
             <a:extLst>
               <a:ext uri="{FF2B5EF4-FFF2-40B4-BE49-F238E27FC236}">
-                <a16:creationId xmlns:a16="http://schemas.microsoft.com/office/drawing/2014/main" id="{4D8E78A2-C586-43B3-817C-675DF0C0CB9F}"/>
+                <a16:creationId xmlns:a16="http://schemas.microsoft.com/office/drawing/2014/main" id="{49C735E6-F3E2-4C7D-BEFD-D14D795BD513}"/>
               </a:ext>
             </a:extLst>
           </p:cNvPr>
@@ -6884,29 +7368,18 @@
                 <a:solidFill>
                   <a:schemeClr val="accent4"/>
                 </a:solidFill>
-                <a:latin typeface="-apple-system"/>
               </a:rPr>
-              <a:t>D</a:t>
-            </a:r>
-            <a:r>
-              <a:rPr lang="en-US" sz="4400" b="0" i="0" dirty="0">
-                <a:solidFill>
-                  <a:schemeClr val="accent4"/>
-                </a:solidFill>
-                <a:effectLst/>
-                <a:latin typeface="-apple-system"/>
-              </a:rPr>
-              <a:t>isplay details of an order</a:t>
+              <a:t>Interfaces</a:t>
             </a:r>
           </a:p>
         </p:txBody>
       </p:sp>
       <p:pic>
         <p:nvPicPr>
-          <p:cNvPr id="9" name="Content Placeholder 8">
-            <a:extLst>
-              <a:ext uri="{FF2B5EF4-FFF2-40B4-BE49-F238E27FC236}">
-                <a16:creationId xmlns:a16="http://schemas.microsoft.com/office/drawing/2014/main" id="{7FCAC4CA-9130-461C-9642-B04C996AACA6}"/>
+          <p:cNvPr id="8" name="Content Placeholder 7">
+            <a:extLst>
+              <a:ext uri="{FF2B5EF4-FFF2-40B4-BE49-F238E27FC236}">
+                <a16:creationId xmlns:a16="http://schemas.microsoft.com/office/drawing/2014/main" id="{96EDF869-4375-4055-AF1D-E2DDE2E28CFF}"/>
               </a:ext>
             </a:extLst>
           </p:cNvPr>
@@ -6925,15 +7398,18 @@
         </p:blipFill>
         <p:spPr>
           <a:xfrm>
-            <a:off x="0" y="1810031"/>
-            <a:ext cx="8255424" cy="2292468"/>
-          </a:xfrm>
+            <a:off x="4166365" y="416211"/>
+            <a:ext cx="6644296" cy="6244038"/>
+          </a:xfrm>
+          <a:prstGeom prst="rect">
+            <a:avLst/>
+          </a:prstGeom>
         </p:spPr>
       </p:pic>
     </p:spTree>
     <p:extLst>
       <p:ext uri="{BB962C8B-B14F-4D97-AF65-F5344CB8AC3E}">
-        <p14:creationId xmlns:p14="http://schemas.microsoft.com/office/powerpoint/2010/main" val="1712774209"/>
+        <p14:creationId xmlns:p14="http://schemas.microsoft.com/office/powerpoint/2010/main" val="1362093315"/>
       </p:ext>
     </p:extLst>
   </p:cSld>
@@ -6987,17 +7463,17 @@
                   <a:schemeClr val="accent4"/>
                 </a:solidFill>
               </a:rPr>
-              <a:t>Input Validation</a:t>
+              <a:t>Persistent Data</a:t>
             </a:r>
           </a:p>
         </p:txBody>
       </p:sp>
       <p:pic>
         <p:nvPicPr>
-          <p:cNvPr id="5" name="Content Placeholder 4">
-            <a:extLst>
-              <a:ext uri="{FF2B5EF4-FFF2-40B4-BE49-F238E27FC236}">
-                <a16:creationId xmlns:a16="http://schemas.microsoft.com/office/drawing/2014/main" id="{C3F0317C-2F09-4FBB-A7A7-362F21F6895E}"/>
+          <p:cNvPr id="7" name="Content Placeholder 6">
+            <a:extLst>
+              <a:ext uri="{FF2B5EF4-FFF2-40B4-BE49-F238E27FC236}">
+                <a16:creationId xmlns:a16="http://schemas.microsoft.com/office/drawing/2014/main" id="{0C1E1915-2CE8-4330-B721-EF48AB884E71}"/>
               </a:ext>
             </a:extLst>
           </p:cNvPr>
@@ -7008,82 +7484,23 @@
             <p:ph idx="1"/>
           </p:nvPr>
         </p:nvPicPr>
-        <p:blipFill rotWithShape="1">
+        <p:blipFill>
           <a:blip r:embed="rId2"/>
-          <a:srcRect r="4632" b="23330"/>
-          <a:stretch/>
-        </p:blipFill>
-        <p:spPr>
-          <a:xfrm>
-            <a:off x="294047" y="1536169"/>
-            <a:ext cx="8164167" cy="1215498"/>
-          </a:xfrm>
-        </p:spPr>
-      </p:pic>
-      <p:pic>
-        <p:nvPicPr>
-          <p:cNvPr id="4" name="Picture 3">
-            <a:extLst>
-              <a:ext uri="{FF2B5EF4-FFF2-40B4-BE49-F238E27FC236}">
-                <a16:creationId xmlns:a16="http://schemas.microsoft.com/office/drawing/2014/main" id="{C4A7D303-FBFA-4398-9A81-47B32366C107}"/>
-              </a:ext>
-            </a:extLst>
-          </p:cNvPr>
-          <p:cNvPicPr>
-            <a:picLocks noChangeAspect="1"/>
-          </p:cNvPicPr>
-          <p:nvPr/>
-        </p:nvPicPr>
-        <p:blipFill>
-          <a:blip r:embed="rId3"/>
           <a:stretch>
             <a:fillRect/>
           </a:stretch>
         </p:blipFill>
         <p:spPr>
           <a:xfrm>
-            <a:off x="219841" y="3003273"/>
-            <a:ext cx="8312577" cy="3340272"/>
-          </a:xfrm>
-          <a:prstGeom prst="rect">
-            <a:avLst/>
-          </a:prstGeom>
-        </p:spPr>
-      </p:pic>
-      <p:pic>
-        <p:nvPicPr>
-          <p:cNvPr id="9" name="Content Placeholder 7">
-            <a:extLst>
-              <a:ext uri="{FF2B5EF4-FFF2-40B4-BE49-F238E27FC236}">
-                <a16:creationId xmlns:a16="http://schemas.microsoft.com/office/drawing/2014/main" id="{C702B05C-E145-4A62-968A-DFF7A4073289}"/>
-              </a:ext>
-            </a:extLst>
-          </p:cNvPr>
-          <p:cNvPicPr>
-            <a:picLocks noChangeAspect="1"/>
-          </p:cNvPicPr>
-          <p:nvPr/>
-        </p:nvPicPr>
-        <p:blipFill>
-          <a:blip r:embed="rId4"/>
-          <a:stretch>
-            <a:fillRect/>
-          </a:stretch>
-        </p:blipFill>
-        <p:spPr>
-          <a:xfrm>
-            <a:off x="7367265" y="801938"/>
-            <a:ext cx="4610337" cy="482625"/>
-          </a:xfrm>
-          <a:prstGeom prst="rect">
-            <a:avLst/>
-          </a:prstGeom>
+            <a:off x="1283765" y="1690688"/>
+            <a:ext cx="8627950" cy="4351338"/>
+          </a:xfrm>
         </p:spPr>
       </p:pic>
     </p:spTree>
     <p:extLst>
       <p:ext uri="{BB962C8B-B14F-4D97-AF65-F5344CB8AC3E}">
-        <p14:creationId xmlns:p14="http://schemas.microsoft.com/office/powerpoint/2010/main" val="99630070"/>
+        <p14:creationId xmlns:p14="http://schemas.microsoft.com/office/powerpoint/2010/main" val="1166251522"/>
       </p:ext>
     </p:extLst>
   </p:cSld>

</xml_diff>